<commit_message>
First statistics added with support Excel
</commit_message>
<xml_diff>
--- a/Presentations/3. CID Presentation.pptx
+++ b/Presentations/3. CID Presentation.pptx
@@ -249,6 +249,1319 @@
     <p:extLst/>
   </p:cmAuthor>
 </p:cmAuthorLst>
+</file>
+
+<file path=ppt/charts/chart1.xml><?xml version="1.0" encoding="utf-8"?>
+<c:chartSpace xmlns:c="http://schemas.openxmlformats.org/drawingml/2006/chart" xmlns:a="http://schemas.openxmlformats.org/drawingml/2006/main" xmlns:r="http://schemas.openxmlformats.org/officeDocument/2006/relationships">
+  <c:date1904 val="0"/>
+  <c:lang val="it-IT"/>
+  <c:roundedCorners val="0"/>
+  <mc:AlternateContent xmlns:mc="http://schemas.openxmlformats.org/markup-compatibility/2006">
+    <mc:Choice xmlns:c14="http://schemas.microsoft.com/office/drawing/2007/8/2/chart" Requires="c14">
+      <c14:style val="102"/>
+    </mc:Choice>
+    <mc:Fallback>
+      <c:style val="2"/>
+    </mc:Fallback>
+  </mc:AlternateContent>
+  <c:chart>
+    <c:title>
+      <c:tx>
+        <c:rich>
+          <a:bodyPr rot="0" spcFirstLastPara="1" vertOverflow="ellipsis" vert="horz" wrap="square" anchor="ctr" anchorCtr="1"/>
+          <a:lstStyle/>
+          <a:p>
+            <a:pPr>
+              <a:defRPr sz="1400" b="0" i="0" u="none" strike="noStrike" kern="1200" cap="none" spc="20" baseline="0">
+                <a:solidFill>
+                  <a:schemeClr val="tx1">
+                    <a:lumMod val="50000"/>
+                    <a:lumOff val="50000"/>
+                  </a:schemeClr>
+                </a:solidFill>
+                <a:latin typeface="+mn-lt"/>
+                <a:ea typeface="+mn-ea"/>
+                <a:cs typeface="+mn-cs"/>
+              </a:defRPr>
+            </a:pPr>
+            <a:r>
+              <a:rPr lang="en-US" b="1"/>
+              <a:t>Class</a:t>
+            </a:r>
+            <a:r>
+              <a:rPr lang="en-US" b="1" baseline="0"/>
+              <a:t> Issues Histogram (w.r.t. Checklist)</a:t>
+            </a:r>
+            <a:endParaRPr lang="en-US" b="1"/>
+          </a:p>
+        </c:rich>
+      </c:tx>
+      <c:layout/>
+      <c:overlay val="0"/>
+      <c:spPr>
+        <a:noFill/>
+        <a:ln>
+          <a:noFill/>
+        </a:ln>
+        <a:effectLst/>
+      </c:spPr>
+      <c:txPr>
+        <a:bodyPr rot="0" spcFirstLastPara="1" vertOverflow="ellipsis" vert="horz" wrap="square" anchor="ctr" anchorCtr="1"/>
+        <a:lstStyle/>
+        <a:p>
+          <a:pPr>
+            <a:defRPr sz="1400" b="0" i="0" u="none" strike="noStrike" kern="1200" cap="none" spc="20" baseline="0">
+              <a:solidFill>
+                <a:schemeClr val="tx1">
+                  <a:lumMod val="50000"/>
+                  <a:lumOff val="50000"/>
+                </a:schemeClr>
+              </a:solidFill>
+              <a:latin typeface="+mn-lt"/>
+              <a:ea typeface="+mn-ea"/>
+              <a:cs typeface="+mn-cs"/>
+            </a:defRPr>
+          </a:pPr>
+          <a:endParaRPr lang="en-US"/>
+        </a:p>
+      </c:txPr>
+    </c:title>
+    <c:autoTitleDeleted val="0"/>
+    <c:plotArea>
+      <c:layout/>
+      <c:barChart>
+        <c:barDir val="bar"/>
+        <c:grouping val="clustered"/>
+        <c:varyColors val="0"/>
+        <c:ser>
+          <c:idx val="0"/>
+          <c:order val="0"/>
+          <c:tx>
+            <c:strRef>
+              <c:f>Foglio1!$B$1</c:f>
+              <c:strCache>
+                <c:ptCount val="1"/>
+                <c:pt idx="0">
+                  <c:v>listSubComponentsCommand()</c:v>
+                </c:pt>
+              </c:strCache>
+            </c:strRef>
+          </c:tx>
+          <c:spPr>
+            <a:gradFill rotWithShape="1">
+              <a:gsLst>
+                <a:gs pos="0">
+                  <a:schemeClr val="accent1">
+                    <a:lumMod val="110000"/>
+                    <a:satMod val="105000"/>
+                    <a:tint val="67000"/>
+                  </a:schemeClr>
+                </a:gs>
+                <a:gs pos="50000">
+                  <a:schemeClr val="accent1">
+                    <a:lumMod val="105000"/>
+                    <a:satMod val="103000"/>
+                    <a:tint val="73000"/>
+                  </a:schemeClr>
+                </a:gs>
+                <a:gs pos="100000">
+                  <a:schemeClr val="accent1">
+                    <a:lumMod val="105000"/>
+                    <a:satMod val="109000"/>
+                    <a:tint val="81000"/>
+                  </a:schemeClr>
+                </a:gs>
+              </a:gsLst>
+              <a:lin ang="5400000" scaled="0"/>
+            </a:gradFill>
+            <a:ln w="9525" cap="flat" cmpd="sng" algn="ctr">
+              <a:solidFill>
+                <a:schemeClr val="accent1">
+                  <a:shade val="95000"/>
+                </a:schemeClr>
+              </a:solidFill>
+              <a:round/>
+            </a:ln>
+            <a:effectLst/>
+          </c:spPr>
+          <c:invertIfNegative val="0"/>
+          <c:cat>
+            <c:strRef>
+              <c:f>Foglio1!$A$2:$A$16</c:f>
+              <c:strCache>
+                <c:ptCount val="15"/>
+                <c:pt idx="0">
+                  <c:v>Naming Conventions</c:v>
+                </c:pt>
+                <c:pt idx="1">
+                  <c:v>Identions</c:v>
+                </c:pt>
+                <c:pt idx="2">
+                  <c:v>Braces</c:v>
+                </c:pt>
+                <c:pt idx="3">
+                  <c:v>Files Organization</c:v>
+                </c:pt>
+                <c:pt idx="4">
+                  <c:v>Wrapping Lines</c:v>
+                </c:pt>
+                <c:pt idx="5">
+                  <c:v>Comments </c:v>
+                </c:pt>
+                <c:pt idx="6">
+                  <c:v>Initialization and Declarations</c:v>
+                </c:pt>
+                <c:pt idx="7">
+                  <c:v>Method Calls</c:v>
+                </c:pt>
+                <c:pt idx="8">
+                  <c:v>Array</c:v>
+                </c:pt>
+                <c:pt idx="9">
+                  <c:v>Object Comparisons</c:v>
+                </c:pt>
+                <c:pt idx="10">
+                  <c:v>Output Format</c:v>
+                </c:pt>
+                <c:pt idx="11">
+                  <c:v>Computation, Comparisons and Assignments</c:v>
+                </c:pt>
+                <c:pt idx="12">
+                  <c:v>Exceptions </c:v>
+                </c:pt>
+                <c:pt idx="13">
+                  <c:v>Flow of control</c:v>
+                </c:pt>
+                <c:pt idx="14">
+                  <c:v>Files</c:v>
+                </c:pt>
+              </c:strCache>
+            </c:strRef>
+          </c:cat>
+          <c:val>
+            <c:numRef>
+              <c:f>Foglio1!$B$2:$B$16</c:f>
+              <c:numCache>
+                <c:formatCode>General</c:formatCode>
+                <c:ptCount val="15"/>
+                <c:pt idx="0">
+                  <c:v>0</c:v>
+                </c:pt>
+                <c:pt idx="1">
+                  <c:v>0</c:v>
+                </c:pt>
+                <c:pt idx="2">
+                  <c:v>0</c:v>
+                </c:pt>
+                <c:pt idx="3">
+                  <c:v>2</c:v>
+                </c:pt>
+                <c:pt idx="4">
+                  <c:v>1</c:v>
+                </c:pt>
+                <c:pt idx="5">
+                  <c:v>1</c:v>
+                </c:pt>
+                <c:pt idx="6">
+                  <c:v>0</c:v>
+                </c:pt>
+                <c:pt idx="7">
+                  <c:v>0</c:v>
+                </c:pt>
+                <c:pt idx="8">
+                  <c:v>0</c:v>
+                </c:pt>
+                <c:pt idx="9">
+                  <c:v>0</c:v>
+                </c:pt>
+                <c:pt idx="10">
+                  <c:v>0</c:v>
+                </c:pt>
+                <c:pt idx="11">
+                  <c:v>1</c:v>
+                </c:pt>
+                <c:pt idx="12">
+                  <c:v>0</c:v>
+                </c:pt>
+                <c:pt idx="13">
+                  <c:v>0</c:v>
+                </c:pt>
+                <c:pt idx="14">
+                  <c:v>0</c:v>
+                </c:pt>
+              </c:numCache>
+            </c:numRef>
+          </c:val>
+        </c:ser>
+        <c:ser>
+          <c:idx val="1"/>
+          <c:order val="1"/>
+          <c:tx>
+            <c:strRef>
+              <c:f>Foglio1!$C$1</c:f>
+              <c:strCache>
+                <c:ptCount val="1"/>
+                <c:pt idx="0">
+                  <c:v>execute()</c:v>
+                </c:pt>
+              </c:strCache>
+            </c:strRef>
+          </c:tx>
+          <c:spPr>
+            <a:gradFill rotWithShape="1">
+              <a:gsLst>
+                <a:gs pos="0">
+                  <a:schemeClr val="accent2">
+                    <a:lumMod val="110000"/>
+                    <a:satMod val="105000"/>
+                    <a:tint val="67000"/>
+                  </a:schemeClr>
+                </a:gs>
+                <a:gs pos="50000">
+                  <a:schemeClr val="accent2">
+                    <a:lumMod val="105000"/>
+                    <a:satMod val="103000"/>
+                    <a:tint val="73000"/>
+                  </a:schemeClr>
+                </a:gs>
+                <a:gs pos="100000">
+                  <a:schemeClr val="accent2">
+                    <a:lumMod val="105000"/>
+                    <a:satMod val="109000"/>
+                    <a:tint val="81000"/>
+                  </a:schemeClr>
+                </a:gs>
+              </a:gsLst>
+              <a:lin ang="5400000" scaled="0"/>
+            </a:gradFill>
+            <a:ln w="9525" cap="flat" cmpd="sng" algn="ctr">
+              <a:solidFill>
+                <a:schemeClr val="accent2">
+                  <a:shade val="95000"/>
+                </a:schemeClr>
+              </a:solidFill>
+              <a:round/>
+            </a:ln>
+            <a:effectLst/>
+          </c:spPr>
+          <c:invertIfNegative val="0"/>
+          <c:cat>
+            <c:strRef>
+              <c:f>Foglio1!$A$2:$A$16</c:f>
+              <c:strCache>
+                <c:ptCount val="15"/>
+                <c:pt idx="0">
+                  <c:v>Naming Conventions</c:v>
+                </c:pt>
+                <c:pt idx="1">
+                  <c:v>Identions</c:v>
+                </c:pt>
+                <c:pt idx="2">
+                  <c:v>Braces</c:v>
+                </c:pt>
+                <c:pt idx="3">
+                  <c:v>Files Organization</c:v>
+                </c:pt>
+                <c:pt idx="4">
+                  <c:v>Wrapping Lines</c:v>
+                </c:pt>
+                <c:pt idx="5">
+                  <c:v>Comments </c:v>
+                </c:pt>
+                <c:pt idx="6">
+                  <c:v>Initialization and Declarations</c:v>
+                </c:pt>
+                <c:pt idx="7">
+                  <c:v>Method Calls</c:v>
+                </c:pt>
+                <c:pt idx="8">
+                  <c:v>Array</c:v>
+                </c:pt>
+                <c:pt idx="9">
+                  <c:v>Object Comparisons</c:v>
+                </c:pt>
+                <c:pt idx="10">
+                  <c:v>Output Format</c:v>
+                </c:pt>
+                <c:pt idx="11">
+                  <c:v>Computation, Comparisons and Assignments</c:v>
+                </c:pt>
+                <c:pt idx="12">
+                  <c:v>Exceptions </c:v>
+                </c:pt>
+                <c:pt idx="13">
+                  <c:v>Flow of control</c:v>
+                </c:pt>
+                <c:pt idx="14">
+                  <c:v>Files</c:v>
+                </c:pt>
+              </c:strCache>
+            </c:strRef>
+          </c:cat>
+          <c:val>
+            <c:numRef>
+              <c:f>Foglio1!$C$2:$C$16</c:f>
+              <c:numCache>
+                <c:formatCode>General</c:formatCode>
+                <c:ptCount val="15"/>
+                <c:pt idx="0">
+                  <c:v>0</c:v>
+                </c:pt>
+                <c:pt idx="1">
+                  <c:v>0</c:v>
+                </c:pt>
+                <c:pt idx="2">
+                  <c:v>0</c:v>
+                </c:pt>
+                <c:pt idx="3">
+                  <c:v>3</c:v>
+                </c:pt>
+                <c:pt idx="4">
+                  <c:v>0</c:v>
+                </c:pt>
+                <c:pt idx="5">
+                  <c:v>1</c:v>
+                </c:pt>
+                <c:pt idx="6">
+                  <c:v>0</c:v>
+                </c:pt>
+                <c:pt idx="7">
+                  <c:v>0</c:v>
+                </c:pt>
+                <c:pt idx="8">
+                  <c:v>0</c:v>
+                </c:pt>
+                <c:pt idx="9">
+                  <c:v>0</c:v>
+                </c:pt>
+                <c:pt idx="10">
+                  <c:v>0</c:v>
+                </c:pt>
+                <c:pt idx="11">
+                  <c:v>0</c:v>
+                </c:pt>
+                <c:pt idx="12">
+                  <c:v>0</c:v>
+                </c:pt>
+                <c:pt idx="13">
+                  <c:v>0</c:v>
+                </c:pt>
+                <c:pt idx="14">
+                  <c:v>0</c:v>
+                </c:pt>
+              </c:numCache>
+            </c:numRef>
+          </c:val>
+        </c:ser>
+        <c:ser>
+          <c:idx val="2"/>
+          <c:order val="2"/>
+          <c:tx>
+            <c:strRef>
+              <c:f>Foglio1!$D$1</c:f>
+              <c:strCache>
+                <c:ptCount val="1"/>
+                <c:pt idx="0">
+                  <c:v>Total Issues</c:v>
+                </c:pt>
+              </c:strCache>
+            </c:strRef>
+          </c:tx>
+          <c:spPr>
+            <a:gradFill rotWithShape="1">
+              <a:gsLst>
+                <a:gs pos="0">
+                  <a:schemeClr val="accent3">
+                    <a:lumMod val="110000"/>
+                    <a:satMod val="105000"/>
+                    <a:tint val="67000"/>
+                  </a:schemeClr>
+                </a:gs>
+                <a:gs pos="50000">
+                  <a:schemeClr val="accent3">
+                    <a:lumMod val="105000"/>
+                    <a:satMod val="103000"/>
+                    <a:tint val="73000"/>
+                  </a:schemeClr>
+                </a:gs>
+                <a:gs pos="100000">
+                  <a:schemeClr val="accent3">
+                    <a:lumMod val="105000"/>
+                    <a:satMod val="109000"/>
+                    <a:tint val="81000"/>
+                  </a:schemeClr>
+                </a:gs>
+              </a:gsLst>
+              <a:lin ang="5400000" scaled="0"/>
+            </a:gradFill>
+            <a:ln w="9525" cap="flat" cmpd="sng" algn="ctr">
+              <a:solidFill>
+                <a:schemeClr val="accent3">
+                  <a:shade val="95000"/>
+                </a:schemeClr>
+              </a:solidFill>
+              <a:round/>
+            </a:ln>
+            <a:effectLst/>
+          </c:spPr>
+          <c:invertIfNegative val="0"/>
+          <c:cat>
+            <c:strRef>
+              <c:f>Foglio1!$A$2:$A$16</c:f>
+              <c:strCache>
+                <c:ptCount val="15"/>
+                <c:pt idx="0">
+                  <c:v>Naming Conventions</c:v>
+                </c:pt>
+                <c:pt idx="1">
+                  <c:v>Identions</c:v>
+                </c:pt>
+                <c:pt idx="2">
+                  <c:v>Braces</c:v>
+                </c:pt>
+                <c:pt idx="3">
+                  <c:v>Files Organization</c:v>
+                </c:pt>
+                <c:pt idx="4">
+                  <c:v>Wrapping Lines</c:v>
+                </c:pt>
+                <c:pt idx="5">
+                  <c:v>Comments </c:v>
+                </c:pt>
+                <c:pt idx="6">
+                  <c:v>Initialization and Declarations</c:v>
+                </c:pt>
+                <c:pt idx="7">
+                  <c:v>Method Calls</c:v>
+                </c:pt>
+                <c:pt idx="8">
+                  <c:v>Array</c:v>
+                </c:pt>
+                <c:pt idx="9">
+                  <c:v>Object Comparisons</c:v>
+                </c:pt>
+                <c:pt idx="10">
+                  <c:v>Output Format</c:v>
+                </c:pt>
+                <c:pt idx="11">
+                  <c:v>Computation, Comparisons and Assignments</c:v>
+                </c:pt>
+                <c:pt idx="12">
+                  <c:v>Exceptions </c:v>
+                </c:pt>
+                <c:pt idx="13">
+                  <c:v>Flow of control</c:v>
+                </c:pt>
+                <c:pt idx="14">
+                  <c:v>Files</c:v>
+                </c:pt>
+              </c:strCache>
+            </c:strRef>
+          </c:cat>
+          <c:val>
+            <c:numRef>
+              <c:f>Foglio1!$D$2:$D$16</c:f>
+              <c:numCache>
+                <c:formatCode>General</c:formatCode>
+                <c:ptCount val="15"/>
+                <c:pt idx="0">
+                  <c:v>0</c:v>
+                </c:pt>
+                <c:pt idx="1">
+                  <c:v>0</c:v>
+                </c:pt>
+                <c:pt idx="2">
+                  <c:v>0</c:v>
+                </c:pt>
+                <c:pt idx="3">
+                  <c:v>5</c:v>
+                </c:pt>
+                <c:pt idx="4">
+                  <c:v>1</c:v>
+                </c:pt>
+                <c:pt idx="5">
+                  <c:v>2</c:v>
+                </c:pt>
+                <c:pt idx="6">
+                  <c:v>0</c:v>
+                </c:pt>
+                <c:pt idx="7">
+                  <c:v>0</c:v>
+                </c:pt>
+                <c:pt idx="8">
+                  <c:v>0</c:v>
+                </c:pt>
+                <c:pt idx="9">
+                  <c:v>0</c:v>
+                </c:pt>
+                <c:pt idx="10">
+                  <c:v>0</c:v>
+                </c:pt>
+                <c:pt idx="11">
+                  <c:v>1</c:v>
+                </c:pt>
+                <c:pt idx="12">
+                  <c:v>0</c:v>
+                </c:pt>
+                <c:pt idx="13">
+                  <c:v>0</c:v>
+                </c:pt>
+                <c:pt idx="14">
+                  <c:v>0</c:v>
+                </c:pt>
+              </c:numCache>
+            </c:numRef>
+          </c:val>
+        </c:ser>
+        <c:dLbls>
+          <c:showLegendKey val="0"/>
+          <c:showVal val="0"/>
+          <c:showCatName val="0"/>
+          <c:showSerName val="0"/>
+          <c:showPercent val="0"/>
+          <c:showBubbleSize val="0"/>
+        </c:dLbls>
+        <c:gapWidth val="100"/>
+        <c:axId val="453147416"/>
+        <c:axId val="453147808"/>
+      </c:barChart>
+      <c:catAx>
+        <c:axId val="453147416"/>
+        <c:scaling>
+          <c:orientation val="minMax"/>
+        </c:scaling>
+        <c:delete val="0"/>
+        <c:axPos val="l"/>
+        <c:numFmt formatCode="General" sourceLinked="1"/>
+        <c:majorTickMark val="none"/>
+        <c:minorTickMark val="none"/>
+        <c:tickLblPos val="nextTo"/>
+        <c:spPr>
+          <a:noFill/>
+          <a:ln w="9525" cap="flat" cmpd="sng" algn="ctr">
+            <a:solidFill>
+              <a:schemeClr val="tx1">
+                <a:lumMod val="15000"/>
+                <a:lumOff val="85000"/>
+              </a:schemeClr>
+            </a:solidFill>
+            <a:round/>
+          </a:ln>
+          <a:effectLst/>
+        </c:spPr>
+        <c:txPr>
+          <a:bodyPr rot="-60000000" spcFirstLastPara="1" vertOverflow="ellipsis" vert="horz" wrap="square" anchor="ctr" anchorCtr="1"/>
+          <a:lstStyle/>
+          <a:p>
+            <a:pPr>
+              <a:defRPr sz="900" b="0" i="0" u="none" strike="noStrike" kern="1200" baseline="0">
+                <a:solidFill>
+                  <a:schemeClr val="tx1">
+                    <a:lumMod val="50000"/>
+                    <a:lumOff val="50000"/>
+                  </a:schemeClr>
+                </a:solidFill>
+                <a:latin typeface="+mn-lt"/>
+                <a:ea typeface="+mn-ea"/>
+                <a:cs typeface="+mn-cs"/>
+              </a:defRPr>
+            </a:pPr>
+            <a:endParaRPr lang="en-US"/>
+          </a:p>
+        </c:txPr>
+        <c:crossAx val="453147808"/>
+        <c:crosses val="autoZero"/>
+        <c:auto val="1"/>
+        <c:lblAlgn val="ctr"/>
+        <c:lblOffset val="100"/>
+        <c:noMultiLvlLbl val="0"/>
+      </c:catAx>
+      <c:valAx>
+        <c:axId val="453147808"/>
+        <c:scaling>
+          <c:orientation val="minMax"/>
+        </c:scaling>
+        <c:delete val="0"/>
+        <c:axPos val="b"/>
+        <c:majorGridlines>
+          <c:spPr>
+            <a:ln w="9525" cap="flat" cmpd="sng" algn="ctr">
+              <a:solidFill>
+                <a:schemeClr val="tx1">
+                  <a:lumMod val="15000"/>
+                  <a:lumOff val="85000"/>
+                </a:schemeClr>
+              </a:solidFill>
+              <a:round/>
+            </a:ln>
+            <a:effectLst/>
+          </c:spPr>
+        </c:majorGridlines>
+        <c:numFmt formatCode="General" sourceLinked="1"/>
+        <c:majorTickMark val="none"/>
+        <c:minorTickMark val="none"/>
+        <c:tickLblPos val="nextTo"/>
+        <c:spPr>
+          <a:noFill/>
+          <a:ln>
+            <a:noFill/>
+          </a:ln>
+          <a:effectLst/>
+        </c:spPr>
+        <c:txPr>
+          <a:bodyPr rot="-60000000" spcFirstLastPara="1" vertOverflow="ellipsis" vert="horz" wrap="square" anchor="ctr" anchorCtr="1"/>
+          <a:lstStyle/>
+          <a:p>
+            <a:pPr>
+              <a:defRPr sz="900" b="0" i="0" u="none" strike="noStrike" kern="1200" baseline="0">
+                <a:solidFill>
+                  <a:schemeClr val="tx1">
+                    <a:lumMod val="50000"/>
+                    <a:lumOff val="50000"/>
+                  </a:schemeClr>
+                </a:solidFill>
+                <a:latin typeface="+mn-lt"/>
+                <a:ea typeface="+mn-ea"/>
+                <a:cs typeface="+mn-cs"/>
+              </a:defRPr>
+            </a:pPr>
+            <a:endParaRPr lang="en-US"/>
+          </a:p>
+        </c:txPr>
+        <c:crossAx val="453147416"/>
+        <c:crosses val="autoZero"/>
+        <c:crossBetween val="between"/>
+      </c:valAx>
+      <c:spPr>
+        <a:noFill/>
+        <a:ln>
+          <a:noFill/>
+        </a:ln>
+        <a:effectLst/>
+      </c:spPr>
+    </c:plotArea>
+    <c:legend>
+      <c:legendPos val="b"/>
+      <c:layout/>
+      <c:overlay val="0"/>
+      <c:spPr>
+        <a:noFill/>
+        <a:ln>
+          <a:noFill/>
+        </a:ln>
+        <a:effectLst/>
+      </c:spPr>
+      <c:txPr>
+        <a:bodyPr rot="0" spcFirstLastPara="1" vertOverflow="ellipsis" vert="horz" wrap="square" anchor="ctr" anchorCtr="1"/>
+        <a:lstStyle/>
+        <a:p>
+          <a:pPr>
+            <a:defRPr sz="900" b="0" i="0" u="none" strike="noStrike" kern="1200" baseline="0">
+              <a:solidFill>
+                <a:schemeClr val="tx1">
+                  <a:lumMod val="50000"/>
+                  <a:lumOff val="50000"/>
+                </a:schemeClr>
+              </a:solidFill>
+              <a:latin typeface="+mn-lt"/>
+              <a:ea typeface="+mn-ea"/>
+              <a:cs typeface="+mn-cs"/>
+            </a:defRPr>
+          </a:pPr>
+          <a:endParaRPr lang="en-US"/>
+        </a:p>
+      </c:txPr>
+    </c:legend>
+    <c:plotVisOnly val="1"/>
+    <c:dispBlanksAs val="gap"/>
+    <c:showDLblsOverMax val="0"/>
+  </c:chart>
+  <c:spPr>
+    <a:noFill/>
+    <a:ln>
+      <a:noFill/>
+    </a:ln>
+    <a:effectLst/>
+  </c:spPr>
+  <c:txPr>
+    <a:bodyPr/>
+    <a:lstStyle/>
+    <a:p>
+      <a:pPr>
+        <a:defRPr/>
+      </a:pPr>
+      <a:endParaRPr lang="en-US"/>
+    </a:p>
+  </c:txPr>
+  <c:externalData r:id="rId3">
+    <c:autoUpdate val="0"/>
+  </c:externalData>
+</c:chartSpace>
+</file>
+
+<file path=ppt/charts/colors1.xml><?xml version="1.0" encoding="utf-8"?>
+<cs:colorStyle xmlns:cs="http://schemas.microsoft.com/office/drawing/2012/chartStyle" xmlns:a="http://schemas.openxmlformats.org/drawingml/2006/main" meth="cycle" id="10">
+  <a:schemeClr val="accent1"/>
+  <a:schemeClr val="accent2"/>
+  <a:schemeClr val="accent3"/>
+  <a:schemeClr val="accent4"/>
+  <a:schemeClr val="accent5"/>
+  <a:schemeClr val="accent6"/>
+  <cs:variation/>
+  <cs:variation>
+    <a:lumMod val="60000"/>
+  </cs:variation>
+  <cs:variation>
+    <a:lumMod val="80000"/>
+    <a:lumOff val="20000"/>
+  </cs:variation>
+  <cs:variation>
+    <a:lumMod val="80000"/>
+  </cs:variation>
+  <cs:variation>
+    <a:lumMod val="60000"/>
+    <a:lumOff val="40000"/>
+  </cs:variation>
+  <cs:variation>
+    <a:lumMod val="50000"/>
+  </cs:variation>
+  <cs:variation>
+    <a:lumMod val="70000"/>
+    <a:lumOff val="30000"/>
+  </cs:variation>
+  <cs:variation>
+    <a:lumMod val="70000"/>
+  </cs:variation>
+  <cs:variation>
+    <a:lumMod val="50000"/>
+    <a:lumOff val="50000"/>
+  </cs:variation>
+</cs:colorStyle>
+</file>
+
+<file path=ppt/charts/style1.xml><?xml version="1.0" encoding="utf-8"?>
+<cs:chartStyle xmlns:cs="http://schemas.microsoft.com/office/drawing/2012/chartStyle" xmlns:a="http://schemas.openxmlformats.org/drawingml/2006/main" id="219">
+  <cs:axisTitle>
+    <cs:lnRef idx="0"/>
+    <cs:fillRef idx="0"/>
+    <cs:effectRef idx="0"/>
+    <cs:fontRef idx="minor">
+      <a:schemeClr val="tx1">
+        <a:lumMod val="50000"/>
+        <a:lumOff val="50000"/>
+      </a:schemeClr>
+    </cs:fontRef>
+    <cs:defRPr sz="900" kern="1200" cap="all"/>
+  </cs:axisTitle>
+  <cs:categoryAxis>
+    <cs:lnRef idx="0"/>
+    <cs:fillRef idx="0"/>
+    <cs:effectRef idx="0"/>
+    <cs:fontRef idx="minor">
+      <a:schemeClr val="tx1">
+        <a:lumMod val="50000"/>
+        <a:lumOff val="50000"/>
+      </a:schemeClr>
+    </cs:fontRef>
+    <cs:spPr>
+      <a:ln w="9525" cap="flat" cmpd="sng" algn="ctr">
+        <a:solidFill>
+          <a:schemeClr val="tx1">
+            <a:lumMod val="15000"/>
+            <a:lumOff val="85000"/>
+          </a:schemeClr>
+        </a:solidFill>
+        <a:round/>
+      </a:ln>
+    </cs:spPr>
+    <cs:defRPr sz="900" kern="1200"/>
+  </cs:categoryAxis>
+  <cs:chartArea mods="allowNoFillOverride allowNoLineOverride">
+    <cs:lnRef idx="0"/>
+    <cs:fillRef idx="0"/>
+    <cs:effectRef idx="0"/>
+    <cs:fontRef idx="minor">
+      <a:schemeClr val="dk1"/>
+    </cs:fontRef>
+    <cs:spPr>
+      <a:solidFill>
+        <a:schemeClr val="bg1"/>
+      </a:solidFill>
+      <a:ln w="9525" cap="flat" cmpd="sng" algn="ctr">
+        <a:solidFill>
+          <a:schemeClr val="tx1">
+            <a:lumMod val="15000"/>
+            <a:lumOff val="85000"/>
+          </a:schemeClr>
+        </a:solidFill>
+        <a:round/>
+      </a:ln>
+    </cs:spPr>
+    <cs:defRPr sz="900" kern="1200"/>
+  </cs:chartArea>
+  <cs:dataLabel>
+    <cs:lnRef idx="0"/>
+    <cs:fillRef idx="0"/>
+    <cs:effectRef idx="0"/>
+    <cs:fontRef idx="minor">
+      <a:schemeClr val="tx1">
+        <a:lumMod val="50000"/>
+        <a:lumOff val="50000"/>
+      </a:schemeClr>
+    </cs:fontRef>
+    <cs:defRPr sz="900" kern="1200"/>
+  </cs:dataLabel>
+  <cs:dataLabelCallout>
+    <cs:lnRef idx="0"/>
+    <cs:fillRef idx="0"/>
+    <cs:effectRef idx="0"/>
+    <cs:fontRef idx="minor">
+      <a:schemeClr val="dk1">
+        <a:lumMod val="65000"/>
+        <a:lumOff val="35000"/>
+      </a:schemeClr>
+    </cs:fontRef>
+    <cs:spPr>
+      <a:solidFill>
+        <a:schemeClr val="lt1"/>
+      </a:solidFill>
+      <a:ln>
+        <a:solidFill>
+          <a:schemeClr val="dk1">
+            <a:lumMod val="25000"/>
+            <a:lumOff val="75000"/>
+          </a:schemeClr>
+        </a:solidFill>
+      </a:ln>
+    </cs:spPr>
+    <cs:defRPr sz="900" kern="1200"/>
+    <cs:bodyPr rot="0" spcFirstLastPara="1" vertOverflow="clip" horzOverflow="clip" vert="horz" wrap="square" lIns="36576" tIns="18288" rIns="36576" bIns="18288" anchor="ctr" anchorCtr="1">
+      <a:spAutoFit/>
+    </cs:bodyPr>
+  </cs:dataLabelCallout>
+  <cs:dataPoint>
+    <cs:lnRef idx="0">
+      <cs:styleClr val="auto"/>
+    </cs:lnRef>
+    <cs:fillRef idx="2">
+      <cs:styleClr val="auto"/>
+    </cs:fillRef>
+    <cs:effectRef idx="1"/>
+    <cs:fontRef idx="minor">
+      <a:schemeClr val="dk1"/>
+    </cs:fontRef>
+    <cs:spPr>
+      <a:ln w="9525" cap="flat" cmpd="sng" algn="ctr">
+        <a:solidFill>
+          <a:schemeClr val="phClr">
+            <a:shade val="95000"/>
+          </a:schemeClr>
+        </a:solidFill>
+        <a:round/>
+      </a:ln>
+    </cs:spPr>
+  </cs:dataPoint>
+  <cs:dataPoint3D>
+    <cs:lnRef idx="0">
+      <cs:styleClr val="auto"/>
+    </cs:lnRef>
+    <cs:fillRef idx="2">
+      <cs:styleClr val="auto"/>
+    </cs:fillRef>
+    <cs:effectRef idx="1"/>
+    <cs:fontRef idx="minor">
+      <a:schemeClr val="dk1"/>
+    </cs:fontRef>
+    <cs:spPr>
+      <a:ln w="9525" cap="flat" cmpd="sng" algn="ctr">
+        <a:solidFill>
+          <a:schemeClr val="phClr">
+            <a:shade val="95000"/>
+          </a:schemeClr>
+        </a:solidFill>
+        <a:round/>
+      </a:ln>
+    </cs:spPr>
+  </cs:dataPoint3D>
+  <cs:dataPointLine>
+    <cs:lnRef idx="0">
+      <cs:styleClr val="auto"/>
+    </cs:lnRef>
+    <cs:fillRef idx="2">
+      <cs:styleClr val="auto"/>
+    </cs:fillRef>
+    <cs:effectRef idx="1"/>
+    <cs:fontRef idx="minor">
+      <a:schemeClr val="dk1"/>
+    </cs:fontRef>
+    <cs:spPr>
+      <a:ln w="15875" cap="rnd">
+        <a:solidFill>
+          <a:schemeClr val="phClr"/>
+        </a:solidFill>
+        <a:round/>
+      </a:ln>
+    </cs:spPr>
+  </cs:dataPointLine>
+  <cs:dataPointMarker>
+    <cs:lnRef idx="0">
+      <cs:styleClr val="auto"/>
+    </cs:lnRef>
+    <cs:fillRef idx="2">
+      <cs:styleClr val="auto"/>
+    </cs:fillRef>
+    <cs:effectRef idx="1"/>
+    <cs:fontRef idx="minor">
+      <a:schemeClr val="dk1"/>
+    </cs:fontRef>
+    <cs:spPr>
+      <a:ln w="9525" cap="flat" cmpd="sng" algn="ctr">
+        <a:solidFill>
+          <a:schemeClr val="phClr">
+            <a:shade val="95000"/>
+          </a:schemeClr>
+        </a:solidFill>
+        <a:round/>
+      </a:ln>
+    </cs:spPr>
+  </cs:dataPointMarker>
+  <cs:dataPointMarkerLayout symbol="circle" size="4"/>
+  <cs:dataPointWireframe>
+    <cs:lnRef idx="0">
+      <cs:styleClr val="auto"/>
+    </cs:lnRef>
+    <cs:fillRef idx="2"/>
+    <cs:effectRef idx="0"/>
+    <cs:fontRef idx="minor">
+      <a:schemeClr val="dk1"/>
+    </cs:fontRef>
+    <cs:spPr>
+      <a:ln w="9525" cap="rnd">
+        <a:solidFill>
+          <a:schemeClr val="phClr"/>
+        </a:solidFill>
+        <a:round/>
+      </a:ln>
+    </cs:spPr>
+  </cs:dataPointWireframe>
+  <cs:dataTable>
+    <cs:lnRef idx="0"/>
+    <cs:fillRef idx="0"/>
+    <cs:effectRef idx="0"/>
+    <cs:fontRef idx="minor">
+      <a:schemeClr val="tx1">
+        <a:lumMod val="50000"/>
+        <a:lumOff val="50000"/>
+      </a:schemeClr>
+    </cs:fontRef>
+    <cs:spPr>
+      <a:ln w="9525">
+        <a:solidFill>
+          <a:schemeClr val="tx1">
+            <a:lumMod val="15000"/>
+            <a:lumOff val="85000"/>
+          </a:schemeClr>
+        </a:solidFill>
+      </a:ln>
+    </cs:spPr>
+    <cs:defRPr sz="900" kern="1200"/>
+  </cs:dataTable>
+  <cs:downBar>
+    <cs:lnRef idx="0"/>
+    <cs:fillRef idx="0"/>
+    <cs:effectRef idx="0"/>
+    <cs:fontRef idx="minor">
+      <a:schemeClr val="dk1"/>
+    </cs:fontRef>
+    <cs:spPr>
+      <a:solidFill>
+        <a:schemeClr val="dk1">
+          <a:lumMod val="75000"/>
+          <a:lumOff val="25000"/>
+        </a:schemeClr>
+      </a:solidFill>
+      <a:ln w="9525">
+        <a:solidFill>
+          <a:schemeClr val="tx1">
+            <a:lumMod val="50000"/>
+            <a:lumOff val="50000"/>
+          </a:schemeClr>
+        </a:solidFill>
+      </a:ln>
+    </cs:spPr>
+  </cs:downBar>
+  <cs:dropLine>
+    <cs:lnRef idx="0"/>
+    <cs:fillRef idx="0"/>
+    <cs:effectRef idx="0"/>
+    <cs:fontRef idx="minor">
+      <a:schemeClr val="dk1"/>
+    </cs:fontRef>
+    <cs:spPr>
+      <a:ln w="9525">
+        <a:solidFill>
+          <a:schemeClr val="tx1">
+            <a:lumMod val="35000"/>
+            <a:lumOff val="65000"/>
+          </a:schemeClr>
+        </a:solidFill>
+        <a:prstDash val="dash"/>
+      </a:ln>
+    </cs:spPr>
+  </cs:dropLine>
+  <cs:errorBar>
+    <cs:lnRef idx="0"/>
+    <cs:fillRef idx="0"/>
+    <cs:effectRef idx="0"/>
+    <cs:fontRef idx="minor">
+      <a:schemeClr val="dk1"/>
+    </cs:fontRef>
+    <cs:spPr>
+      <a:ln w="9525">
+        <a:solidFill>
+          <a:schemeClr val="tx1">
+            <a:lumMod val="50000"/>
+            <a:lumOff val="50000"/>
+          </a:schemeClr>
+        </a:solidFill>
+      </a:ln>
+    </cs:spPr>
+  </cs:errorBar>
+  <cs:floor>
+    <cs:lnRef idx="0"/>
+    <cs:fillRef idx="0"/>
+    <cs:effectRef idx="0"/>
+    <cs:fontRef idx="minor">
+      <a:schemeClr val="dk1"/>
+    </cs:fontRef>
+  </cs:floor>
+  <cs:gridlineMajor>
+    <cs:lnRef idx="0"/>
+    <cs:fillRef idx="0"/>
+    <cs:effectRef idx="0"/>
+    <cs:fontRef idx="minor">
+      <a:schemeClr val="dk1"/>
+    </cs:fontRef>
+    <cs:spPr>
+      <a:ln w="9525" cap="flat" cmpd="sng" algn="ctr">
+        <a:solidFill>
+          <a:schemeClr val="tx1">
+            <a:lumMod val="15000"/>
+            <a:lumOff val="85000"/>
+          </a:schemeClr>
+        </a:solidFill>
+        <a:round/>
+      </a:ln>
+    </cs:spPr>
+  </cs:gridlineMajor>
+  <cs:gridlineMinor>
+    <cs:lnRef idx="0"/>
+    <cs:fillRef idx="0"/>
+    <cs:effectRef idx="0"/>
+    <cs:fontRef idx="minor">
+      <a:schemeClr val="dk1"/>
+    </cs:fontRef>
+    <cs:spPr>
+      <a:ln>
+        <a:solidFill>
+          <a:schemeClr val="tx1">
+            <a:lumMod val="5000"/>
+            <a:lumOff val="95000"/>
+          </a:schemeClr>
+        </a:solidFill>
+      </a:ln>
+    </cs:spPr>
+  </cs:gridlineMinor>
+  <cs:hiLoLine>
+    <cs:lnRef idx="0"/>
+    <cs:fillRef idx="0"/>
+    <cs:effectRef idx="0"/>
+    <cs:fontRef idx="minor">
+      <a:schemeClr val="dk1"/>
+    </cs:fontRef>
+    <cs:spPr>
+      <a:ln w="9525">
+        <a:solidFill>
+          <a:schemeClr val="tx1">
+            <a:lumMod val="50000"/>
+            <a:lumOff val="50000"/>
+          </a:schemeClr>
+        </a:solidFill>
+        <a:prstDash val="dash"/>
+      </a:ln>
+    </cs:spPr>
+  </cs:hiLoLine>
+  <cs:leaderLine>
+    <cs:lnRef idx="0"/>
+    <cs:fillRef idx="0"/>
+    <cs:effectRef idx="0"/>
+    <cs:fontRef idx="minor">
+      <a:schemeClr val="dk1"/>
+    </cs:fontRef>
+    <cs:spPr>
+      <a:ln w="9525">
+        <a:solidFill>
+          <a:schemeClr val="tx1">
+            <a:lumMod val="35000"/>
+            <a:lumOff val="65000"/>
+          </a:schemeClr>
+        </a:solidFill>
+      </a:ln>
+    </cs:spPr>
+  </cs:leaderLine>
+  <cs:legend>
+    <cs:lnRef idx="0"/>
+    <cs:fillRef idx="0"/>
+    <cs:effectRef idx="0"/>
+    <cs:fontRef idx="minor">
+      <a:schemeClr val="tx1">
+        <a:lumMod val="50000"/>
+        <a:lumOff val="50000"/>
+      </a:schemeClr>
+    </cs:fontRef>
+    <cs:defRPr sz="900" kern="1200"/>
+  </cs:legend>
+  <cs:plotArea mods="allowNoFillOverride allowNoLineOverride">
+    <cs:lnRef idx="0"/>
+    <cs:fillRef idx="0"/>
+    <cs:effectRef idx="0"/>
+    <cs:fontRef idx="minor">
+      <a:schemeClr val="dk1"/>
+    </cs:fontRef>
+  </cs:plotArea>
+  <cs:plotArea3D mods="allowNoFillOverride allowNoLineOverride">
+    <cs:lnRef idx="0"/>
+    <cs:fillRef idx="0"/>
+    <cs:effectRef idx="0"/>
+    <cs:fontRef idx="minor">
+      <a:schemeClr val="dk1"/>
+    </cs:fontRef>
+  </cs:plotArea3D>
+  <cs:seriesAxis>
+    <cs:lnRef idx="0"/>
+    <cs:fillRef idx="0"/>
+    <cs:effectRef idx="0"/>
+    <cs:fontRef idx="minor">
+      <a:schemeClr val="tx1">
+        <a:lumMod val="50000"/>
+        <a:lumOff val="50000"/>
+      </a:schemeClr>
+    </cs:fontRef>
+    <cs:spPr>
+      <a:ln w="9525" cap="flat" cmpd="sng" algn="ctr">
+        <a:solidFill>
+          <a:schemeClr val="tx1">
+            <a:lumMod val="15000"/>
+            <a:lumOff val="85000"/>
+          </a:schemeClr>
+        </a:solidFill>
+        <a:round/>
+      </a:ln>
+    </cs:spPr>
+    <cs:defRPr sz="900" kern="1200"/>
+  </cs:seriesAxis>
+  <cs:seriesLine>
+    <cs:lnRef idx="0"/>
+    <cs:fillRef idx="0"/>
+    <cs:effectRef idx="0"/>
+    <cs:fontRef idx="minor">
+      <a:schemeClr val="dk1"/>
+    </cs:fontRef>
+    <cs:spPr>
+      <a:ln w="9525">
+        <a:solidFill>
+          <a:schemeClr val="tx1">
+            <a:lumMod val="35000"/>
+            <a:lumOff val="65000"/>
+          </a:schemeClr>
+        </a:solidFill>
+        <a:prstDash val="dash"/>
+      </a:ln>
+    </cs:spPr>
+  </cs:seriesLine>
+  <cs:title>
+    <cs:lnRef idx="0"/>
+    <cs:fillRef idx="0"/>
+    <cs:effectRef idx="0"/>
+    <cs:fontRef idx="minor">
+      <a:schemeClr val="tx1">
+        <a:lumMod val="50000"/>
+        <a:lumOff val="50000"/>
+      </a:schemeClr>
+    </cs:fontRef>
+    <cs:defRPr sz="1400" kern="1200" cap="none" spc="20" baseline="0"/>
+  </cs:title>
+  <cs:trendline>
+    <cs:lnRef idx="0">
+      <cs:styleClr val="auto"/>
+    </cs:lnRef>
+    <cs:fillRef idx="2"/>
+    <cs:effectRef idx="0"/>
+    <cs:fontRef idx="minor">
+      <a:schemeClr val="dk1"/>
+    </cs:fontRef>
+    <cs:spPr>
+      <a:ln w="9525" cap="rnd">
+        <a:solidFill>
+          <a:schemeClr val="phClr"/>
+        </a:solidFill>
+      </a:ln>
+    </cs:spPr>
+  </cs:trendline>
+  <cs:trendlineLabel>
+    <cs:lnRef idx="0"/>
+    <cs:fillRef idx="0"/>
+    <cs:effectRef idx="0"/>
+    <cs:fontRef idx="minor">
+      <a:schemeClr val="tx1">
+        <a:lumMod val="50000"/>
+        <a:lumOff val="50000"/>
+      </a:schemeClr>
+    </cs:fontRef>
+    <cs:defRPr sz="900" kern="1200"/>
+  </cs:trendlineLabel>
+  <cs:upBar>
+    <cs:lnRef idx="0"/>
+    <cs:fillRef idx="0"/>
+    <cs:effectRef idx="0"/>
+    <cs:fontRef idx="minor">
+      <a:schemeClr val="dk1"/>
+    </cs:fontRef>
+    <cs:spPr>
+      <a:solidFill>
+        <a:schemeClr val="lt1"/>
+      </a:solidFill>
+      <a:ln w="9525">
+        <a:solidFill>
+          <a:schemeClr val="tx1">
+            <a:lumMod val="50000"/>
+            <a:lumOff val="50000"/>
+          </a:schemeClr>
+        </a:solidFill>
+      </a:ln>
+    </cs:spPr>
+  </cs:upBar>
+  <cs:valueAxis>
+    <cs:lnRef idx="0"/>
+    <cs:fillRef idx="0"/>
+    <cs:effectRef idx="0"/>
+    <cs:fontRef idx="minor">
+      <a:schemeClr val="tx1">
+        <a:lumMod val="50000"/>
+        <a:lumOff val="50000"/>
+      </a:schemeClr>
+    </cs:fontRef>
+    <cs:defRPr sz="900" kern="1200"/>
+  </cs:valueAxis>
+  <cs:wall>
+    <cs:lnRef idx="0"/>
+    <cs:fillRef idx="0"/>
+    <cs:effectRef idx="0"/>
+    <cs:fontRef idx="minor">
+      <a:schemeClr val="dk1"/>
+    </cs:fontRef>
+  </cs:wall>
+</cs:chartStyle>
 </file>
 
 <file path=ppt/comments/comment1.xml><?xml version="1.0" encoding="utf-8"?>
@@ -14488,15 +15801,7 @@
                   <a:srgbClr val="003366"/>
                 </a:solidFill>
               </a:rPr>
-              <a:t>Our class: </a:t>
-            </a:r>
-            <a:r>
-              <a:rPr lang="en-US" sz="3000" b="0" i="1" dirty="0" err="1" smtClean="0">
-                <a:solidFill>
-                  <a:srgbClr val="003366"/>
-                </a:solidFill>
-              </a:rPr>
-              <a:t>listSubComponentsCommand</a:t>
+              <a:t>Some statistic of the class…</a:t>
             </a:r>
             <a:endParaRPr lang="en-US" sz="3000" b="0" i="1" dirty="0">
               <a:solidFill>
@@ -14518,8 +15823,8 @@
         </p:nvSpPr>
         <p:spPr>
           <a:xfrm>
-            <a:off x="314900" y="1129014"/>
-            <a:ext cx="8229600" cy="2634017"/>
+            <a:off x="314900" y="869734"/>
+            <a:ext cx="8229600" cy="2893297"/>
           </a:xfrm>
           <a:prstGeom prst="rect">
             <a:avLst/>
@@ -14531,8 +15836,12 @@
           </a:bodyPr>
           <a:lstStyle/>
           <a:p>
-            <a:pPr algn="just">
-              <a:buNone/>
+            <a:pPr marL="342900" indent="-342900" algn="just">
+              <a:lnSpc>
+                <a:spcPct val="150000"/>
+              </a:lnSpc>
+              <a:buFont typeface="Wingdings" panose="05000000000000000000" pitchFamily="2" charset="2"/>
+              <a:buChar char="v"/>
             </a:pPr>
             <a:r>
               <a:rPr lang="en-US" sz="2400" dirty="0" smtClean="0">
@@ -14542,9 +15851,245 @@
                   </a:schemeClr>
                 </a:solidFill>
               </a:rPr>
-              <a:t>THHIHI</a:t>
+              <a:t>Lines of Code [LoC</a:t>
             </a:r>
-            <a:endParaRPr lang="en-US" sz="2400" dirty="0">
+            <a:r>
+              <a:rPr lang="en-US" sz="2400" dirty="0">
+                <a:solidFill>
+                  <a:schemeClr val="accent1">
+                    <a:lumMod val="50000"/>
+                  </a:schemeClr>
+                </a:solidFill>
+              </a:rPr>
+              <a:t>]</a:t>
+            </a:r>
+            <a:r>
+              <a:rPr lang="en-US" sz="2400" dirty="0" smtClean="0">
+                <a:solidFill>
+                  <a:schemeClr val="accent1">
+                    <a:lumMod val="50000"/>
+                  </a:schemeClr>
+                </a:solidFill>
+              </a:rPr>
+              <a:t>: </a:t>
+            </a:r>
+            <a:r>
+              <a:rPr lang="en-US" sz="2400" b="1" dirty="0" smtClean="0">
+                <a:solidFill>
+                  <a:schemeClr val="accent1">
+                    <a:lumMod val="50000"/>
+                  </a:schemeClr>
+                </a:solidFill>
+              </a:rPr>
+              <a:t>409 lines</a:t>
+            </a:r>
+          </a:p>
+          <a:p>
+            <a:pPr marL="342900" indent="-342900" algn="just">
+              <a:lnSpc>
+                <a:spcPct val="150000"/>
+              </a:lnSpc>
+              <a:buFont typeface="Wingdings" panose="05000000000000000000" pitchFamily="2" charset="2"/>
+              <a:buChar char="v"/>
+            </a:pPr>
+            <a:r>
+              <a:rPr lang="en-US" sz="2400" i="1" dirty="0">
+                <a:solidFill>
+                  <a:schemeClr val="accent1">
+                    <a:lumMod val="50000"/>
+                  </a:schemeClr>
+                </a:solidFill>
+              </a:rPr>
+              <a:t>e</a:t>
+            </a:r>
+            <a:r>
+              <a:rPr lang="en-US" sz="2400" i="1" dirty="0" smtClean="0">
+                <a:solidFill>
+                  <a:schemeClr val="accent1">
+                    <a:lumMod val="50000"/>
+                  </a:schemeClr>
+                </a:solidFill>
+              </a:rPr>
+              <a:t>xecute() </a:t>
+            </a:r>
+            <a:r>
+              <a:rPr lang="en-US" sz="2400" dirty="0" smtClean="0">
+                <a:solidFill>
+                  <a:schemeClr val="accent1">
+                    <a:lumMod val="50000"/>
+                  </a:schemeClr>
+                </a:solidFill>
+              </a:rPr>
+              <a:t>method length: </a:t>
+            </a:r>
+            <a:r>
+              <a:rPr lang="en-US" sz="2400" b="1" dirty="0" smtClean="0">
+                <a:solidFill>
+                  <a:schemeClr val="accent1">
+                    <a:lumMod val="50000"/>
+                  </a:schemeClr>
+                </a:solidFill>
+              </a:rPr>
+              <a:t>139 lines</a:t>
+            </a:r>
+          </a:p>
+          <a:p>
+            <a:pPr marL="342900" indent="-342900" algn="just">
+              <a:lnSpc>
+                <a:spcPct val="150000"/>
+              </a:lnSpc>
+              <a:buFont typeface="Wingdings" panose="05000000000000000000" pitchFamily="2" charset="2"/>
+              <a:buChar char="v"/>
+            </a:pPr>
+            <a:r>
+              <a:rPr lang="en-US" sz="2400" i="1" dirty="0" smtClean="0">
+                <a:solidFill>
+                  <a:schemeClr val="accent1">
+                    <a:lumMod val="50000"/>
+                  </a:schemeClr>
+                </a:solidFill>
+              </a:rPr>
+              <a:t>getSubModulesForEar</a:t>
+            </a:r>
+            <a:r>
+              <a:rPr lang="en-US" sz="2400" i="1" dirty="0" smtClean="0">
+                <a:solidFill>
+                  <a:schemeClr val="accent1">
+                    <a:lumMod val="50000"/>
+                  </a:schemeClr>
+                </a:solidFill>
+              </a:rPr>
+              <a:t>() </a:t>
+            </a:r>
+            <a:r>
+              <a:rPr lang="en-US" sz="2400" dirty="0" smtClean="0">
+                <a:solidFill>
+                  <a:schemeClr val="accent1">
+                    <a:lumMod val="50000"/>
+                  </a:schemeClr>
+                </a:solidFill>
+              </a:rPr>
+              <a:t>method length: </a:t>
+            </a:r>
+            <a:r>
+              <a:rPr lang="en-US" sz="2400" b="1" dirty="0" smtClean="0">
+                <a:solidFill>
+                  <a:schemeClr val="accent1">
+                    <a:lumMod val="50000"/>
+                  </a:schemeClr>
+                </a:solidFill>
+              </a:rPr>
+              <a:t>14 lines</a:t>
+            </a:r>
+          </a:p>
+          <a:p>
+            <a:pPr marL="342900" indent="-342900" algn="just">
+              <a:lnSpc>
+                <a:spcPct val="150000"/>
+              </a:lnSpc>
+              <a:buFont typeface="Wingdings" panose="05000000000000000000" pitchFamily="2" charset="2"/>
+              <a:buChar char="v"/>
+            </a:pPr>
+            <a:r>
+              <a:rPr lang="en-US" sz="2400" i="1" dirty="0" smtClean="0">
+                <a:solidFill>
+                  <a:schemeClr val="accent1">
+                    <a:lumMod val="50000"/>
+                  </a:schemeClr>
+                </a:solidFill>
+              </a:rPr>
+              <a:t>execute() </a:t>
+            </a:r>
+            <a:r>
+              <a:rPr lang="en-US" sz="2400" dirty="0" smtClean="0">
+                <a:solidFill>
+                  <a:schemeClr val="accent1">
+                    <a:lumMod val="50000"/>
+                  </a:schemeClr>
+                </a:solidFill>
+              </a:rPr>
+              <a:t>weight in percentage: </a:t>
+            </a:r>
+            <a:r>
+              <a:rPr lang="en-US" sz="2400" b="1" dirty="0">
+                <a:solidFill>
+                  <a:schemeClr val="accent1">
+                    <a:lumMod val="50000"/>
+                  </a:schemeClr>
+                </a:solidFill>
+              </a:rPr>
+              <a:t>≈</a:t>
+            </a:r>
+            <a:r>
+              <a:rPr lang="en-US" sz="2400" b="1" dirty="0" smtClean="0">
+                <a:solidFill>
+                  <a:schemeClr val="accent1">
+                    <a:lumMod val="50000"/>
+                  </a:schemeClr>
+                </a:solidFill>
+              </a:rPr>
+              <a:t> 33,99 %</a:t>
+            </a:r>
+          </a:p>
+          <a:p>
+            <a:pPr marL="342900" indent="-342900" algn="just">
+              <a:lnSpc>
+                <a:spcPct val="150000"/>
+              </a:lnSpc>
+              <a:buFont typeface="Wingdings" panose="05000000000000000000" pitchFamily="2" charset="2"/>
+              <a:buChar char="v"/>
+            </a:pPr>
+            <a:r>
+              <a:rPr lang="en-US" sz="2400" i="1" dirty="0">
+                <a:solidFill>
+                  <a:schemeClr val="accent1">
+                    <a:lumMod val="50000"/>
+                  </a:schemeClr>
+                </a:solidFill>
+              </a:rPr>
+              <a:t>getSubModulesForEar</a:t>
+            </a:r>
+            <a:r>
+              <a:rPr lang="en-US" sz="2400" i="1" dirty="0" smtClean="0">
+                <a:solidFill>
+                  <a:schemeClr val="accent1">
+                    <a:lumMod val="50000"/>
+                  </a:schemeClr>
+                </a:solidFill>
+              </a:rPr>
+              <a:t>() </a:t>
+            </a:r>
+            <a:r>
+              <a:rPr lang="en-US" sz="2400" dirty="0" smtClean="0">
+                <a:solidFill>
+                  <a:schemeClr val="accent1">
+                    <a:lumMod val="50000"/>
+                  </a:schemeClr>
+                </a:solidFill>
+              </a:rPr>
+              <a:t>weight in percentage: </a:t>
+            </a:r>
+            <a:r>
+              <a:rPr lang="en-US" sz="2400" b="1" dirty="0">
+                <a:solidFill>
+                  <a:schemeClr val="accent1">
+                    <a:lumMod val="50000"/>
+                  </a:schemeClr>
+                </a:solidFill>
+              </a:rPr>
+              <a:t>≈ </a:t>
+            </a:r>
+            <a:r>
+              <a:rPr lang="en-US" sz="2400" b="1" dirty="0" smtClean="0">
+                <a:solidFill>
+                  <a:schemeClr val="accent1">
+                    <a:lumMod val="50000"/>
+                  </a:schemeClr>
+                </a:solidFill>
+              </a:rPr>
+              <a:t>3,42 %</a:t>
+            </a:r>
+            <a:endParaRPr lang="en-US" sz="2400" b="1" dirty="0">
               <a:solidFill>
                 <a:schemeClr val="accent1">
                   <a:lumMod val="50000"/>
@@ -14759,6 +16304,377 @@
           </a:p>
         </p:txBody>
       </p:sp>
+      <mc:AlternateContent xmlns:mc="http://schemas.openxmlformats.org/markup-compatibility/2006">
+        <mc:Choice xmlns:a14="http://schemas.microsoft.com/office/drawing/2010/main" Requires="a14">
+          <p:sp>
+            <p:nvSpPr>
+              <p:cNvPr id="2" name="Rettangolo 1"/>
+              <p:cNvSpPr/>
+              <p:nvPr/>
+            </p:nvSpPr>
+            <p:spPr>
+              <a:xfrm>
+                <a:off x="691549" y="4367284"/>
+                <a:ext cx="7688176" cy="1719617"/>
+              </a:xfrm>
+              <a:prstGeom prst="rect">
+                <a:avLst/>
+              </a:prstGeom>
+            </p:spPr>
+            <p:style>
+              <a:lnRef idx="2">
+                <a:schemeClr val="accent1"/>
+              </a:lnRef>
+              <a:fillRef idx="1">
+                <a:schemeClr val="lt1"/>
+              </a:fillRef>
+              <a:effectRef idx="0">
+                <a:schemeClr val="accent1"/>
+              </a:effectRef>
+              <a:fontRef idx="minor">
+                <a:schemeClr val="dk1"/>
+              </a:fontRef>
+            </p:style>
+            <p:txBody>
+              <a:bodyPr rtlCol="0" anchor="ctr"/>
+              <a:lstStyle/>
+              <a:p>
+                <a:pPr algn="ctr"/>
+                <a14:m>
+                  <m:oMathPara xmlns:m="http://schemas.openxmlformats.org/officeDocument/2006/math">
+                    <m:oMathParaPr>
+                      <m:jc m:val="centerGroup"/>
+                    </m:oMathParaPr>
+                    <m:oMath xmlns:m="http://schemas.openxmlformats.org/officeDocument/2006/math">
+                      <m:r>
+                        <a:rPr lang="it-IT" sz="2900" b="0" i="1" smtClean="0">
+                          <a:solidFill>
+                            <a:srgbClr val="002060"/>
+                          </a:solidFill>
+                          <a:latin typeface="Cambria Math" panose="02040503050406030204" pitchFamily="18" charset="0"/>
+                        </a:rPr>
+                        <m:t>𝑚𝑒𝑡h𝑜𝑑</m:t>
+                      </m:r>
+                      <m:r>
+                        <a:rPr lang="it-IT" sz="2900" b="0" i="1" smtClean="0">
+                          <a:solidFill>
+                            <a:srgbClr val="002060"/>
+                          </a:solidFill>
+                          <a:latin typeface="Cambria Math" panose="02040503050406030204" pitchFamily="18" charset="0"/>
+                        </a:rPr>
+                        <m:t> </m:t>
+                      </m:r>
+                      <m:r>
+                        <a:rPr lang="it-IT" sz="2900" b="0" i="1" smtClean="0">
+                          <a:solidFill>
+                            <a:srgbClr val="002060"/>
+                          </a:solidFill>
+                          <a:latin typeface="Cambria Math" panose="02040503050406030204" pitchFamily="18" charset="0"/>
+                        </a:rPr>
+                        <m:t>𝑤𝑒𝑖𝑔h𝑡</m:t>
+                      </m:r>
+                      <m:r>
+                        <a:rPr lang="it-IT" sz="2900" b="0" i="1" smtClean="0">
+                          <a:solidFill>
+                            <a:srgbClr val="002060"/>
+                          </a:solidFill>
+                          <a:latin typeface="Cambria Math" panose="02040503050406030204" pitchFamily="18" charset="0"/>
+                        </a:rPr>
+                        <m:t>=</m:t>
+                      </m:r>
+                      <m:f>
+                        <m:fPr>
+                          <m:ctrlPr>
+                            <a:rPr lang="it-IT" sz="2900" b="0" i="1" smtClean="0">
+                              <a:solidFill>
+                                <a:srgbClr val="002060"/>
+                              </a:solidFill>
+                              <a:latin typeface="Cambria Math" panose="02040503050406030204" pitchFamily="18" charset="0"/>
+                            </a:rPr>
+                          </m:ctrlPr>
+                        </m:fPr>
+                        <m:num>
+                          <m:r>
+                            <a:rPr lang="it-IT" sz="2900" i="1">
+                              <a:solidFill>
+                                <a:srgbClr val="002060"/>
+                              </a:solidFill>
+                              <a:latin typeface="Cambria Math" panose="02040503050406030204" pitchFamily="18" charset="0"/>
+                            </a:rPr>
+                            <m:t>𝑚𝑒𝑡h𝑜𝑑</m:t>
+                          </m:r>
+                          <m:r>
+                            <a:rPr lang="it-IT" sz="2900" i="1">
+                              <a:solidFill>
+                                <a:srgbClr val="002060"/>
+                              </a:solidFill>
+                              <a:latin typeface="Cambria Math" panose="02040503050406030204" pitchFamily="18" charset="0"/>
+                            </a:rPr>
+                            <m:t> </m:t>
+                          </m:r>
+                          <m:r>
+                            <a:rPr lang="it-IT" sz="2900" i="1">
+                              <a:solidFill>
+                                <a:srgbClr val="002060"/>
+                              </a:solidFill>
+                              <a:latin typeface="Cambria Math" panose="02040503050406030204" pitchFamily="18" charset="0"/>
+                            </a:rPr>
+                            <m:t>𝑙𝑖𝑛𝑒𝑠</m:t>
+                          </m:r>
+                          <m:r>
+                            <a:rPr lang="it-IT" sz="2900" i="1">
+                              <a:solidFill>
+                                <a:srgbClr val="002060"/>
+                              </a:solidFill>
+                              <a:latin typeface="Cambria Math" panose="02040503050406030204" pitchFamily="18" charset="0"/>
+                            </a:rPr>
+                            <m:t> </m:t>
+                          </m:r>
+                          <m:r>
+                            <a:rPr lang="it-IT" sz="2900" i="1">
+                              <a:solidFill>
+                                <a:srgbClr val="002060"/>
+                              </a:solidFill>
+                              <a:latin typeface="Cambria Math" panose="02040503050406030204" pitchFamily="18" charset="0"/>
+                            </a:rPr>
+                            <m:t>𝑜𝑓</m:t>
+                          </m:r>
+                          <m:r>
+                            <a:rPr lang="it-IT" sz="2900" i="1">
+                              <a:solidFill>
+                                <a:srgbClr val="002060"/>
+                              </a:solidFill>
+                              <a:latin typeface="Cambria Math" panose="02040503050406030204" pitchFamily="18" charset="0"/>
+                            </a:rPr>
+                            <m:t> </m:t>
+                          </m:r>
+                          <m:r>
+                            <a:rPr lang="it-IT" sz="2900" i="1">
+                              <a:solidFill>
+                                <a:srgbClr val="002060"/>
+                              </a:solidFill>
+                              <a:latin typeface="Cambria Math" panose="02040503050406030204" pitchFamily="18" charset="0"/>
+                            </a:rPr>
+                            <m:t>𝑐𝑜𝑑𝑒</m:t>
+                          </m:r>
+                          <m:r>
+                            <a:rPr lang="it-IT" sz="2900" b="0" i="1" smtClean="0">
+                              <a:solidFill>
+                                <a:srgbClr val="002060"/>
+                              </a:solidFill>
+                              <a:latin typeface="Cambria Math" panose="02040503050406030204" pitchFamily="18" charset="0"/>
+                            </a:rPr>
+                            <m:t> [</m:t>
+                          </m:r>
+                          <m:r>
+                            <a:rPr lang="it-IT" sz="2900" b="0" i="1" smtClean="0">
+                              <a:solidFill>
+                                <a:srgbClr val="002060"/>
+                              </a:solidFill>
+                              <a:latin typeface="Cambria Math" panose="02040503050406030204" pitchFamily="18" charset="0"/>
+                            </a:rPr>
+                            <m:t>𝐿𝑜𝐶</m:t>
+                          </m:r>
+                          <m:r>
+                            <a:rPr lang="it-IT" sz="2900" b="0" i="1" smtClean="0">
+                              <a:solidFill>
+                                <a:srgbClr val="002060"/>
+                              </a:solidFill>
+                              <a:latin typeface="Cambria Math" panose="02040503050406030204" pitchFamily="18" charset="0"/>
+                            </a:rPr>
+                            <m:t>]</m:t>
+                          </m:r>
+                        </m:num>
+                        <m:den>
+                          <m:r>
+                            <a:rPr lang="it-IT" sz="2900" b="0" i="1" smtClean="0">
+                              <a:solidFill>
+                                <a:srgbClr val="002060"/>
+                              </a:solidFill>
+                              <a:latin typeface="Cambria Math" panose="02040503050406030204" pitchFamily="18" charset="0"/>
+                            </a:rPr>
+                            <m:t>𝑐𝑙𝑎𝑠𝑠</m:t>
+                          </m:r>
+                          <m:r>
+                            <a:rPr lang="it-IT" sz="2900" b="0" i="1" smtClean="0">
+                              <a:solidFill>
+                                <a:srgbClr val="002060"/>
+                              </a:solidFill>
+                              <a:latin typeface="Cambria Math" panose="02040503050406030204" pitchFamily="18" charset="0"/>
+                            </a:rPr>
+                            <m:t> </m:t>
+                          </m:r>
+                          <m:r>
+                            <a:rPr lang="it-IT" sz="2900" b="0" i="1" smtClean="0">
+                              <a:solidFill>
+                                <a:srgbClr val="002060"/>
+                              </a:solidFill>
+                              <a:latin typeface="Cambria Math" panose="02040503050406030204" pitchFamily="18" charset="0"/>
+                            </a:rPr>
+                            <m:t>𝑙𝑖𝑛𝑒𝑠</m:t>
+                          </m:r>
+                          <m:r>
+                            <a:rPr lang="it-IT" sz="2900" b="0" i="1" smtClean="0">
+                              <a:solidFill>
+                                <a:srgbClr val="002060"/>
+                              </a:solidFill>
+                              <a:latin typeface="Cambria Math" panose="02040503050406030204" pitchFamily="18" charset="0"/>
+                            </a:rPr>
+                            <m:t> </m:t>
+                          </m:r>
+                          <m:r>
+                            <a:rPr lang="it-IT" sz="2900" b="0" i="1" smtClean="0">
+                              <a:solidFill>
+                                <a:srgbClr val="002060"/>
+                              </a:solidFill>
+                              <a:latin typeface="Cambria Math" panose="02040503050406030204" pitchFamily="18" charset="0"/>
+                            </a:rPr>
+                            <m:t>𝑜𝑓</m:t>
+                          </m:r>
+                          <m:r>
+                            <a:rPr lang="it-IT" sz="2900" b="0" i="1" smtClean="0">
+                              <a:solidFill>
+                                <a:srgbClr val="002060"/>
+                              </a:solidFill>
+                              <a:latin typeface="Cambria Math" panose="02040503050406030204" pitchFamily="18" charset="0"/>
+                            </a:rPr>
+                            <m:t> </m:t>
+                          </m:r>
+                          <m:r>
+                            <a:rPr lang="it-IT" sz="2900" b="0" i="1" smtClean="0">
+                              <a:solidFill>
+                                <a:srgbClr val="002060"/>
+                              </a:solidFill>
+                              <a:latin typeface="Cambria Math" panose="02040503050406030204" pitchFamily="18" charset="0"/>
+                            </a:rPr>
+                            <m:t>𝑐𝑜𝑑𝑒</m:t>
+                          </m:r>
+                          <m:r>
+                            <a:rPr lang="it-IT" sz="2900" b="0" i="1" smtClean="0">
+                              <a:solidFill>
+                                <a:srgbClr val="002060"/>
+                              </a:solidFill>
+                              <a:latin typeface="Cambria Math" panose="02040503050406030204" pitchFamily="18" charset="0"/>
+                            </a:rPr>
+                            <m:t> [</m:t>
+                          </m:r>
+                          <m:r>
+                            <a:rPr lang="it-IT" sz="2900" b="0" i="1" smtClean="0">
+                              <a:solidFill>
+                                <a:srgbClr val="002060"/>
+                              </a:solidFill>
+                              <a:latin typeface="Cambria Math" panose="02040503050406030204" pitchFamily="18" charset="0"/>
+                            </a:rPr>
+                            <m:t>𝐿𝑜𝐶</m:t>
+                          </m:r>
+                          <m:r>
+                            <a:rPr lang="it-IT" sz="2900" b="0" i="1" smtClean="0">
+                              <a:solidFill>
+                                <a:srgbClr val="002060"/>
+                              </a:solidFill>
+                              <a:latin typeface="Cambria Math" panose="02040503050406030204" pitchFamily="18" charset="0"/>
+                            </a:rPr>
+                            <m:t>]</m:t>
+                          </m:r>
+                        </m:den>
+                      </m:f>
+                    </m:oMath>
+                  </m:oMathPara>
+                </a14:m>
+                <a:endParaRPr lang="en-US" sz="2900" dirty="0">
+                  <a:solidFill>
+                    <a:srgbClr val="002060"/>
+                  </a:solidFill>
+                </a:endParaRPr>
+              </a:p>
+            </p:txBody>
+          </p:sp>
+        </mc:Choice>
+        <mc:Fallback>
+          <p:sp>
+            <p:nvSpPr>
+              <p:cNvPr id="2" name="Rettangolo 1"/>
+              <p:cNvSpPr>
+                <a:spLocks noRot="1" noChangeAspect="1" noMove="1" noResize="1" noEditPoints="1" noAdjustHandles="1" noChangeArrowheads="1" noChangeShapeType="1" noTextEdit="1"/>
+              </p:cNvSpPr>
+              <p:nvPr/>
+            </p:nvSpPr>
+            <p:spPr>
+              <a:xfrm>
+                <a:off x="691549" y="4367284"/>
+                <a:ext cx="7688176" cy="1719617"/>
+              </a:xfrm>
+              <a:prstGeom prst="rect">
+                <a:avLst/>
+              </a:prstGeom>
+              <a:blipFill rotWithShape="0">
+                <a:blip r:embed="rId6"/>
+                <a:stretch>
+                  <a:fillRect/>
+                </a:stretch>
+              </a:blipFill>
+            </p:spPr>
+            <p:txBody>
+              <a:bodyPr/>
+              <a:lstStyle/>
+              <a:p>
+                <a:r>
+                  <a:rPr lang="en-US">
+                    <a:noFill/>
+                  </a:rPr>
+                  <a:t> </a:t>
+                </a:r>
+              </a:p>
+            </p:txBody>
+          </p:sp>
+        </mc:Fallback>
+      </mc:AlternateContent>
+      <p:sp>
+        <p:nvSpPr>
+          <p:cNvPr id="4" name="CasellaDiTesto 3"/>
+          <p:cNvSpPr txBox="1"/>
+          <p:nvPr/>
+        </p:nvSpPr>
+        <p:spPr>
+          <a:xfrm>
+            <a:off x="871069" y="3940456"/>
+            <a:ext cx="7289175" cy="369332"/>
+          </a:xfrm>
+          <a:prstGeom prst="rect">
+            <a:avLst/>
+          </a:prstGeom>
+          <a:noFill/>
+        </p:spPr>
+        <p:txBody>
+          <a:bodyPr wrap="none" rtlCol="0">
+            <a:spAutoFit/>
+          </a:bodyPr>
+          <a:lstStyle/>
+          <a:p>
+            <a:r>
+              <a:rPr lang="en-US" sz="1800" b="1" dirty="0" smtClean="0"/>
+              <a:t>Note</a:t>
+            </a:r>
+            <a:r>
+              <a:rPr lang="en-US" sz="1800" dirty="0" smtClean="0"/>
+              <a:t>: the first method is about </a:t>
+            </a:r>
+            <a:r>
+              <a:rPr lang="en-US" sz="1800" b="1" u="sng" dirty="0" smtClean="0"/>
+              <a:t>ten times</a:t>
+            </a:r>
+            <a:r>
+              <a:rPr lang="en-US" sz="1800" b="1" dirty="0" smtClean="0"/>
+              <a:t> </a:t>
+            </a:r>
+            <a:r>
+              <a:rPr lang="en-US" sz="1800" dirty="0" smtClean="0"/>
+              <a:t>bigger than the second one!</a:t>
+            </a:r>
+            <a:endParaRPr lang="en-US" sz="1800" dirty="0"/>
+          </a:p>
+        </p:txBody>
+      </p:sp>
     </p:spTree>
     <p:extLst>
       <p:ext uri="{BB962C8B-B14F-4D97-AF65-F5344CB8AC3E}">
@@ -14844,6 +16760,250 @@
                       </p:childTnLst>
                     </p:cTn>
                   </p:par>
+                  <p:par>
+                    <p:cTn id="8" fill="hold">
+                      <p:stCondLst>
+                        <p:cond delay="indefinite"/>
+                      </p:stCondLst>
+                      <p:childTnLst>
+                        <p:par>
+                          <p:cTn id="9" fill="hold">
+                            <p:stCondLst>
+                              <p:cond delay="0"/>
+                            </p:stCondLst>
+                            <p:childTnLst>
+                              <p:par>
+                                <p:cTn id="10" presetID="10" presetClass="entr" presetSubtype="0" fill="hold" grpId="0" nodeType="clickEffect">
+                                  <p:stCondLst>
+                                    <p:cond delay="0"/>
+                                  </p:stCondLst>
+                                  <p:childTnLst>
+                                    <p:set>
+                                      <p:cBhvr>
+                                        <p:cTn id="11" dur="1" fill="hold">
+                                          <p:stCondLst>
+                                            <p:cond delay="0"/>
+                                          </p:stCondLst>
+                                        </p:cTn>
+                                        <p:tgtEl>
+                                          <p:spTgt spid="52">
+                                            <p:txEl>
+                                              <p:pRg st="1" end="1"/>
+                                            </p:txEl>
+                                          </p:spTgt>
+                                        </p:tgtEl>
+                                        <p:attrNameLst>
+                                          <p:attrName>style.visibility</p:attrName>
+                                        </p:attrNameLst>
+                                      </p:cBhvr>
+                                      <p:to>
+                                        <p:strVal val="visible"/>
+                                      </p:to>
+                                    </p:set>
+                                    <p:animEffect transition="in" filter="fade">
+                                      <p:cBhvr>
+                                        <p:cTn id="12" dur="500"/>
+                                        <p:tgtEl>
+                                          <p:spTgt spid="52">
+                                            <p:txEl>
+                                              <p:pRg st="1" end="1"/>
+                                            </p:txEl>
+                                          </p:spTgt>
+                                        </p:tgtEl>
+                                      </p:cBhvr>
+                                    </p:animEffect>
+                                  </p:childTnLst>
+                                </p:cTn>
+                              </p:par>
+                            </p:childTnLst>
+                          </p:cTn>
+                        </p:par>
+                      </p:childTnLst>
+                    </p:cTn>
+                  </p:par>
+                  <p:par>
+                    <p:cTn id="13" fill="hold">
+                      <p:stCondLst>
+                        <p:cond delay="indefinite"/>
+                      </p:stCondLst>
+                      <p:childTnLst>
+                        <p:par>
+                          <p:cTn id="14" fill="hold">
+                            <p:stCondLst>
+                              <p:cond delay="0"/>
+                            </p:stCondLst>
+                            <p:childTnLst>
+                              <p:par>
+                                <p:cTn id="15" presetID="10" presetClass="entr" presetSubtype="0" fill="hold" grpId="0" nodeType="clickEffect">
+                                  <p:stCondLst>
+                                    <p:cond delay="0"/>
+                                  </p:stCondLst>
+                                  <p:childTnLst>
+                                    <p:set>
+                                      <p:cBhvr>
+                                        <p:cTn id="16" dur="1" fill="hold">
+                                          <p:stCondLst>
+                                            <p:cond delay="0"/>
+                                          </p:stCondLst>
+                                        </p:cTn>
+                                        <p:tgtEl>
+                                          <p:spTgt spid="52">
+                                            <p:txEl>
+                                              <p:pRg st="2" end="2"/>
+                                            </p:txEl>
+                                          </p:spTgt>
+                                        </p:tgtEl>
+                                        <p:attrNameLst>
+                                          <p:attrName>style.visibility</p:attrName>
+                                        </p:attrNameLst>
+                                      </p:cBhvr>
+                                      <p:to>
+                                        <p:strVal val="visible"/>
+                                      </p:to>
+                                    </p:set>
+                                    <p:animEffect transition="in" filter="fade">
+                                      <p:cBhvr>
+                                        <p:cTn id="17" dur="500"/>
+                                        <p:tgtEl>
+                                          <p:spTgt spid="52">
+                                            <p:txEl>
+                                              <p:pRg st="2" end="2"/>
+                                            </p:txEl>
+                                          </p:spTgt>
+                                        </p:tgtEl>
+                                      </p:cBhvr>
+                                    </p:animEffect>
+                                  </p:childTnLst>
+                                </p:cTn>
+                              </p:par>
+                            </p:childTnLst>
+                          </p:cTn>
+                        </p:par>
+                      </p:childTnLst>
+                    </p:cTn>
+                  </p:par>
+                  <p:par>
+                    <p:cTn id="18" fill="hold">
+                      <p:stCondLst>
+                        <p:cond delay="indefinite"/>
+                      </p:stCondLst>
+                      <p:childTnLst>
+                        <p:par>
+                          <p:cTn id="19" fill="hold">
+                            <p:stCondLst>
+                              <p:cond delay="0"/>
+                            </p:stCondLst>
+                            <p:childTnLst>
+                              <p:par>
+                                <p:cTn id="20" presetID="10" presetClass="entr" presetSubtype="0" fill="hold" grpId="0" nodeType="clickEffect">
+                                  <p:stCondLst>
+                                    <p:cond delay="0"/>
+                                  </p:stCondLst>
+                                  <p:childTnLst>
+                                    <p:set>
+                                      <p:cBhvr>
+                                        <p:cTn id="21" dur="1" fill="hold">
+                                          <p:stCondLst>
+                                            <p:cond delay="0"/>
+                                          </p:stCondLst>
+                                        </p:cTn>
+                                        <p:tgtEl>
+                                          <p:spTgt spid="52">
+                                            <p:txEl>
+                                              <p:pRg st="3" end="3"/>
+                                            </p:txEl>
+                                          </p:spTgt>
+                                        </p:tgtEl>
+                                        <p:attrNameLst>
+                                          <p:attrName>style.visibility</p:attrName>
+                                        </p:attrNameLst>
+                                      </p:cBhvr>
+                                      <p:to>
+                                        <p:strVal val="visible"/>
+                                      </p:to>
+                                    </p:set>
+                                    <p:animEffect transition="in" filter="fade">
+                                      <p:cBhvr>
+                                        <p:cTn id="22" dur="500"/>
+                                        <p:tgtEl>
+                                          <p:spTgt spid="52">
+                                            <p:txEl>
+                                              <p:pRg st="3" end="3"/>
+                                            </p:txEl>
+                                          </p:spTgt>
+                                        </p:tgtEl>
+                                      </p:cBhvr>
+                                    </p:animEffect>
+                                  </p:childTnLst>
+                                </p:cTn>
+                              </p:par>
+                            </p:childTnLst>
+                          </p:cTn>
+                        </p:par>
+                      </p:childTnLst>
+                    </p:cTn>
+                  </p:par>
+                  <p:par>
+                    <p:cTn id="23" fill="hold">
+                      <p:stCondLst>
+                        <p:cond delay="indefinite"/>
+                      </p:stCondLst>
+                      <p:childTnLst>
+                        <p:par>
+                          <p:cTn id="24" fill="hold">
+                            <p:stCondLst>
+                              <p:cond delay="0"/>
+                            </p:stCondLst>
+                            <p:childTnLst>
+                              <p:par>
+                                <p:cTn id="25" presetID="10" presetClass="entr" presetSubtype="0" fill="hold" grpId="0" nodeType="clickEffect">
+                                  <p:stCondLst>
+                                    <p:cond delay="0"/>
+                                  </p:stCondLst>
+                                  <p:childTnLst>
+                                    <p:set>
+                                      <p:cBhvr>
+                                        <p:cTn id="26" dur="1" fill="hold">
+                                          <p:stCondLst>
+                                            <p:cond delay="0"/>
+                                          </p:stCondLst>
+                                        </p:cTn>
+                                        <p:tgtEl>
+                                          <p:spTgt spid="52">
+                                            <p:txEl>
+                                              <p:pRg st="4" end="4"/>
+                                            </p:txEl>
+                                          </p:spTgt>
+                                        </p:tgtEl>
+                                        <p:attrNameLst>
+                                          <p:attrName>style.visibility</p:attrName>
+                                        </p:attrNameLst>
+                                      </p:cBhvr>
+                                      <p:to>
+                                        <p:strVal val="visible"/>
+                                      </p:to>
+                                    </p:set>
+                                    <p:animEffect transition="in" filter="fade">
+                                      <p:cBhvr>
+                                        <p:cTn id="27" dur="500"/>
+                                        <p:tgtEl>
+                                          <p:spTgt spid="52">
+                                            <p:txEl>
+                                              <p:pRg st="4" end="4"/>
+                                            </p:txEl>
+                                          </p:spTgt>
+                                        </p:tgtEl>
+                                      </p:cBhvr>
+                                    </p:animEffect>
+                                  </p:childTnLst>
+                                </p:cTn>
+                              </p:par>
+                            </p:childTnLst>
+                          </p:cTn>
+                        </p:par>
+                      </p:childTnLst>
+                    </p:cTn>
+                  </p:par>
                 </p:childTnLst>
               </p:cTn>
               <p:prevCondLst>
@@ -14926,67 +17086,11 @@
                   <a:srgbClr val="003366"/>
                 </a:solidFill>
               </a:rPr>
-              <a:t>Our class: </a:t>
-            </a:r>
-            <a:r>
-              <a:rPr lang="en-US" sz="3000" b="0" i="1" dirty="0" err="1" smtClean="0">
-                <a:solidFill>
-                  <a:srgbClr val="003366"/>
-                </a:solidFill>
-              </a:rPr>
-              <a:t>listSubComponentsCommand</a:t>
+              <a:t>Checklist Issues – Histogram</a:t>
             </a:r>
             <a:endParaRPr lang="en-US" sz="3000" b="0" i="1" dirty="0">
               <a:solidFill>
                 <a:srgbClr val="003366"/>
-              </a:solidFill>
-            </a:endParaRPr>
-          </a:p>
-        </p:txBody>
-      </p:sp>
-      <p:sp>
-        <p:nvSpPr>
-          <p:cNvPr id="52" name="Shape 52"/>
-          <p:cNvSpPr txBox="1">
-            <a:spLocks noGrp="1"/>
-          </p:cNvSpPr>
-          <p:nvPr>
-            <p:ph type="body" idx="1"/>
-          </p:nvPr>
-        </p:nvSpPr>
-        <p:spPr>
-          <a:xfrm>
-            <a:off x="314900" y="1129014"/>
-            <a:ext cx="8229600" cy="2634017"/>
-          </a:xfrm>
-          <a:prstGeom prst="rect">
-            <a:avLst/>
-          </a:prstGeom>
-        </p:spPr>
-        <p:txBody>
-          <a:bodyPr lIns="91425" tIns="91425" rIns="91425" bIns="91425" anchor="ctr" anchorCtr="0">
-            <a:noAutofit/>
-          </a:bodyPr>
-          <a:lstStyle/>
-          <a:p>
-            <a:pPr algn="just">
-              <a:buNone/>
-            </a:pPr>
-            <a:r>
-              <a:rPr lang="en-US" sz="2400" dirty="0" smtClean="0">
-                <a:solidFill>
-                  <a:schemeClr val="accent1">
-                    <a:lumMod val="50000"/>
-                  </a:schemeClr>
-                </a:solidFill>
-              </a:rPr>
-              <a:t>THHIHI</a:t>
-            </a:r>
-            <a:endParaRPr lang="en-US" sz="2400" dirty="0">
-              <a:solidFill>
-                <a:schemeClr val="accent1">
-                  <a:lumMod val="50000"/>
-                </a:schemeClr>
               </a:solidFill>
             </a:endParaRPr>
           </a:p>
@@ -15197,6 +17301,30 @@
           </a:p>
         </p:txBody>
       </p:sp>
+      <p:graphicFrame>
+        <p:nvGraphicFramePr>
+          <p:cNvPr id="11" name="Grafico 10"/>
+          <p:cNvGraphicFramePr>
+            <a:graphicFrameLocks/>
+          </p:cNvGraphicFramePr>
+          <p:nvPr>
+            <p:extLst>
+              <p:ext uri="{D42A27DB-BD31-4B8C-83A1-F6EECF244321}">
+                <p14:modId xmlns:p14="http://schemas.microsoft.com/office/powerpoint/2010/main" val="1021586873"/>
+              </p:ext>
+            </p:extLst>
+          </p:nvPr>
+        </p:nvGraphicFramePr>
+        <p:xfrm>
+          <a:off x="211014" y="869734"/>
+          <a:ext cx="8763335" cy="5603905"/>
+        </p:xfrm>
+        <a:graphic>
+          <a:graphicData uri="http://schemas.openxmlformats.org/drawingml/2006/chart">
+            <c:chart xmlns:c="http://schemas.openxmlformats.org/drawingml/2006/chart" xmlns:r="http://schemas.openxmlformats.org/officeDocument/2006/relationships" r:id="rId6"/>
+          </a:graphicData>
+        </a:graphic>
+      </p:graphicFrame>
     </p:spTree>
     <p:extLst>
       <p:ext uri="{BB962C8B-B14F-4D97-AF65-F5344CB8AC3E}">
@@ -15234,7 +17362,7 @@
                             </p:stCondLst>
                             <p:childTnLst>
                               <p:par>
-                                <p:cTn id="5" presetID="10" presetClass="entr" presetSubtype="0" fill="hold" grpId="0" nodeType="withEffect">
+                                <p:cTn id="5" presetID="14" presetClass="entr" presetSubtype="10" fill="hold" grpId="0" nodeType="withEffect">
                                   <p:stCondLst>
                                     <p:cond delay="0"/>
                                   </p:stCondLst>
@@ -15247,11 +17375,7 @@
                                           </p:stCondLst>
                                         </p:cTn>
                                         <p:tgtEl>
-                                          <p:spTgt spid="52">
-                                            <p:txEl>
-                                              <p:pRg st="0" end="0"/>
-                                            </p:txEl>
-                                          </p:spTgt>
+                                          <p:spTgt spid="11"/>
                                         </p:tgtEl>
                                         <p:attrNameLst>
                                           <p:attrName>style.visibility</p:attrName>
@@ -15261,15 +17385,11 @@
                                         <p:strVal val="visible"/>
                                       </p:to>
                                     </p:set>
-                                    <p:animEffect transition="in" filter="fade">
+                                    <p:animEffect transition="in" filter="randombar(horizontal)">
                                       <p:cBhvr>
-                                        <p:cTn id="7" dur="500"/>
+                                        <p:cTn id="7" dur="1000"/>
                                         <p:tgtEl>
-                                          <p:spTgt spid="52">
-                                            <p:txEl>
-                                              <p:pRg st="0" end="0"/>
-                                            </p:txEl>
-                                          </p:spTgt>
+                                          <p:spTgt spid="11"/>
                                         </p:tgtEl>
                                       </p:cBhvr>
                                     </p:animEffect>
@@ -15304,7 +17424,9 @@
       </p:par>
     </p:tnLst>
     <p:bldLst>
-      <p:bldP spid="52" grpId="0" build="p"/>
+      <p:bldGraphic spid="11" grpId="0">
+        <p:bldAsOne/>
+      </p:bldGraphic>
     </p:bldLst>
   </p:timing>
 </p:sld>

</xml_diff>

<commit_message>
Presentation closer to the end
We need only 2-3 more statistical slides
</commit_message>
<xml_diff>
--- a/Presentations/3. CID Presentation.pptx
+++ b/Presentations/3. CID Presentation.pptx
@@ -6,18 +6,19 @@
     <p:sldMasterId id="2147483661" r:id="rId2"/>
   </p:sldMasterIdLst>
   <p:notesMasterIdLst>
-    <p:notesMasterId r:id="rId12"/>
+    <p:notesMasterId r:id="rId13"/>
   </p:notesMasterIdLst>
   <p:sldIdLst>
     <p:sldId id="258" r:id="rId3"/>
     <p:sldId id="257" r:id="rId4"/>
     <p:sldId id="282" r:id="rId5"/>
-    <p:sldId id="283" r:id="rId6"/>
-    <p:sldId id="284" r:id="rId7"/>
+    <p:sldId id="284" r:id="rId6"/>
+    <p:sldId id="283" r:id="rId7"/>
     <p:sldId id="285" r:id="rId8"/>
     <p:sldId id="286" r:id="rId9"/>
-    <p:sldId id="287" r:id="rId10"/>
-    <p:sldId id="281" r:id="rId11"/>
+    <p:sldId id="288" r:id="rId10"/>
+    <p:sldId id="287" r:id="rId11"/>
+    <p:sldId id="281" r:id="rId12"/>
   </p:sldIdLst>
   <p:sldSz cx="9144000" cy="6858000" type="screen4x3"/>
   <p:notesSz cx="6858000" cy="9144000"/>
@@ -822,11 +823,11 @@
           <c:showBubbleSize val="0"/>
         </c:dLbls>
         <c:gapWidth val="100"/>
-        <c:axId val="453147416"/>
-        <c:axId val="453147808"/>
+        <c:axId val="296784944"/>
+        <c:axId val="296785336"/>
       </c:barChart>
       <c:catAx>
-        <c:axId val="453147416"/>
+        <c:axId val="296784944"/>
         <c:scaling>
           <c:orientation val="minMax"/>
         </c:scaling>
@@ -869,7 +870,7 @@
             <a:endParaRPr lang="en-US"/>
           </a:p>
         </c:txPr>
-        <c:crossAx val="453147808"/>
+        <c:crossAx val="296785336"/>
         <c:crosses val="autoZero"/>
         <c:auto val="1"/>
         <c:lblAlgn val="ctr"/>
@@ -877,7 +878,7 @@
         <c:noMultiLvlLbl val="0"/>
       </c:catAx>
       <c:valAx>
-        <c:axId val="453147808"/>
+        <c:axId val="296785336"/>
         <c:scaling>
           <c:orientation val="minMax"/>
         </c:scaling>
@@ -928,7 +929,7 @@
             <a:endParaRPr lang="en-US"/>
           </a:p>
         </c:txPr>
-        <c:crossAx val="453147416"/>
+        <c:crossAx val="296784944"/>
         <c:crosses val="autoZero"/>
         <c:crossBetween val="between"/>
       </c:valAx>
@@ -5539,6 +5540,122 @@
 </p:notes>
 </file>
 
+<file path=ppt/notesSlides/notesSlide10.xml><?xml version="1.0" encoding="utf-8"?>
+<p:notes xmlns:a="http://schemas.openxmlformats.org/drawingml/2006/main" xmlns:r="http://schemas.openxmlformats.org/officeDocument/2006/relationships" xmlns:p="http://schemas.openxmlformats.org/presentationml/2006/main" showMasterSp="0" showMasterPhAnim="0">
+  <p:cSld>
+    <p:spTree>
+      <p:nvGrpSpPr>
+        <p:cNvPr id="1" name="Shape 59"/>
+        <p:cNvGrpSpPr/>
+        <p:nvPr/>
+      </p:nvGrpSpPr>
+      <p:grpSpPr>
+        <a:xfrm>
+          <a:off x="0" y="0"/>
+          <a:ext cx="0" cy="0"/>
+          <a:chOff x="0" y="0"/>
+          <a:chExt cx="0" cy="0"/>
+        </a:xfrm>
+      </p:grpSpPr>
+      <p:sp>
+        <p:nvSpPr>
+          <p:cNvPr id="60" name="Shape 60"/>
+          <p:cNvSpPr>
+            <a:spLocks noGrp="1" noRot="1" noChangeAspect="1"/>
+          </p:cNvSpPr>
+          <p:nvPr>
+            <p:ph type="sldImg" idx="2"/>
+          </p:nvPr>
+        </p:nvSpPr>
+        <p:spPr>
+          <a:xfrm>
+            <a:off x="1143000" y="685800"/>
+            <a:ext cx="4572000" cy="3429000"/>
+          </a:xfrm>
+          <a:custGeom>
+            <a:avLst/>
+            <a:gdLst/>
+            <a:ahLst/>
+            <a:cxnLst/>
+            <a:rect l="0" t="0" r="0" b="0"/>
+            <a:pathLst>
+              <a:path w="120000" h="120000" extrusionOk="0">
+                <a:moveTo>
+                  <a:pt x="0" y="0"/>
+                </a:moveTo>
+                <a:lnTo>
+                  <a:pt x="120000" y="0"/>
+                </a:lnTo>
+                <a:lnTo>
+                  <a:pt x="120000" y="120000"/>
+                </a:lnTo>
+                <a:lnTo>
+                  <a:pt x="0" y="120000"/>
+                </a:lnTo>
+                <a:close/>
+              </a:path>
+            </a:pathLst>
+          </a:custGeom>
+          <a:noFill/>
+          <a:ln w="9525" cap="flat">
+            <a:solidFill>
+              <a:srgbClr val="000000"/>
+            </a:solidFill>
+            <a:prstDash val="solid"/>
+            <a:round/>
+            <a:headEnd type="none" w="med" len="med"/>
+            <a:tailEnd type="none" w="med" len="med"/>
+          </a:ln>
+        </p:spPr>
+      </p:sp>
+      <p:sp>
+        <p:nvSpPr>
+          <p:cNvPr id="61" name="Shape 61"/>
+          <p:cNvSpPr txBox="1">
+            <a:spLocks noGrp="1"/>
+          </p:cNvSpPr>
+          <p:nvPr>
+            <p:ph type="body" idx="1"/>
+          </p:nvPr>
+        </p:nvSpPr>
+        <p:spPr>
+          <a:xfrm>
+            <a:off x="685800" y="4343400"/>
+            <a:ext cx="5486399" cy="4114800"/>
+          </a:xfrm>
+          <a:prstGeom prst="rect">
+            <a:avLst/>
+          </a:prstGeom>
+        </p:spPr>
+        <p:txBody>
+          <a:bodyPr lIns="91425" tIns="91425" rIns="91425" bIns="91425" anchor="t" anchorCtr="0">
+            <a:noAutofit/>
+          </a:bodyPr>
+          <a:lstStyle/>
+          <a:p>
+            <a:pPr lvl="0" rtl="0">
+              <a:spcBef>
+                <a:spcPts val="0"/>
+              </a:spcBef>
+              <a:buNone/>
+            </a:pPr>
+            <a:endParaRPr/>
+          </a:p>
+        </p:txBody>
+      </p:sp>
+    </p:spTree>
+    <p:extLst>
+      <p:ext uri="{BB962C8B-B14F-4D97-AF65-F5344CB8AC3E}">
+        <p14:creationId xmlns:p14="http://schemas.microsoft.com/office/powerpoint/2010/main" val="2289048339"/>
+      </p:ext>
+    </p:extLst>
+  </p:cSld>
+  <p:clrMapOvr>
+    <a:masterClrMapping/>
+  </p:clrMapOvr>
+</p:notes>
+</file>
+
 <file path=ppt/notesSlides/notesSlide2.xml><?xml version="1.0" encoding="utf-8"?>
 <p:notes xmlns:a="http://schemas.openxmlformats.org/drawingml/2006/main" xmlns:r="http://schemas.openxmlformats.org/officeDocument/2006/relationships" xmlns:p="http://schemas.openxmlformats.org/presentationml/2006/main" showMasterSp="0" showMasterPhAnim="0">
   <p:cSld>
@@ -5877,7 +5994,7 @@
     </p:spTree>
     <p:extLst>
       <p:ext uri="{BB962C8B-B14F-4D97-AF65-F5344CB8AC3E}">
-        <p14:creationId xmlns:p14="http://schemas.microsoft.com/office/powerpoint/2010/main" val="3895527071"/>
+        <p14:creationId xmlns:p14="http://schemas.microsoft.com/office/powerpoint/2010/main" val="2644388143"/>
       </p:ext>
     </p:extLst>
   </p:cSld>
@@ -5993,7 +6110,7 @@
     </p:spTree>
     <p:extLst>
       <p:ext uri="{BB962C8B-B14F-4D97-AF65-F5344CB8AC3E}">
-        <p14:creationId xmlns:p14="http://schemas.microsoft.com/office/powerpoint/2010/main" val="2644388143"/>
+        <p14:creationId xmlns:p14="http://schemas.microsoft.com/office/powerpoint/2010/main" val="3895527071"/>
       </p:ext>
     </p:extLst>
   </p:cSld>
@@ -6341,7 +6458,7 @@
     </p:spTree>
     <p:extLst>
       <p:ext uri="{BB962C8B-B14F-4D97-AF65-F5344CB8AC3E}">
-        <p14:creationId xmlns:p14="http://schemas.microsoft.com/office/powerpoint/2010/main" val="149496133"/>
+        <p14:creationId xmlns:p14="http://schemas.microsoft.com/office/powerpoint/2010/main" val="717374714"/>
       </p:ext>
     </p:extLst>
   </p:cSld>
@@ -6457,7 +6574,7 @@
     </p:spTree>
     <p:extLst>
       <p:ext uri="{BB962C8B-B14F-4D97-AF65-F5344CB8AC3E}">
-        <p14:creationId xmlns:p14="http://schemas.microsoft.com/office/powerpoint/2010/main" val="2289048339"/>
+        <p14:creationId xmlns:p14="http://schemas.microsoft.com/office/powerpoint/2010/main" val="149496133"/>
       </p:ext>
     </p:extLst>
   </p:cSld>
@@ -12779,6 +12896,686 @@
       <p:bldP spid="42" grpId="0"/>
       <p:bldP spid="4" grpId="0"/>
     </p:bldLst>
+  </p:timing>
+</p:sld>
+</file>
+
+<file path=ppt/slides/slide10.xml><?xml version="1.0" encoding="utf-8"?>
+<p:sld xmlns:a="http://schemas.openxmlformats.org/drawingml/2006/main" xmlns:r="http://schemas.openxmlformats.org/officeDocument/2006/relationships" xmlns:p="http://schemas.openxmlformats.org/presentationml/2006/main">
+  <p:cSld>
+    <p:spTree>
+      <p:nvGrpSpPr>
+        <p:cNvPr id="1" name="Shape 50"/>
+        <p:cNvGrpSpPr/>
+        <p:nvPr/>
+      </p:nvGrpSpPr>
+      <p:grpSpPr>
+        <a:xfrm>
+          <a:off x="0" y="0"/>
+          <a:ext cx="0" cy="0"/>
+          <a:chOff x="0" y="0"/>
+          <a:chExt cx="0" cy="0"/>
+        </a:xfrm>
+      </p:grpSpPr>
+      <p:sp>
+        <p:nvSpPr>
+          <p:cNvPr id="51" name="Shape 51"/>
+          <p:cNvSpPr txBox="1">
+            <a:spLocks noGrp="1"/>
+          </p:cNvSpPr>
+          <p:nvPr>
+            <p:ph type="title"/>
+          </p:nvPr>
+        </p:nvSpPr>
+        <p:spPr>
+          <a:xfrm>
+            <a:off x="837450" y="131950"/>
+            <a:ext cx="8136900" cy="498599"/>
+          </a:xfrm>
+          <a:prstGeom prst="rect">
+            <a:avLst/>
+          </a:prstGeom>
+        </p:spPr>
+        <p:txBody>
+          <a:bodyPr lIns="91425" tIns="91425" rIns="91425" bIns="91425" anchor="b" anchorCtr="0">
+            <a:noAutofit/>
+          </a:bodyPr>
+          <a:lstStyle/>
+          <a:p>
+            <a:pPr lvl="0" rtl="0">
+              <a:spcBef>
+                <a:spcPts val="0"/>
+              </a:spcBef>
+              <a:buNone/>
+            </a:pPr>
+            <a:r>
+              <a:rPr lang="it-IT" sz="3000" dirty="0" smtClean="0">
+                <a:solidFill>
+                  <a:srgbClr val="003366"/>
+                </a:solidFill>
+              </a:rPr>
+              <a:t>Thank you!!!</a:t>
+            </a:r>
+            <a:endParaRPr sz="3000" dirty="0">
+              <a:solidFill>
+                <a:srgbClr val="003366"/>
+              </a:solidFill>
+            </a:endParaRPr>
+          </a:p>
+        </p:txBody>
+      </p:sp>
+      <p:sp>
+        <p:nvSpPr>
+          <p:cNvPr id="52" name="Shape 52"/>
+          <p:cNvSpPr txBox="1">
+            <a:spLocks noGrp="1"/>
+          </p:cNvSpPr>
+          <p:nvPr>
+            <p:ph type="body" idx="1"/>
+          </p:nvPr>
+        </p:nvSpPr>
+        <p:spPr>
+          <a:xfrm>
+            <a:off x="457200" y="766050"/>
+            <a:ext cx="8229600" cy="5325900"/>
+          </a:xfrm>
+          <a:prstGeom prst="rect">
+            <a:avLst/>
+          </a:prstGeom>
+        </p:spPr>
+        <p:txBody>
+          <a:bodyPr lIns="91425" tIns="91425" rIns="91425" bIns="91425" anchor="ctr" anchorCtr="0">
+            <a:noAutofit/>
+          </a:bodyPr>
+          <a:lstStyle/>
+          <a:p>
+            <a:pPr lvl="0" algn="just" rtl="0">
+              <a:spcBef>
+                <a:spcPts val="0"/>
+              </a:spcBef>
+              <a:buNone/>
+            </a:pPr>
+            <a:endParaRPr sz="2200" dirty="0">
+              <a:solidFill>
+                <a:srgbClr val="003366"/>
+              </a:solidFill>
+            </a:endParaRPr>
+          </a:p>
+        </p:txBody>
+      </p:sp>
+      <p:pic>
+        <p:nvPicPr>
+          <p:cNvPr id="53" name="Shape 53"/>
+          <p:cNvPicPr preferRelativeResize="0"/>
+          <p:nvPr/>
+        </p:nvPicPr>
+        <p:blipFill>
+          <a:blip r:embed="rId3">
+            <a:alphaModFix/>
+          </a:blip>
+          <a:stretch>
+            <a:fillRect/>
+          </a:stretch>
+        </p:blipFill>
+        <p:spPr>
+          <a:xfrm>
+            <a:off x="82450" y="65950"/>
+            <a:ext cx="464900" cy="498650"/>
+          </a:xfrm>
+          <a:prstGeom prst="rect">
+            <a:avLst/>
+          </a:prstGeom>
+          <a:noFill/>
+          <a:ln>
+            <a:noFill/>
+          </a:ln>
+        </p:spPr>
+      </p:pic>
+      <p:pic>
+        <p:nvPicPr>
+          <p:cNvPr id="54" name="Shape 54"/>
+          <p:cNvPicPr preferRelativeResize="0"/>
+          <p:nvPr/>
+        </p:nvPicPr>
+        <p:blipFill>
+          <a:blip r:embed="rId4">
+            <a:alphaModFix/>
+          </a:blip>
+          <a:stretch>
+            <a:fillRect/>
+          </a:stretch>
+        </p:blipFill>
+        <p:spPr>
+          <a:xfrm>
+            <a:off x="0" y="630539"/>
+            <a:ext cx="9143998" cy="97471"/>
+          </a:xfrm>
+          <a:prstGeom prst="rect">
+            <a:avLst/>
+          </a:prstGeom>
+          <a:noFill/>
+          <a:ln>
+            <a:noFill/>
+          </a:ln>
+        </p:spPr>
+      </p:pic>
+      <p:cxnSp>
+        <p:nvCxnSpPr>
+          <p:cNvPr id="55" name="Shape 55"/>
+          <p:cNvCxnSpPr/>
+          <p:nvPr/>
+        </p:nvCxnSpPr>
+        <p:spPr>
+          <a:xfrm rot="10800000">
+            <a:off x="691550" y="125"/>
+            <a:ext cx="0" cy="630299"/>
+          </a:xfrm>
+          <a:prstGeom prst="straightConnector1">
+            <a:avLst/>
+          </a:prstGeom>
+          <a:noFill/>
+          <a:ln w="9525" cap="flat">
+            <a:solidFill>
+              <a:srgbClr val="003366"/>
+            </a:solidFill>
+            <a:prstDash val="solid"/>
+            <a:round/>
+            <a:headEnd type="none" w="lg" len="lg"/>
+            <a:tailEnd type="none" w="lg" len="lg"/>
+          </a:ln>
+        </p:spPr>
+      </p:cxnSp>
+      <p:sp>
+        <p:nvSpPr>
+          <p:cNvPr id="56" name="Shape 56"/>
+          <p:cNvSpPr txBox="1"/>
+          <p:nvPr/>
+        </p:nvSpPr>
+        <p:spPr>
+          <a:xfrm>
+            <a:off x="6783700" y="6531000"/>
+            <a:ext cx="2599200" cy="363899"/>
+          </a:xfrm>
+          <a:prstGeom prst="rect">
+            <a:avLst/>
+          </a:prstGeom>
+          <a:noFill/>
+          <a:ln>
+            <a:noFill/>
+          </a:ln>
+        </p:spPr>
+        <p:txBody>
+          <a:bodyPr lIns="91425" tIns="91425" rIns="91425" bIns="91425" anchor="t" anchorCtr="0">
+            <a:noAutofit/>
+          </a:bodyPr>
+          <a:lstStyle/>
+          <a:p>
+            <a:pPr lvl="0" rtl="0">
+              <a:spcBef>
+                <a:spcPts val="0"/>
+              </a:spcBef>
+              <a:buNone/>
+            </a:pPr>
+            <a:r>
+              <a:rPr lang="it" sz="1200" b="1">
+                <a:solidFill>
+                  <a:srgbClr val="FFFFFF"/>
+                </a:solidFill>
+              </a:rPr>
+              <a:t>POLITECNICO DI MILANO</a:t>
+            </a:r>
+          </a:p>
+        </p:txBody>
+      </p:sp>
+      <p:pic>
+        <p:nvPicPr>
+          <p:cNvPr id="57" name="Shape 57"/>
+          <p:cNvPicPr preferRelativeResize="0"/>
+          <p:nvPr/>
+        </p:nvPicPr>
+        <p:blipFill>
+          <a:blip r:embed="rId5">
+            <a:alphaModFix/>
+          </a:blip>
+          <a:stretch>
+            <a:fillRect/>
+          </a:stretch>
+        </p:blipFill>
+        <p:spPr>
+          <a:xfrm>
+            <a:off x="0" y="6571225"/>
+            <a:ext cx="9144000" cy="286775"/>
+          </a:xfrm>
+          <a:prstGeom prst="rect">
+            <a:avLst/>
+          </a:prstGeom>
+          <a:noFill/>
+          <a:ln>
+            <a:noFill/>
+          </a:ln>
+        </p:spPr>
+      </p:pic>
+      <p:sp>
+        <p:nvSpPr>
+          <p:cNvPr id="58" name="Shape 58"/>
+          <p:cNvSpPr txBox="1">
+            <a:spLocks noGrp="1"/>
+          </p:cNvSpPr>
+          <p:nvPr>
+            <p:ph type="ctrTitle" idx="4294967295"/>
+          </p:nvPr>
+        </p:nvSpPr>
+        <p:spPr>
+          <a:xfrm>
+            <a:off x="457200" y="6712949"/>
+            <a:ext cx="5162269" cy="281444"/>
+          </a:xfrm>
+          <a:prstGeom prst="rect">
+            <a:avLst/>
+          </a:prstGeom>
+        </p:spPr>
+        <p:txBody>
+          <a:bodyPr lIns="91425" tIns="91425" rIns="91425" bIns="91425" anchor="ctr" anchorCtr="0">
+            <a:noAutofit/>
+          </a:bodyPr>
+          <a:lstStyle/>
+          <a:p>
+            <a:pPr indent="457200">
+              <a:lnSpc>
+                <a:spcPct val="115000"/>
+              </a:lnSpc>
+            </a:pPr>
+            <a:r>
+              <a:rPr lang="it-IT" sz="1300" b="1" dirty="0">
+                <a:solidFill>
+                  <a:srgbClr val="003366"/>
+                </a:solidFill>
+              </a:rPr>
+              <a:t>SE2 – Andrea Martino, Francesco Marchesani</a:t>
+            </a:r>
+            <a:br>
+              <a:rPr lang="it-IT" sz="1300" b="1" dirty="0">
+                <a:solidFill>
+                  <a:srgbClr val="003366"/>
+                </a:solidFill>
+              </a:rPr>
+            </a:br>
+            <a:endParaRPr sz="1300" dirty="0">
+              <a:solidFill>
+                <a:srgbClr val="003366"/>
+              </a:solidFill>
+            </a:endParaRPr>
+          </a:p>
+        </p:txBody>
+      </p:sp>
+      <p:pic>
+        <p:nvPicPr>
+          <p:cNvPr id="2" name="Immagine 1"/>
+          <p:cNvPicPr>
+            <a:picLocks noChangeAspect="1"/>
+          </p:cNvPicPr>
+          <p:nvPr/>
+        </p:nvPicPr>
+        <p:blipFill>
+          <a:blip r:embed="rId6">
+            <a:extLst>
+              <a:ext uri="{28A0092B-C50C-407E-A947-70E740481C1C}">
+                <a14:useLocalDpi xmlns:a14="http://schemas.microsoft.com/office/drawing/2010/main" val="0"/>
+              </a:ext>
+            </a:extLst>
+          </a:blip>
+          <a:stretch>
+            <a:fillRect/>
+          </a:stretch>
+        </p:blipFill>
+        <p:spPr>
+          <a:xfrm>
+            <a:off x="0" y="1152645"/>
+            <a:ext cx="9144000" cy="4552709"/>
+          </a:xfrm>
+          <a:prstGeom prst="rect">
+            <a:avLst/>
+          </a:prstGeom>
+        </p:spPr>
+      </p:pic>
+    </p:spTree>
+    <p:extLst>
+      <p:ext uri="{BB962C8B-B14F-4D97-AF65-F5344CB8AC3E}">
+        <p14:creationId xmlns:p14="http://schemas.microsoft.com/office/powerpoint/2010/main" val="2023199892"/>
+      </p:ext>
+    </p:extLst>
+  </p:cSld>
+  <p:clrMapOvr>
+    <a:masterClrMapping/>
+  </p:clrMapOvr>
+  <p:transition spd="slow">
+    <p:cut/>
+  </p:transition>
+  <p:timing>
+    <p:tnLst>
+      <p:par>
+        <p:cTn id="1" dur="indefinite" restart="never" nodeType="tmRoot">
+          <p:childTnLst>
+            <p:seq concurrent="1" nextAc="seek">
+              <p:cTn id="2" dur="indefinite" nodeType="mainSeq">
+                <p:childTnLst>
+                  <p:par>
+                    <p:cTn id="3" fill="hold">
+                      <p:stCondLst>
+                        <p:cond delay="indefinite"/>
+                      </p:stCondLst>
+                      <p:childTnLst>
+                        <p:par>
+                          <p:cTn id="4" fill="hold">
+                            <p:stCondLst>
+                              <p:cond delay="0"/>
+                            </p:stCondLst>
+                            <p:childTnLst>
+                              <p:par>
+                                <p:cTn id="5" presetID="26" presetClass="entr" presetSubtype="0" fill="hold" nodeType="clickEffect">
+                                  <p:stCondLst>
+                                    <p:cond delay="0"/>
+                                  </p:stCondLst>
+                                  <p:childTnLst>
+                                    <p:set>
+                                      <p:cBhvr>
+                                        <p:cTn id="6" dur="1" fill="hold">
+                                          <p:stCondLst>
+                                            <p:cond delay="0"/>
+                                          </p:stCondLst>
+                                        </p:cTn>
+                                        <p:tgtEl>
+                                          <p:spTgt spid="2"/>
+                                        </p:tgtEl>
+                                        <p:attrNameLst>
+                                          <p:attrName>style.visibility</p:attrName>
+                                        </p:attrNameLst>
+                                      </p:cBhvr>
+                                      <p:to>
+                                        <p:strVal val="visible"/>
+                                      </p:to>
+                                    </p:set>
+                                    <p:animEffect transition="in" filter="wipe(down)">
+                                      <p:cBhvr>
+                                        <p:cTn id="7" dur="1160">
+                                          <p:stCondLst>
+                                            <p:cond delay="0"/>
+                                          </p:stCondLst>
+                                        </p:cTn>
+                                        <p:tgtEl>
+                                          <p:spTgt spid="2"/>
+                                        </p:tgtEl>
+                                      </p:cBhvr>
+                                    </p:animEffect>
+                                    <p:anim calcmode="lin" valueType="num">
+                                      <p:cBhvr>
+                                        <p:cTn id="8" dur="3644" tmFilter="0,0; 0.14,0.36; 0.43,0.73; 0.71,0.91; 1.0,1.0">
+                                          <p:stCondLst>
+                                            <p:cond delay="0"/>
+                                          </p:stCondLst>
+                                        </p:cTn>
+                                        <p:tgtEl>
+                                          <p:spTgt spid="2"/>
+                                        </p:tgtEl>
+                                        <p:attrNameLst>
+                                          <p:attrName>ppt_x</p:attrName>
+                                        </p:attrNameLst>
+                                      </p:cBhvr>
+                                      <p:tavLst>
+                                        <p:tav tm="0">
+                                          <p:val>
+                                            <p:strVal val="#ppt_x-0.25"/>
+                                          </p:val>
+                                        </p:tav>
+                                        <p:tav tm="100000">
+                                          <p:val>
+                                            <p:strVal val="#ppt_x"/>
+                                          </p:val>
+                                        </p:tav>
+                                      </p:tavLst>
+                                    </p:anim>
+                                    <p:anim calcmode="lin" valueType="num">
+                                      <p:cBhvr>
+                                        <p:cTn id="9" dur="1328" tmFilter="0.0,0.0; 0.25,0.07; 0.50,0.2; 0.75,0.467; 1.0,1.0">
+                                          <p:stCondLst>
+                                            <p:cond delay="0"/>
+                                          </p:stCondLst>
+                                        </p:cTn>
+                                        <p:tgtEl>
+                                          <p:spTgt spid="2"/>
+                                        </p:tgtEl>
+                                        <p:attrNameLst>
+                                          <p:attrName>ppt_y</p:attrName>
+                                        </p:attrNameLst>
+                                      </p:cBhvr>
+                                      <p:tavLst>
+                                        <p:tav tm="0" fmla="#ppt_y-sin(pi*$)/3">
+                                          <p:val>
+                                            <p:fltVal val="0.5"/>
+                                          </p:val>
+                                        </p:tav>
+                                        <p:tav tm="100000">
+                                          <p:val>
+                                            <p:fltVal val="1"/>
+                                          </p:val>
+                                        </p:tav>
+                                      </p:tavLst>
+                                    </p:anim>
+                                    <p:anim calcmode="lin" valueType="num">
+                                      <p:cBhvr>
+                                        <p:cTn id="10" dur="1328" tmFilter="0, 0; 0.125,0.2665; 0.25,0.4; 0.375,0.465; 0.5,0.5;  0.625,0.535; 0.75,0.6; 0.875,0.7335; 1,1">
+                                          <p:stCondLst>
+                                            <p:cond delay="1328"/>
+                                          </p:stCondLst>
+                                        </p:cTn>
+                                        <p:tgtEl>
+                                          <p:spTgt spid="2"/>
+                                        </p:tgtEl>
+                                        <p:attrNameLst>
+                                          <p:attrName>ppt_y</p:attrName>
+                                        </p:attrNameLst>
+                                      </p:cBhvr>
+                                      <p:tavLst>
+                                        <p:tav tm="0" fmla="#ppt_y-sin(pi*$)/9">
+                                          <p:val>
+                                            <p:fltVal val="0"/>
+                                          </p:val>
+                                        </p:tav>
+                                        <p:tav tm="100000">
+                                          <p:val>
+                                            <p:fltVal val="1"/>
+                                          </p:val>
+                                        </p:tav>
+                                      </p:tavLst>
+                                    </p:anim>
+                                    <p:anim calcmode="lin" valueType="num">
+                                      <p:cBhvr>
+                                        <p:cTn id="11" dur="664" tmFilter="0, 0; 0.125,0.2665; 0.25,0.4; 0.375,0.465; 0.5,0.5;  0.625,0.535; 0.75,0.6; 0.875,0.7335; 1,1">
+                                          <p:stCondLst>
+                                            <p:cond delay="2648"/>
+                                          </p:stCondLst>
+                                        </p:cTn>
+                                        <p:tgtEl>
+                                          <p:spTgt spid="2"/>
+                                        </p:tgtEl>
+                                        <p:attrNameLst>
+                                          <p:attrName>ppt_y</p:attrName>
+                                        </p:attrNameLst>
+                                      </p:cBhvr>
+                                      <p:tavLst>
+                                        <p:tav tm="0" fmla="#ppt_y-sin(pi*$)/27">
+                                          <p:val>
+                                            <p:fltVal val="0"/>
+                                          </p:val>
+                                        </p:tav>
+                                        <p:tav tm="100000">
+                                          <p:val>
+                                            <p:fltVal val="1"/>
+                                          </p:val>
+                                        </p:tav>
+                                      </p:tavLst>
+                                    </p:anim>
+                                    <p:anim calcmode="lin" valueType="num">
+                                      <p:cBhvr>
+                                        <p:cTn id="12" dur="328" tmFilter="0, 0; 0.125,0.2665; 0.25,0.4; 0.375,0.465; 0.5,0.5;  0.625,0.535; 0.75,0.6; 0.875,0.7335; 1,1">
+                                          <p:stCondLst>
+                                            <p:cond delay="3312"/>
+                                          </p:stCondLst>
+                                        </p:cTn>
+                                        <p:tgtEl>
+                                          <p:spTgt spid="2"/>
+                                        </p:tgtEl>
+                                        <p:attrNameLst>
+                                          <p:attrName>ppt_y</p:attrName>
+                                        </p:attrNameLst>
+                                      </p:cBhvr>
+                                      <p:tavLst>
+                                        <p:tav tm="0" fmla="#ppt_y-sin(pi*$)/81">
+                                          <p:val>
+                                            <p:fltVal val="0"/>
+                                          </p:val>
+                                        </p:tav>
+                                        <p:tav tm="100000">
+                                          <p:val>
+                                            <p:fltVal val="1"/>
+                                          </p:val>
+                                        </p:tav>
+                                      </p:tavLst>
+                                    </p:anim>
+                                    <p:animScale>
+                                      <p:cBhvr>
+                                        <p:cTn id="13" dur="52">
+                                          <p:stCondLst>
+                                            <p:cond delay="1300"/>
+                                          </p:stCondLst>
+                                        </p:cTn>
+                                        <p:tgtEl>
+                                          <p:spTgt spid="2"/>
+                                        </p:tgtEl>
+                                      </p:cBhvr>
+                                      <p:to x="100000" y="60000"/>
+                                    </p:animScale>
+                                    <p:animScale>
+                                      <p:cBhvr>
+                                        <p:cTn id="14" dur="332" decel="50000">
+                                          <p:stCondLst>
+                                            <p:cond delay="1352"/>
+                                          </p:stCondLst>
+                                        </p:cTn>
+                                        <p:tgtEl>
+                                          <p:spTgt spid="2"/>
+                                        </p:tgtEl>
+                                      </p:cBhvr>
+                                      <p:to x="100000" y="100000"/>
+                                    </p:animScale>
+                                    <p:animScale>
+                                      <p:cBhvr>
+                                        <p:cTn id="15" dur="52">
+                                          <p:stCondLst>
+                                            <p:cond delay="2624"/>
+                                          </p:stCondLst>
+                                        </p:cTn>
+                                        <p:tgtEl>
+                                          <p:spTgt spid="2"/>
+                                        </p:tgtEl>
+                                      </p:cBhvr>
+                                      <p:to x="100000" y="80000"/>
+                                    </p:animScale>
+                                    <p:animScale>
+                                      <p:cBhvr>
+                                        <p:cTn id="16" dur="332" decel="50000">
+                                          <p:stCondLst>
+                                            <p:cond delay="2676"/>
+                                          </p:stCondLst>
+                                        </p:cTn>
+                                        <p:tgtEl>
+                                          <p:spTgt spid="2"/>
+                                        </p:tgtEl>
+                                      </p:cBhvr>
+                                      <p:to x="100000" y="100000"/>
+                                    </p:animScale>
+                                    <p:animScale>
+                                      <p:cBhvr>
+                                        <p:cTn id="17" dur="52">
+                                          <p:stCondLst>
+                                            <p:cond delay="3284"/>
+                                          </p:stCondLst>
+                                        </p:cTn>
+                                        <p:tgtEl>
+                                          <p:spTgt spid="2"/>
+                                        </p:tgtEl>
+                                      </p:cBhvr>
+                                      <p:to x="100000" y="90000"/>
+                                    </p:animScale>
+                                    <p:animScale>
+                                      <p:cBhvr>
+                                        <p:cTn id="18" dur="332" decel="50000">
+                                          <p:stCondLst>
+                                            <p:cond delay="3336"/>
+                                          </p:stCondLst>
+                                        </p:cTn>
+                                        <p:tgtEl>
+                                          <p:spTgt spid="2"/>
+                                        </p:tgtEl>
+                                      </p:cBhvr>
+                                      <p:to x="100000" y="100000"/>
+                                    </p:animScale>
+                                    <p:animScale>
+                                      <p:cBhvr>
+                                        <p:cTn id="19" dur="52">
+                                          <p:stCondLst>
+                                            <p:cond delay="3616"/>
+                                          </p:stCondLst>
+                                        </p:cTn>
+                                        <p:tgtEl>
+                                          <p:spTgt spid="2"/>
+                                        </p:tgtEl>
+                                      </p:cBhvr>
+                                      <p:to x="100000" y="95000"/>
+                                    </p:animScale>
+                                    <p:animScale>
+                                      <p:cBhvr>
+                                        <p:cTn id="20" dur="332" decel="50000">
+                                          <p:stCondLst>
+                                            <p:cond delay="3668"/>
+                                          </p:stCondLst>
+                                        </p:cTn>
+                                        <p:tgtEl>
+                                          <p:spTgt spid="2"/>
+                                        </p:tgtEl>
+                                      </p:cBhvr>
+                                      <p:to x="100000" y="100000"/>
+                                    </p:animScale>
+                                  </p:childTnLst>
+                                </p:cTn>
+                              </p:par>
+                            </p:childTnLst>
+                          </p:cTn>
+                        </p:par>
+                      </p:childTnLst>
+                    </p:cTn>
+                  </p:par>
+                </p:childTnLst>
+              </p:cTn>
+              <p:prevCondLst>
+                <p:cond evt="onPrev" delay="0">
+                  <p:tgtEl>
+                    <p:sldTgt/>
+                  </p:tgtEl>
+                </p:cond>
+              </p:prevCondLst>
+              <p:nextCondLst>
+                <p:cond evt="onNext" delay="0">
+                  <p:tgtEl>
+                    <p:sldTgt/>
+                  </p:tgtEl>
+                </p:cond>
+              </p:nextCondLst>
+            </p:seq>
+          </p:childTnLst>
+        </p:cTn>
+      </p:par>
+    </p:tnLst>
   </p:timing>
 </p:sld>
 </file>
@@ -14934,6 +15731,1176 @@
                   <a:srgbClr val="003366"/>
                 </a:solidFill>
               </a:rPr>
+              <a:t>Functional Role</a:t>
+            </a:r>
+            <a:endParaRPr lang="en-US" sz="3000" b="0" i="1" dirty="0">
+              <a:solidFill>
+                <a:srgbClr val="003366"/>
+              </a:solidFill>
+            </a:endParaRPr>
+          </a:p>
+        </p:txBody>
+      </p:sp>
+      <p:sp>
+        <p:nvSpPr>
+          <p:cNvPr id="52" name="Shape 52"/>
+          <p:cNvSpPr txBox="1">
+            <a:spLocks noGrp="1"/>
+          </p:cNvSpPr>
+          <p:nvPr>
+            <p:ph type="body" idx="1"/>
+          </p:nvPr>
+        </p:nvSpPr>
+        <p:spPr>
+          <a:xfrm>
+            <a:off x="314900" y="2149086"/>
+            <a:ext cx="8229600" cy="2634017"/>
+          </a:xfrm>
+          <a:prstGeom prst="rect">
+            <a:avLst/>
+          </a:prstGeom>
+        </p:spPr>
+        <p:txBody>
+          <a:bodyPr lIns="91425" tIns="91425" rIns="91425" bIns="91425" anchor="ctr" anchorCtr="0">
+            <a:noAutofit/>
+          </a:bodyPr>
+          <a:lstStyle/>
+          <a:p>
+            <a:pPr algn="just">
+              <a:buNone/>
+            </a:pPr>
+            <a:r>
+              <a:rPr lang="en-US" sz="2400" i="1" dirty="0" err="1">
+                <a:solidFill>
+                  <a:schemeClr val="accent1">
+                    <a:lumMod val="50000"/>
+                  </a:schemeClr>
+                </a:solidFill>
+              </a:rPr>
+              <a:t>ListSubCompontentsCommand</a:t>
+            </a:r>
+            <a:r>
+              <a:rPr lang="en-US" sz="2400" i="1" dirty="0">
+                <a:solidFill>
+                  <a:schemeClr val="accent1">
+                    <a:lumMod val="50000"/>
+                  </a:schemeClr>
+                </a:solidFill>
+              </a:rPr>
+              <a:t> </a:t>
+            </a:r>
+            <a:r>
+              <a:rPr lang="en-US" sz="2400" dirty="0">
+                <a:solidFill>
+                  <a:schemeClr val="accent1">
+                    <a:lumMod val="50000"/>
+                  </a:schemeClr>
+                </a:solidFill>
+              </a:rPr>
+              <a:t>is an implementation of </a:t>
+            </a:r>
+            <a:r>
+              <a:rPr lang="en-US" sz="2400" i="1" dirty="0" err="1">
+                <a:solidFill>
+                  <a:schemeClr val="accent1">
+                    <a:lumMod val="50000"/>
+                  </a:schemeClr>
+                </a:solidFill>
+              </a:rPr>
+              <a:t>AdminCommand</a:t>
+            </a:r>
+            <a:r>
+              <a:rPr lang="en-US" sz="2400" i="1" dirty="0">
+                <a:solidFill>
+                  <a:schemeClr val="accent1">
+                    <a:lumMod val="50000"/>
+                  </a:schemeClr>
+                </a:solidFill>
+              </a:rPr>
+              <a:t>, </a:t>
+            </a:r>
+            <a:r>
+              <a:rPr lang="en-US" sz="2400" dirty="0">
+                <a:solidFill>
+                  <a:schemeClr val="accent1">
+                    <a:lumMod val="50000"/>
+                  </a:schemeClr>
+                </a:solidFill>
+              </a:rPr>
+              <a:t>an interface to provide the command </a:t>
+            </a:r>
+            <a:r>
+              <a:rPr lang="en-US" sz="2400" i="1" dirty="0">
+                <a:solidFill>
+                  <a:schemeClr val="accent1">
+                    <a:lumMod val="50000"/>
+                  </a:schemeClr>
+                </a:solidFill>
+              </a:rPr>
+              <a:t>list-sub-components</a:t>
+            </a:r>
+            <a:r>
+              <a:rPr lang="en-US" sz="2400" dirty="0">
+                <a:solidFill>
+                  <a:schemeClr val="accent1">
+                    <a:lumMod val="50000"/>
+                  </a:schemeClr>
+                </a:solidFill>
+              </a:rPr>
+              <a:t> to </a:t>
+            </a:r>
+            <a:r>
+              <a:rPr lang="en-US" sz="2400" i="1" dirty="0" err="1">
+                <a:solidFill>
+                  <a:schemeClr val="accent1">
+                    <a:lumMod val="50000"/>
+                  </a:schemeClr>
+                </a:solidFill>
+              </a:rPr>
+              <a:t>asadmin</a:t>
+            </a:r>
+            <a:r>
+              <a:rPr lang="en-US" sz="2400" dirty="0">
+                <a:solidFill>
+                  <a:schemeClr val="accent1">
+                    <a:lumMod val="50000"/>
+                  </a:schemeClr>
+                </a:solidFill>
+              </a:rPr>
+              <a:t> utility of </a:t>
+            </a:r>
+            <a:r>
+              <a:rPr lang="en-US" sz="2400" dirty="0" err="1">
+                <a:solidFill>
+                  <a:schemeClr val="accent1">
+                    <a:lumMod val="50000"/>
+                  </a:schemeClr>
+                </a:solidFill>
+              </a:rPr>
+              <a:t>GlassFish</a:t>
+            </a:r>
+            <a:r>
+              <a:rPr lang="en-US" sz="2400" dirty="0">
+                <a:solidFill>
+                  <a:schemeClr val="accent1">
+                    <a:lumMod val="50000"/>
+                  </a:schemeClr>
+                </a:solidFill>
+              </a:rPr>
+              <a:t> server. </a:t>
+            </a:r>
+            <a:endParaRPr lang="en-US" sz="2400" dirty="0" smtClean="0">
+              <a:solidFill>
+                <a:schemeClr val="accent1">
+                  <a:lumMod val="50000"/>
+                </a:schemeClr>
+              </a:solidFill>
+            </a:endParaRPr>
+          </a:p>
+          <a:p>
+            <a:pPr algn="just">
+              <a:buNone/>
+            </a:pPr>
+            <a:endParaRPr lang="en-US" sz="2400" dirty="0">
+              <a:solidFill>
+                <a:schemeClr val="accent1">
+                  <a:lumMod val="50000"/>
+                </a:schemeClr>
+              </a:solidFill>
+            </a:endParaRPr>
+          </a:p>
+          <a:p>
+            <a:pPr algn="just">
+              <a:buNone/>
+            </a:pPr>
+            <a:r>
+              <a:rPr lang="en-US" sz="2400" dirty="0" smtClean="0">
+                <a:solidFill>
+                  <a:schemeClr val="accent1">
+                    <a:lumMod val="50000"/>
+                  </a:schemeClr>
+                </a:solidFill>
+              </a:rPr>
+              <a:t>A </a:t>
+            </a:r>
+            <a:r>
+              <a:rPr lang="en-US" sz="2400" dirty="0">
+                <a:solidFill>
+                  <a:schemeClr val="accent1">
+                    <a:lumMod val="50000"/>
+                  </a:schemeClr>
+                </a:solidFill>
+              </a:rPr>
+              <a:t>brief description of this command is given by </a:t>
+            </a:r>
+            <a:r>
+              <a:rPr lang="en-US" sz="2400" dirty="0" err="1">
+                <a:solidFill>
+                  <a:schemeClr val="accent1">
+                    <a:lumMod val="50000"/>
+                  </a:schemeClr>
+                </a:solidFill>
+              </a:rPr>
+              <a:t>GlassFish</a:t>
+            </a:r>
+            <a:r>
+              <a:rPr lang="en-US" sz="2400" dirty="0">
+                <a:solidFill>
+                  <a:schemeClr val="accent1">
+                    <a:lumMod val="50000"/>
+                  </a:schemeClr>
+                </a:solidFill>
+              </a:rPr>
+              <a:t> documentation:</a:t>
+            </a:r>
+          </a:p>
+          <a:p>
+            <a:pPr algn="just">
+              <a:buNone/>
+            </a:pPr>
+            <a:r>
+              <a:rPr lang="en-US" sz="2000" i="1" dirty="0">
+                <a:solidFill>
+                  <a:schemeClr val="tx1">
+                    <a:lumMod val="95000"/>
+                    <a:lumOff val="5000"/>
+                  </a:schemeClr>
+                </a:solidFill>
+              </a:rPr>
+              <a:t> </a:t>
+            </a:r>
+          </a:p>
+          <a:p>
+            <a:pPr algn="just">
+              <a:buNone/>
+            </a:pPr>
+            <a:r>
+              <a:rPr lang="en-US" sz="2000" i="1" dirty="0" smtClean="0">
+                <a:solidFill>
+                  <a:schemeClr val="tx1">
+                    <a:lumMod val="95000"/>
+                    <a:lumOff val="5000"/>
+                  </a:schemeClr>
+                </a:solidFill>
+                <a:latin typeface="Calibri" panose="020F0502020204030204" pitchFamily="34" charset="0"/>
+              </a:rPr>
+              <a:t>“ The</a:t>
+            </a:r>
+            <a:r>
+              <a:rPr lang="en-US" sz="2000" i="1" dirty="0">
+                <a:solidFill>
+                  <a:schemeClr val="tx1">
+                    <a:lumMod val="95000"/>
+                    <a:lumOff val="5000"/>
+                  </a:schemeClr>
+                </a:solidFill>
+                <a:latin typeface="Calibri" panose="020F0502020204030204" pitchFamily="34" charset="0"/>
+              </a:rPr>
+              <a:t> list-sub-commands subcommand lists EJBs or servlets in a deployed module or in a module of a deployed application. If a module is not specified, all modules are listed. The </a:t>
+            </a:r>
+            <a:r>
+              <a:rPr lang="en-US" sz="2000" b="1" i="1" dirty="0">
+                <a:solidFill>
+                  <a:schemeClr val="tx1">
+                    <a:lumMod val="95000"/>
+                    <a:lumOff val="5000"/>
+                  </a:schemeClr>
+                </a:solidFill>
+                <a:latin typeface="Calibri" panose="020F0502020204030204" pitchFamily="34" charset="0"/>
+              </a:rPr>
+              <a:t>--</a:t>
+            </a:r>
+            <a:r>
+              <a:rPr lang="en-US" sz="2000" b="1" i="1" dirty="0" err="1">
+                <a:solidFill>
+                  <a:schemeClr val="tx1">
+                    <a:lumMod val="95000"/>
+                    <a:lumOff val="5000"/>
+                  </a:schemeClr>
+                </a:solidFill>
+                <a:latin typeface="Calibri" panose="020F0502020204030204" pitchFamily="34" charset="0"/>
+              </a:rPr>
+              <a:t>appname</a:t>
+            </a:r>
+            <a:r>
+              <a:rPr lang="en-US" sz="2000" i="1" dirty="0">
+                <a:solidFill>
+                  <a:schemeClr val="tx1">
+                    <a:lumMod val="95000"/>
+                    <a:lumOff val="5000"/>
+                  </a:schemeClr>
+                </a:solidFill>
+                <a:latin typeface="Calibri" panose="020F0502020204030204" pitchFamily="34" charset="0"/>
+              </a:rPr>
+              <a:t> option functions only when the specified module is standalone. </a:t>
+            </a:r>
+            <a:endParaRPr lang="en-US" sz="2000" i="1" dirty="0" smtClean="0">
+              <a:solidFill>
+                <a:schemeClr val="tx1">
+                  <a:lumMod val="95000"/>
+                  <a:lumOff val="5000"/>
+                </a:schemeClr>
+              </a:solidFill>
+              <a:latin typeface="Calibri" panose="020F0502020204030204" pitchFamily="34" charset="0"/>
+            </a:endParaRPr>
+          </a:p>
+          <a:p>
+            <a:pPr algn="just">
+              <a:buNone/>
+            </a:pPr>
+            <a:r>
+              <a:rPr lang="en-US" sz="2000" i="1" dirty="0" smtClean="0">
+                <a:solidFill>
+                  <a:schemeClr val="tx1">
+                    <a:lumMod val="95000"/>
+                    <a:lumOff val="5000"/>
+                  </a:schemeClr>
+                </a:solidFill>
+                <a:latin typeface="Calibri" panose="020F0502020204030204" pitchFamily="34" charset="0"/>
+              </a:rPr>
+              <a:t>To </a:t>
+            </a:r>
+            <a:r>
+              <a:rPr lang="en-US" sz="2000" i="1" dirty="0">
+                <a:solidFill>
+                  <a:schemeClr val="tx1">
+                    <a:lumMod val="95000"/>
+                    <a:lumOff val="5000"/>
+                  </a:schemeClr>
+                </a:solidFill>
+                <a:latin typeface="Calibri" panose="020F0502020204030204" pitchFamily="34" charset="0"/>
+              </a:rPr>
+              <a:t>display a specific module in an application, you must specify the module name with the </a:t>
+            </a:r>
+            <a:r>
+              <a:rPr lang="en-US" sz="2000" b="1" i="1" dirty="0" smtClean="0">
+                <a:solidFill>
+                  <a:schemeClr val="tx1">
+                    <a:lumMod val="95000"/>
+                    <a:lumOff val="5000"/>
+                  </a:schemeClr>
+                </a:solidFill>
+                <a:latin typeface="Calibri" panose="020F0502020204030204" pitchFamily="34" charset="0"/>
+              </a:rPr>
+              <a:t>--</a:t>
+            </a:r>
+            <a:r>
+              <a:rPr lang="en-US" sz="2000" b="1" i="1" dirty="0" err="1">
+                <a:solidFill>
+                  <a:schemeClr val="tx1">
+                    <a:lumMod val="95000"/>
+                    <a:lumOff val="5000"/>
+                  </a:schemeClr>
+                </a:solidFill>
+                <a:latin typeface="Calibri" panose="020F0502020204030204" pitchFamily="34" charset="0"/>
+              </a:rPr>
+              <a:t>appname</a:t>
+            </a:r>
+            <a:r>
+              <a:rPr lang="en-US" sz="2000" i="1" dirty="0">
+                <a:solidFill>
+                  <a:schemeClr val="tx1">
+                    <a:lumMod val="95000"/>
+                    <a:lumOff val="5000"/>
+                  </a:schemeClr>
+                </a:solidFill>
+                <a:latin typeface="Calibri" panose="020F0502020204030204" pitchFamily="34" charset="0"/>
+              </a:rPr>
+              <a:t> option</a:t>
+            </a:r>
+            <a:r>
+              <a:rPr lang="en-US" sz="2000" i="1" dirty="0" smtClean="0">
+                <a:solidFill>
+                  <a:schemeClr val="tx1">
+                    <a:lumMod val="95000"/>
+                    <a:lumOff val="5000"/>
+                  </a:schemeClr>
+                </a:solidFill>
+                <a:latin typeface="Calibri" panose="020F0502020204030204" pitchFamily="34" charset="0"/>
+              </a:rPr>
+              <a:t>. ”</a:t>
+            </a:r>
+            <a:endParaRPr lang="en-US" sz="2000" i="1" dirty="0">
+              <a:solidFill>
+                <a:schemeClr val="tx1">
+                  <a:lumMod val="95000"/>
+                  <a:lumOff val="5000"/>
+                </a:schemeClr>
+              </a:solidFill>
+              <a:latin typeface="Calibri" panose="020F0502020204030204" pitchFamily="34" charset="0"/>
+            </a:endParaRPr>
+          </a:p>
+        </p:txBody>
+      </p:sp>
+      <p:pic>
+        <p:nvPicPr>
+          <p:cNvPr id="53" name="Shape 53"/>
+          <p:cNvPicPr preferRelativeResize="0"/>
+          <p:nvPr/>
+        </p:nvPicPr>
+        <p:blipFill>
+          <a:blip r:embed="rId3">
+            <a:alphaModFix/>
+          </a:blip>
+          <a:stretch>
+            <a:fillRect/>
+          </a:stretch>
+        </p:blipFill>
+        <p:spPr>
+          <a:xfrm>
+            <a:off x="82450" y="65950"/>
+            <a:ext cx="464900" cy="498650"/>
+          </a:xfrm>
+          <a:prstGeom prst="rect">
+            <a:avLst/>
+          </a:prstGeom>
+          <a:noFill/>
+          <a:ln>
+            <a:noFill/>
+          </a:ln>
+        </p:spPr>
+      </p:pic>
+      <p:pic>
+        <p:nvPicPr>
+          <p:cNvPr id="54" name="Shape 54"/>
+          <p:cNvPicPr preferRelativeResize="0"/>
+          <p:nvPr/>
+        </p:nvPicPr>
+        <p:blipFill>
+          <a:blip r:embed="rId4">
+            <a:alphaModFix/>
+          </a:blip>
+          <a:stretch>
+            <a:fillRect/>
+          </a:stretch>
+        </p:blipFill>
+        <p:spPr>
+          <a:xfrm>
+            <a:off x="0" y="630539"/>
+            <a:ext cx="9143998" cy="97471"/>
+          </a:xfrm>
+          <a:prstGeom prst="rect">
+            <a:avLst/>
+          </a:prstGeom>
+          <a:noFill/>
+          <a:ln>
+            <a:noFill/>
+          </a:ln>
+        </p:spPr>
+      </p:pic>
+      <p:cxnSp>
+        <p:nvCxnSpPr>
+          <p:cNvPr id="55" name="Shape 55"/>
+          <p:cNvCxnSpPr/>
+          <p:nvPr/>
+        </p:nvCxnSpPr>
+        <p:spPr>
+          <a:xfrm rot="10800000">
+            <a:off x="691550" y="125"/>
+            <a:ext cx="0" cy="630299"/>
+          </a:xfrm>
+          <a:prstGeom prst="straightConnector1">
+            <a:avLst/>
+          </a:prstGeom>
+          <a:noFill/>
+          <a:ln w="9525" cap="flat">
+            <a:solidFill>
+              <a:srgbClr val="003366"/>
+            </a:solidFill>
+            <a:prstDash val="solid"/>
+            <a:round/>
+            <a:headEnd type="none" w="lg" len="lg"/>
+            <a:tailEnd type="none" w="lg" len="lg"/>
+          </a:ln>
+        </p:spPr>
+      </p:cxnSp>
+      <p:sp>
+        <p:nvSpPr>
+          <p:cNvPr id="56" name="Shape 56"/>
+          <p:cNvSpPr txBox="1"/>
+          <p:nvPr/>
+        </p:nvSpPr>
+        <p:spPr>
+          <a:xfrm>
+            <a:off x="6783700" y="6531000"/>
+            <a:ext cx="2599200" cy="363899"/>
+          </a:xfrm>
+          <a:prstGeom prst="rect">
+            <a:avLst/>
+          </a:prstGeom>
+          <a:noFill/>
+          <a:ln>
+            <a:noFill/>
+          </a:ln>
+        </p:spPr>
+        <p:txBody>
+          <a:bodyPr lIns="91425" tIns="91425" rIns="91425" bIns="91425" anchor="t" anchorCtr="0">
+            <a:noAutofit/>
+          </a:bodyPr>
+          <a:lstStyle/>
+          <a:p>
+            <a:pPr lvl="0" rtl="0">
+              <a:spcBef>
+                <a:spcPts val="0"/>
+              </a:spcBef>
+              <a:buNone/>
+            </a:pPr>
+            <a:r>
+              <a:rPr lang="it" sz="1200" b="1">
+                <a:solidFill>
+                  <a:srgbClr val="FFFFFF"/>
+                </a:solidFill>
+              </a:rPr>
+              <a:t>POLITECNICO DI MILANO</a:t>
+            </a:r>
+          </a:p>
+        </p:txBody>
+      </p:sp>
+      <p:pic>
+        <p:nvPicPr>
+          <p:cNvPr id="57" name="Shape 57"/>
+          <p:cNvPicPr preferRelativeResize="0"/>
+          <p:nvPr/>
+        </p:nvPicPr>
+        <p:blipFill>
+          <a:blip r:embed="rId5">
+            <a:alphaModFix/>
+          </a:blip>
+          <a:stretch>
+            <a:fillRect/>
+          </a:stretch>
+        </p:blipFill>
+        <p:spPr>
+          <a:xfrm>
+            <a:off x="0" y="6571225"/>
+            <a:ext cx="9144000" cy="286775"/>
+          </a:xfrm>
+          <a:prstGeom prst="rect">
+            <a:avLst/>
+          </a:prstGeom>
+          <a:noFill/>
+          <a:ln>
+            <a:noFill/>
+          </a:ln>
+        </p:spPr>
+      </p:pic>
+      <p:sp>
+        <p:nvSpPr>
+          <p:cNvPr id="58" name="Shape 58"/>
+          <p:cNvSpPr txBox="1">
+            <a:spLocks noGrp="1"/>
+          </p:cNvSpPr>
+          <p:nvPr>
+            <p:ph type="ctrTitle" idx="4294967295"/>
+          </p:nvPr>
+        </p:nvSpPr>
+        <p:spPr>
+          <a:xfrm>
+            <a:off x="457200" y="6712949"/>
+            <a:ext cx="5162269" cy="281444"/>
+          </a:xfrm>
+          <a:prstGeom prst="rect">
+            <a:avLst/>
+          </a:prstGeom>
+        </p:spPr>
+        <p:txBody>
+          <a:bodyPr lIns="91425" tIns="91425" rIns="91425" bIns="91425" anchor="ctr" anchorCtr="0">
+            <a:noAutofit/>
+          </a:bodyPr>
+          <a:lstStyle/>
+          <a:p>
+            <a:pPr indent="457200">
+              <a:lnSpc>
+                <a:spcPct val="115000"/>
+              </a:lnSpc>
+            </a:pPr>
+            <a:r>
+              <a:rPr lang="it-IT" sz="1300" b="1" dirty="0">
+                <a:solidFill>
+                  <a:srgbClr val="003366"/>
+                </a:solidFill>
+              </a:rPr>
+              <a:t>SE2 – Andrea Martino, Francesco Marchesani</a:t>
+            </a:r>
+            <a:br>
+              <a:rPr lang="it-IT" sz="1300" b="1" dirty="0">
+                <a:solidFill>
+                  <a:srgbClr val="003366"/>
+                </a:solidFill>
+              </a:rPr>
+            </a:br>
+            <a:endParaRPr sz="1300" dirty="0">
+              <a:solidFill>
+                <a:srgbClr val="003366"/>
+              </a:solidFill>
+            </a:endParaRPr>
+          </a:p>
+        </p:txBody>
+      </p:sp>
+    </p:spTree>
+    <p:extLst>
+      <p:ext uri="{BB962C8B-B14F-4D97-AF65-F5344CB8AC3E}">
+        <p14:creationId xmlns:p14="http://schemas.microsoft.com/office/powerpoint/2010/main" val="2080236638"/>
+      </p:ext>
+    </p:extLst>
+  </p:cSld>
+  <p:clrMapOvr>
+    <a:masterClrMapping/>
+  </p:clrMapOvr>
+  <p:transition spd="slow">
+    <p:cut/>
+  </p:transition>
+  <p:timing>
+    <p:tnLst>
+      <p:par>
+        <p:cTn id="1" dur="indefinite" restart="never" nodeType="tmRoot">
+          <p:childTnLst>
+            <p:seq concurrent="1" nextAc="seek">
+              <p:cTn id="2" dur="indefinite" nodeType="mainSeq">
+                <p:childTnLst>
+                  <p:par>
+                    <p:cTn id="3" fill="hold">
+                      <p:stCondLst>
+                        <p:cond delay="indefinite"/>
+                        <p:cond evt="onBegin" delay="0">
+                          <p:tn val="2"/>
+                        </p:cond>
+                      </p:stCondLst>
+                      <p:childTnLst>
+                        <p:par>
+                          <p:cTn id="4" fill="hold">
+                            <p:stCondLst>
+                              <p:cond delay="0"/>
+                            </p:stCondLst>
+                            <p:childTnLst>
+                              <p:par>
+                                <p:cTn id="5" presetID="42" presetClass="entr" presetSubtype="0" fill="hold" grpId="0" nodeType="withEffect">
+                                  <p:stCondLst>
+                                    <p:cond delay="0"/>
+                                  </p:stCondLst>
+                                  <p:childTnLst>
+                                    <p:set>
+                                      <p:cBhvr>
+                                        <p:cTn id="6" dur="1" fill="hold">
+                                          <p:stCondLst>
+                                            <p:cond delay="0"/>
+                                          </p:stCondLst>
+                                        </p:cTn>
+                                        <p:tgtEl>
+                                          <p:spTgt spid="52">
+                                            <p:txEl>
+                                              <p:pRg st="0" end="0"/>
+                                            </p:txEl>
+                                          </p:spTgt>
+                                        </p:tgtEl>
+                                        <p:attrNameLst>
+                                          <p:attrName>style.visibility</p:attrName>
+                                        </p:attrNameLst>
+                                      </p:cBhvr>
+                                      <p:to>
+                                        <p:strVal val="visible"/>
+                                      </p:to>
+                                    </p:set>
+                                    <p:animEffect transition="in" filter="fade">
+                                      <p:cBhvr>
+                                        <p:cTn id="7" dur="1000"/>
+                                        <p:tgtEl>
+                                          <p:spTgt spid="52">
+                                            <p:txEl>
+                                              <p:pRg st="0" end="0"/>
+                                            </p:txEl>
+                                          </p:spTgt>
+                                        </p:tgtEl>
+                                      </p:cBhvr>
+                                    </p:animEffect>
+                                    <p:anim calcmode="lin" valueType="num">
+                                      <p:cBhvr>
+                                        <p:cTn id="8" dur="1000" fill="hold"/>
+                                        <p:tgtEl>
+                                          <p:spTgt spid="52">
+                                            <p:txEl>
+                                              <p:pRg st="0" end="0"/>
+                                            </p:txEl>
+                                          </p:spTgt>
+                                        </p:tgtEl>
+                                        <p:attrNameLst>
+                                          <p:attrName>ppt_x</p:attrName>
+                                        </p:attrNameLst>
+                                      </p:cBhvr>
+                                      <p:tavLst>
+                                        <p:tav tm="0">
+                                          <p:val>
+                                            <p:strVal val="#ppt_x"/>
+                                          </p:val>
+                                        </p:tav>
+                                        <p:tav tm="100000">
+                                          <p:val>
+                                            <p:strVal val="#ppt_x"/>
+                                          </p:val>
+                                        </p:tav>
+                                      </p:tavLst>
+                                    </p:anim>
+                                    <p:anim calcmode="lin" valueType="num">
+                                      <p:cBhvr>
+                                        <p:cTn id="9" dur="1000" fill="hold"/>
+                                        <p:tgtEl>
+                                          <p:spTgt spid="52">
+                                            <p:txEl>
+                                              <p:pRg st="0" end="0"/>
+                                            </p:txEl>
+                                          </p:spTgt>
+                                        </p:tgtEl>
+                                        <p:attrNameLst>
+                                          <p:attrName>ppt_y</p:attrName>
+                                        </p:attrNameLst>
+                                      </p:cBhvr>
+                                      <p:tavLst>
+                                        <p:tav tm="0">
+                                          <p:val>
+                                            <p:strVal val="#ppt_y+.1"/>
+                                          </p:val>
+                                        </p:tav>
+                                        <p:tav tm="100000">
+                                          <p:val>
+                                            <p:strVal val="#ppt_y"/>
+                                          </p:val>
+                                        </p:tav>
+                                      </p:tavLst>
+                                    </p:anim>
+                                  </p:childTnLst>
+                                </p:cTn>
+                              </p:par>
+                              <p:par>
+                                <p:cTn id="10" presetID="42" presetClass="entr" presetSubtype="0" fill="hold" grpId="0" nodeType="withEffect">
+                                  <p:stCondLst>
+                                    <p:cond delay="0"/>
+                                  </p:stCondLst>
+                                  <p:childTnLst>
+                                    <p:set>
+                                      <p:cBhvr>
+                                        <p:cTn id="11" dur="1" fill="hold">
+                                          <p:stCondLst>
+                                            <p:cond delay="0"/>
+                                          </p:stCondLst>
+                                        </p:cTn>
+                                        <p:tgtEl>
+                                          <p:spTgt spid="52">
+                                            <p:txEl>
+                                              <p:pRg st="2" end="2"/>
+                                            </p:txEl>
+                                          </p:spTgt>
+                                        </p:tgtEl>
+                                        <p:attrNameLst>
+                                          <p:attrName>style.visibility</p:attrName>
+                                        </p:attrNameLst>
+                                      </p:cBhvr>
+                                      <p:to>
+                                        <p:strVal val="visible"/>
+                                      </p:to>
+                                    </p:set>
+                                    <p:animEffect transition="in" filter="fade">
+                                      <p:cBhvr>
+                                        <p:cTn id="12" dur="1000"/>
+                                        <p:tgtEl>
+                                          <p:spTgt spid="52">
+                                            <p:txEl>
+                                              <p:pRg st="2" end="2"/>
+                                            </p:txEl>
+                                          </p:spTgt>
+                                        </p:tgtEl>
+                                      </p:cBhvr>
+                                    </p:animEffect>
+                                    <p:anim calcmode="lin" valueType="num">
+                                      <p:cBhvr>
+                                        <p:cTn id="13" dur="1000" fill="hold"/>
+                                        <p:tgtEl>
+                                          <p:spTgt spid="52">
+                                            <p:txEl>
+                                              <p:pRg st="2" end="2"/>
+                                            </p:txEl>
+                                          </p:spTgt>
+                                        </p:tgtEl>
+                                        <p:attrNameLst>
+                                          <p:attrName>ppt_x</p:attrName>
+                                        </p:attrNameLst>
+                                      </p:cBhvr>
+                                      <p:tavLst>
+                                        <p:tav tm="0">
+                                          <p:val>
+                                            <p:strVal val="#ppt_x"/>
+                                          </p:val>
+                                        </p:tav>
+                                        <p:tav tm="100000">
+                                          <p:val>
+                                            <p:strVal val="#ppt_x"/>
+                                          </p:val>
+                                        </p:tav>
+                                      </p:tavLst>
+                                    </p:anim>
+                                    <p:anim calcmode="lin" valueType="num">
+                                      <p:cBhvr>
+                                        <p:cTn id="14" dur="1000" fill="hold"/>
+                                        <p:tgtEl>
+                                          <p:spTgt spid="52">
+                                            <p:txEl>
+                                              <p:pRg st="2" end="2"/>
+                                            </p:txEl>
+                                          </p:spTgt>
+                                        </p:tgtEl>
+                                        <p:attrNameLst>
+                                          <p:attrName>ppt_y</p:attrName>
+                                        </p:attrNameLst>
+                                      </p:cBhvr>
+                                      <p:tavLst>
+                                        <p:tav tm="0">
+                                          <p:val>
+                                            <p:strVal val="#ppt_y+.1"/>
+                                          </p:val>
+                                        </p:tav>
+                                        <p:tav tm="100000">
+                                          <p:val>
+                                            <p:strVal val="#ppt_y"/>
+                                          </p:val>
+                                        </p:tav>
+                                      </p:tavLst>
+                                    </p:anim>
+                                  </p:childTnLst>
+                                </p:cTn>
+                              </p:par>
+                              <p:par>
+                                <p:cTn id="15" presetID="10" presetClass="entr" presetSubtype="0" fill="hold" grpId="0" nodeType="withEffect">
+                                  <p:stCondLst>
+                                    <p:cond delay="0"/>
+                                  </p:stCondLst>
+                                  <p:childTnLst>
+                                    <p:set>
+                                      <p:cBhvr>
+                                        <p:cTn id="16" dur="1" fill="hold">
+                                          <p:stCondLst>
+                                            <p:cond delay="0"/>
+                                          </p:stCondLst>
+                                        </p:cTn>
+                                        <p:tgtEl>
+                                          <p:spTgt spid="52">
+                                            <p:txEl>
+                                              <p:pRg st="3" end="3"/>
+                                            </p:txEl>
+                                          </p:spTgt>
+                                        </p:tgtEl>
+                                        <p:attrNameLst>
+                                          <p:attrName>style.visibility</p:attrName>
+                                        </p:attrNameLst>
+                                      </p:cBhvr>
+                                      <p:to>
+                                        <p:strVal val="visible"/>
+                                      </p:to>
+                                    </p:set>
+                                    <p:animEffect transition="in" filter="fade">
+                                      <p:cBhvr>
+                                        <p:cTn id="17" dur="500"/>
+                                        <p:tgtEl>
+                                          <p:spTgt spid="52">
+                                            <p:txEl>
+                                              <p:pRg st="3" end="3"/>
+                                            </p:txEl>
+                                          </p:spTgt>
+                                        </p:tgtEl>
+                                      </p:cBhvr>
+                                    </p:animEffect>
+                                  </p:childTnLst>
+                                </p:cTn>
+                              </p:par>
+                            </p:childTnLst>
+                          </p:cTn>
+                        </p:par>
+                        <p:par>
+                          <p:cTn id="18" fill="hold">
+                            <p:stCondLst>
+                              <p:cond delay="1000"/>
+                            </p:stCondLst>
+                            <p:childTnLst>
+                              <p:par>
+                                <p:cTn id="19" presetID="42" presetClass="entr" presetSubtype="0" fill="hold" grpId="0" nodeType="afterEffect">
+                                  <p:stCondLst>
+                                    <p:cond delay="0"/>
+                                  </p:stCondLst>
+                                  <p:childTnLst>
+                                    <p:set>
+                                      <p:cBhvr>
+                                        <p:cTn id="20" dur="1" fill="hold">
+                                          <p:stCondLst>
+                                            <p:cond delay="0"/>
+                                          </p:stCondLst>
+                                        </p:cTn>
+                                        <p:tgtEl>
+                                          <p:spTgt spid="52">
+                                            <p:txEl>
+                                              <p:pRg st="4" end="4"/>
+                                            </p:txEl>
+                                          </p:spTgt>
+                                        </p:tgtEl>
+                                        <p:attrNameLst>
+                                          <p:attrName>style.visibility</p:attrName>
+                                        </p:attrNameLst>
+                                      </p:cBhvr>
+                                      <p:to>
+                                        <p:strVal val="visible"/>
+                                      </p:to>
+                                    </p:set>
+                                    <p:animEffect transition="in" filter="fade">
+                                      <p:cBhvr>
+                                        <p:cTn id="21" dur="1000"/>
+                                        <p:tgtEl>
+                                          <p:spTgt spid="52">
+                                            <p:txEl>
+                                              <p:pRg st="4" end="4"/>
+                                            </p:txEl>
+                                          </p:spTgt>
+                                        </p:tgtEl>
+                                      </p:cBhvr>
+                                    </p:animEffect>
+                                    <p:anim calcmode="lin" valueType="num">
+                                      <p:cBhvr>
+                                        <p:cTn id="22" dur="1000" fill="hold"/>
+                                        <p:tgtEl>
+                                          <p:spTgt spid="52">
+                                            <p:txEl>
+                                              <p:pRg st="4" end="4"/>
+                                            </p:txEl>
+                                          </p:spTgt>
+                                        </p:tgtEl>
+                                        <p:attrNameLst>
+                                          <p:attrName>ppt_x</p:attrName>
+                                        </p:attrNameLst>
+                                      </p:cBhvr>
+                                      <p:tavLst>
+                                        <p:tav tm="0">
+                                          <p:val>
+                                            <p:strVal val="#ppt_x"/>
+                                          </p:val>
+                                        </p:tav>
+                                        <p:tav tm="100000">
+                                          <p:val>
+                                            <p:strVal val="#ppt_x"/>
+                                          </p:val>
+                                        </p:tav>
+                                      </p:tavLst>
+                                    </p:anim>
+                                    <p:anim calcmode="lin" valueType="num">
+                                      <p:cBhvr>
+                                        <p:cTn id="23" dur="1000" fill="hold"/>
+                                        <p:tgtEl>
+                                          <p:spTgt spid="52">
+                                            <p:txEl>
+                                              <p:pRg st="4" end="4"/>
+                                            </p:txEl>
+                                          </p:spTgt>
+                                        </p:tgtEl>
+                                        <p:attrNameLst>
+                                          <p:attrName>ppt_y</p:attrName>
+                                        </p:attrNameLst>
+                                      </p:cBhvr>
+                                      <p:tavLst>
+                                        <p:tav tm="0">
+                                          <p:val>
+                                            <p:strVal val="#ppt_y+.1"/>
+                                          </p:val>
+                                        </p:tav>
+                                        <p:tav tm="100000">
+                                          <p:val>
+                                            <p:strVal val="#ppt_y"/>
+                                          </p:val>
+                                        </p:tav>
+                                      </p:tavLst>
+                                    </p:anim>
+                                  </p:childTnLst>
+                                </p:cTn>
+                              </p:par>
+                              <p:par>
+                                <p:cTn id="24" presetID="42" presetClass="entr" presetSubtype="0" fill="hold" grpId="0" nodeType="withEffect">
+                                  <p:stCondLst>
+                                    <p:cond delay="0"/>
+                                  </p:stCondLst>
+                                  <p:childTnLst>
+                                    <p:set>
+                                      <p:cBhvr>
+                                        <p:cTn id="25" dur="1" fill="hold">
+                                          <p:stCondLst>
+                                            <p:cond delay="0"/>
+                                          </p:stCondLst>
+                                        </p:cTn>
+                                        <p:tgtEl>
+                                          <p:spTgt spid="52">
+                                            <p:txEl>
+                                              <p:pRg st="5" end="5"/>
+                                            </p:txEl>
+                                          </p:spTgt>
+                                        </p:tgtEl>
+                                        <p:attrNameLst>
+                                          <p:attrName>style.visibility</p:attrName>
+                                        </p:attrNameLst>
+                                      </p:cBhvr>
+                                      <p:to>
+                                        <p:strVal val="visible"/>
+                                      </p:to>
+                                    </p:set>
+                                    <p:animEffect transition="in" filter="fade">
+                                      <p:cBhvr>
+                                        <p:cTn id="26" dur="1000"/>
+                                        <p:tgtEl>
+                                          <p:spTgt spid="52">
+                                            <p:txEl>
+                                              <p:pRg st="5" end="5"/>
+                                            </p:txEl>
+                                          </p:spTgt>
+                                        </p:tgtEl>
+                                      </p:cBhvr>
+                                    </p:animEffect>
+                                    <p:anim calcmode="lin" valueType="num">
+                                      <p:cBhvr>
+                                        <p:cTn id="27" dur="1000" fill="hold"/>
+                                        <p:tgtEl>
+                                          <p:spTgt spid="52">
+                                            <p:txEl>
+                                              <p:pRg st="5" end="5"/>
+                                            </p:txEl>
+                                          </p:spTgt>
+                                        </p:tgtEl>
+                                        <p:attrNameLst>
+                                          <p:attrName>ppt_x</p:attrName>
+                                        </p:attrNameLst>
+                                      </p:cBhvr>
+                                      <p:tavLst>
+                                        <p:tav tm="0">
+                                          <p:val>
+                                            <p:strVal val="#ppt_x"/>
+                                          </p:val>
+                                        </p:tav>
+                                        <p:tav tm="100000">
+                                          <p:val>
+                                            <p:strVal val="#ppt_x"/>
+                                          </p:val>
+                                        </p:tav>
+                                      </p:tavLst>
+                                    </p:anim>
+                                    <p:anim calcmode="lin" valueType="num">
+                                      <p:cBhvr>
+                                        <p:cTn id="28" dur="1000" fill="hold"/>
+                                        <p:tgtEl>
+                                          <p:spTgt spid="52">
+                                            <p:txEl>
+                                              <p:pRg st="5" end="5"/>
+                                            </p:txEl>
+                                          </p:spTgt>
+                                        </p:tgtEl>
+                                        <p:attrNameLst>
+                                          <p:attrName>ppt_y</p:attrName>
+                                        </p:attrNameLst>
+                                      </p:cBhvr>
+                                      <p:tavLst>
+                                        <p:tav tm="0">
+                                          <p:val>
+                                            <p:strVal val="#ppt_y+.1"/>
+                                          </p:val>
+                                        </p:tav>
+                                        <p:tav tm="100000">
+                                          <p:val>
+                                            <p:strVal val="#ppt_y"/>
+                                          </p:val>
+                                        </p:tav>
+                                      </p:tavLst>
+                                    </p:anim>
+                                  </p:childTnLst>
+                                </p:cTn>
+                              </p:par>
+                            </p:childTnLst>
+                          </p:cTn>
+                        </p:par>
+                      </p:childTnLst>
+                    </p:cTn>
+                  </p:par>
+                </p:childTnLst>
+              </p:cTn>
+              <p:prevCondLst>
+                <p:cond evt="onPrev" delay="0">
+                  <p:tgtEl>
+                    <p:sldTgt/>
+                  </p:tgtEl>
+                </p:cond>
+              </p:prevCondLst>
+              <p:nextCondLst>
+                <p:cond evt="onNext" delay="0">
+                  <p:tgtEl>
+                    <p:sldTgt/>
+                  </p:tgtEl>
+                </p:cond>
+              </p:nextCondLst>
+            </p:seq>
+          </p:childTnLst>
+        </p:cTn>
+      </p:par>
+    </p:tnLst>
+    <p:bldLst>
+      <p:bldP spid="52" grpId="0" uiExpand="1" build="p"/>
+    </p:bldLst>
+  </p:timing>
+</p:sld>
+</file>
+
+<file path=ppt/slides/slide5.xml><?xml version="1.0" encoding="utf-8"?>
+<p:sld xmlns:a="http://schemas.openxmlformats.org/drawingml/2006/main" xmlns:r="http://schemas.openxmlformats.org/officeDocument/2006/relationships" xmlns:p="http://schemas.openxmlformats.org/presentationml/2006/main">
+  <p:cSld>
+    <p:spTree>
+      <p:nvGrpSpPr>
+        <p:cNvPr id="1" name="Shape 50"/>
+        <p:cNvGrpSpPr/>
+        <p:nvPr/>
+      </p:nvGrpSpPr>
+      <p:grpSpPr>
+        <a:xfrm>
+          <a:off x="0" y="0"/>
+          <a:ext cx="0" cy="0"/>
+          <a:chOff x="0" y="0"/>
+          <a:chExt cx="0" cy="0"/>
+        </a:xfrm>
+      </p:grpSpPr>
+      <p:sp>
+        <p:nvSpPr>
+          <p:cNvPr id="51" name="Shape 51"/>
+          <p:cNvSpPr txBox="1">
+            <a:spLocks noGrp="1"/>
+          </p:cNvSpPr>
+          <p:nvPr>
+            <p:ph type="title"/>
+          </p:nvPr>
+        </p:nvSpPr>
+        <p:spPr>
+          <a:xfrm>
+            <a:off x="837450" y="131950"/>
+            <a:ext cx="8136900" cy="498599"/>
+          </a:xfrm>
+          <a:prstGeom prst="rect">
+            <a:avLst/>
+          </a:prstGeom>
+        </p:spPr>
+        <p:txBody>
+          <a:bodyPr lIns="91425" tIns="91425" rIns="91425" bIns="91425" anchor="b" anchorCtr="0">
+            <a:noAutofit/>
+          </a:bodyPr>
+          <a:lstStyle/>
+          <a:p>
+            <a:pPr lvl="0" rtl="0">
+              <a:spcBef>
+                <a:spcPts val="0"/>
+              </a:spcBef>
+              <a:buNone/>
+            </a:pPr>
+            <a:r>
+              <a:rPr lang="en-US" sz="3000" dirty="0" smtClean="0">
+                <a:solidFill>
+                  <a:srgbClr val="003366"/>
+                </a:solidFill>
+              </a:rPr>
               <a:t>UML Representation </a:t>
             </a:r>
             <a:endParaRPr lang="en-US" sz="3000" b="0" i="1" dirty="0">
@@ -15317,436 +17284,6 @@
 </p:sld>
 </file>
 
-<file path=ppt/slides/slide5.xml><?xml version="1.0" encoding="utf-8"?>
-<p:sld xmlns:a="http://schemas.openxmlformats.org/drawingml/2006/main" xmlns:r="http://schemas.openxmlformats.org/officeDocument/2006/relationships" xmlns:p="http://schemas.openxmlformats.org/presentationml/2006/main">
-  <p:cSld>
-    <p:spTree>
-      <p:nvGrpSpPr>
-        <p:cNvPr id="1" name="Shape 50"/>
-        <p:cNvGrpSpPr/>
-        <p:nvPr/>
-      </p:nvGrpSpPr>
-      <p:grpSpPr>
-        <a:xfrm>
-          <a:off x="0" y="0"/>
-          <a:ext cx="0" cy="0"/>
-          <a:chOff x="0" y="0"/>
-          <a:chExt cx="0" cy="0"/>
-        </a:xfrm>
-      </p:grpSpPr>
-      <p:sp>
-        <p:nvSpPr>
-          <p:cNvPr id="51" name="Shape 51"/>
-          <p:cNvSpPr txBox="1">
-            <a:spLocks noGrp="1"/>
-          </p:cNvSpPr>
-          <p:nvPr>
-            <p:ph type="title"/>
-          </p:nvPr>
-        </p:nvSpPr>
-        <p:spPr>
-          <a:xfrm>
-            <a:off x="837450" y="131950"/>
-            <a:ext cx="8136900" cy="498599"/>
-          </a:xfrm>
-          <a:prstGeom prst="rect">
-            <a:avLst/>
-          </a:prstGeom>
-        </p:spPr>
-        <p:txBody>
-          <a:bodyPr lIns="91425" tIns="91425" rIns="91425" bIns="91425" anchor="b" anchorCtr="0">
-            <a:noAutofit/>
-          </a:bodyPr>
-          <a:lstStyle/>
-          <a:p>
-            <a:pPr lvl="0" rtl="0">
-              <a:spcBef>
-                <a:spcPts val="0"/>
-              </a:spcBef>
-              <a:buNone/>
-            </a:pPr>
-            <a:r>
-              <a:rPr lang="en-US" sz="3000" dirty="0" smtClean="0">
-                <a:solidFill>
-                  <a:srgbClr val="003366"/>
-                </a:solidFill>
-              </a:rPr>
-              <a:t>Functional Role</a:t>
-            </a:r>
-            <a:endParaRPr lang="en-US" sz="3000" b="0" i="1" dirty="0">
-              <a:solidFill>
-                <a:srgbClr val="003366"/>
-              </a:solidFill>
-            </a:endParaRPr>
-          </a:p>
-        </p:txBody>
-      </p:sp>
-      <p:sp>
-        <p:nvSpPr>
-          <p:cNvPr id="52" name="Shape 52"/>
-          <p:cNvSpPr txBox="1">
-            <a:spLocks noGrp="1"/>
-          </p:cNvSpPr>
-          <p:nvPr>
-            <p:ph type="body" idx="1"/>
-          </p:nvPr>
-        </p:nvSpPr>
-        <p:spPr>
-          <a:xfrm>
-            <a:off x="314900" y="1129014"/>
-            <a:ext cx="8229600" cy="2634017"/>
-          </a:xfrm>
-          <a:prstGeom prst="rect">
-            <a:avLst/>
-          </a:prstGeom>
-        </p:spPr>
-        <p:txBody>
-          <a:bodyPr lIns="91425" tIns="91425" rIns="91425" bIns="91425" anchor="ctr" anchorCtr="0">
-            <a:noAutofit/>
-          </a:bodyPr>
-          <a:lstStyle/>
-          <a:p>
-            <a:pPr algn="just">
-              <a:buNone/>
-            </a:pPr>
-            <a:r>
-              <a:rPr lang="en-US" sz="2400" dirty="0" smtClean="0">
-                <a:solidFill>
-                  <a:schemeClr val="accent1">
-                    <a:lumMod val="50000"/>
-                  </a:schemeClr>
-                </a:solidFill>
-              </a:rPr>
-              <a:t>THHIHI</a:t>
-            </a:r>
-            <a:endParaRPr lang="en-US" sz="2400" dirty="0">
-              <a:solidFill>
-                <a:schemeClr val="accent1">
-                  <a:lumMod val="50000"/>
-                </a:schemeClr>
-              </a:solidFill>
-            </a:endParaRPr>
-          </a:p>
-        </p:txBody>
-      </p:sp>
-      <p:pic>
-        <p:nvPicPr>
-          <p:cNvPr id="53" name="Shape 53"/>
-          <p:cNvPicPr preferRelativeResize="0"/>
-          <p:nvPr/>
-        </p:nvPicPr>
-        <p:blipFill>
-          <a:blip r:embed="rId3">
-            <a:alphaModFix/>
-          </a:blip>
-          <a:stretch>
-            <a:fillRect/>
-          </a:stretch>
-        </p:blipFill>
-        <p:spPr>
-          <a:xfrm>
-            <a:off x="82450" y="65950"/>
-            <a:ext cx="464900" cy="498650"/>
-          </a:xfrm>
-          <a:prstGeom prst="rect">
-            <a:avLst/>
-          </a:prstGeom>
-          <a:noFill/>
-          <a:ln>
-            <a:noFill/>
-          </a:ln>
-        </p:spPr>
-      </p:pic>
-      <p:pic>
-        <p:nvPicPr>
-          <p:cNvPr id="54" name="Shape 54"/>
-          <p:cNvPicPr preferRelativeResize="0"/>
-          <p:nvPr/>
-        </p:nvPicPr>
-        <p:blipFill>
-          <a:blip r:embed="rId4">
-            <a:alphaModFix/>
-          </a:blip>
-          <a:stretch>
-            <a:fillRect/>
-          </a:stretch>
-        </p:blipFill>
-        <p:spPr>
-          <a:xfrm>
-            <a:off x="0" y="630539"/>
-            <a:ext cx="9143998" cy="97471"/>
-          </a:xfrm>
-          <a:prstGeom prst="rect">
-            <a:avLst/>
-          </a:prstGeom>
-          <a:noFill/>
-          <a:ln>
-            <a:noFill/>
-          </a:ln>
-        </p:spPr>
-      </p:pic>
-      <p:cxnSp>
-        <p:nvCxnSpPr>
-          <p:cNvPr id="55" name="Shape 55"/>
-          <p:cNvCxnSpPr/>
-          <p:nvPr/>
-        </p:nvCxnSpPr>
-        <p:spPr>
-          <a:xfrm rot="10800000">
-            <a:off x="691550" y="125"/>
-            <a:ext cx="0" cy="630299"/>
-          </a:xfrm>
-          <a:prstGeom prst="straightConnector1">
-            <a:avLst/>
-          </a:prstGeom>
-          <a:noFill/>
-          <a:ln w="9525" cap="flat">
-            <a:solidFill>
-              <a:srgbClr val="003366"/>
-            </a:solidFill>
-            <a:prstDash val="solid"/>
-            <a:round/>
-            <a:headEnd type="none" w="lg" len="lg"/>
-            <a:tailEnd type="none" w="lg" len="lg"/>
-          </a:ln>
-        </p:spPr>
-      </p:cxnSp>
-      <p:sp>
-        <p:nvSpPr>
-          <p:cNvPr id="56" name="Shape 56"/>
-          <p:cNvSpPr txBox="1"/>
-          <p:nvPr/>
-        </p:nvSpPr>
-        <p:spPr>
-          <a:xfrm>
-            <a:off x="6783700" y="6531000"/>
-            <a:ext cx="2599200" cy="363899"/>
-          </a:xfrm>
-          <a:prstGeom prst="rect">
-            <a:avLst/>
-          </a:prstGeom>
-          <a:noFill/>
-          <a:ln>
-            <a:noFill/>
-          </a:ln>
-        </p:spPr>
-        <p:txBody>
-          <a:bodyPr lIns="91425" tIns="91425" rIns="91425" bIns="91425" anchor="t" anchorCtr="0">
-            <a:noAutofit/>
-          </a:bodyPr>
-          <a:lstStyle/>
-          <a:p>
-            <a:pPr lvl="0" rtl="0">
-              <a:spcBef>
-                <a:spcPts val="0"/>
-              </a:spcBef>
-              <a:buNone/>
-            </a:pPr>
-            <a:r>
-              <a:rPr lang="it" sz="1200" b="1">
-                <a:solidFill>
-                  <a:srgbClr val="FFFFFF"/>
-                </a:solidFill>
-              </a:rPr>
-              <a:t>POLITECNICO DI MILANO</a:t>
-            </a:r>
-          </a:p>
-        </p:txBody>
-      </p:sp>
-      <p:pic>
-        <p:nvPicPr>
-          <p:cNvPr id="57" name="Shape 57"/>
-          <p:cNvPicPr preferRelativeResize="0"/>
-          <p:nvPr/>
-        </p:nvPicPr>
-        <p:blipFill>
-          <a:blip r:embed="rId5">
-            <a:alphaModFix/>
-          </a:blip>
-          <a:stretch>
-            <a:fillRect/>
-          </a:stretch>
-        </p:blipFill>
-        <p:spPr>
-          <a:xfrm>
-            <a:off x="0" y="6571225"/>
-            <a:ext cx="9144000" cy="286775"/>
-          </a:xfrm>
-          <a:prstGeom prst="rect">
-            <a:avLst/>
-          </a:prstGeom>
-          <a:noFill/>
-          <a:ln>
-            <a:noFill/>
-          </a:ln>
-        </p:spPr>
-      </p:pic>
-      <p:sp>
-        <p:nvSpPr>
-          <p:cNvPr id="58" name="Shape 58"/>
-          <p:cNvSpPr txBox="1">
-            <a:spLocks noGrp="1"/>
-          </p:cNvSpPr>
-          <p:nvPr>
-            <p:ph type="ctrTitle" idx="4294967295"/>
-          </p:nvPr>
-        </p:nvSpPr>
-        <p:spPr>
-          <a:xfrm>
-            <a:off x="457200" y="6712949"/>
-            <a:ext cx="5162269" cy="281444"/>
-          </a:xfrm>
-          <a:prstGeom prst="rect">
-            <a:avLst/>
-          </a:prstGeom>
-        </p:spPr>
-        <p:txBody>
-          <a:bodyPr lIns="91425" tIns="91425" rIns="91425" bIns="91425" anchor="ctr" anchorCtr="0">
-            <a:noAutofit/>
-          </a:bodyPr>
-          <a:lstStyle/>
-          <a:p>
-            <a:pPr indent="457200">
-              <a:lnSpc>
-                <a:spcPct val="115000"/>
-              </a:lnSpc>
-            </a:pPr>
-            <a:r>
-              <a:rPr lang="it-IT" sz="1300" b="1" dirty="0">
-                <a:solidFill>
-                  <a:srgbClr val="003366"/>
-                </a:solidFill>
-              </a:rPr>
-              <a:t>SE2 – Andrea Martino, Francesco Marchesani</a:t>
-            </a:r>
-            <a:br>
-              <a:rPr lang="it-IT" sz="1300" b="1" dirty="0">
-                <a:solidFill>
-                  <a:srgbClr val="003366"/>
-                </a:solidFill>
-              </a:rPr>
-            </a:br>
-            <a:endParaRPr sz="1300" dirty="0">
-              <a:solidFill>
-                <a:srgbClr val="003366"/>
-              </a:solidFill>
-            </a:endParaRPr>
-          </a:p>
-        </p:txBody>
-      </p:sp>
-    </p:spTree>
-    <p:extLst>
-      <p:ext uri="{BB962C8B-B14F-4D97-AF65-F5344CB8AC3E}">
-        <p14:creationId xmlns:p14="http://schemas.microsoft.com/office/powerpoint/2010/main" val="2080236638"/>
-      </p:ext>
-    </p:extLst>
-  </p:cSld>
-  <p:clrMapOvr>
-    <a:masterClrMapping/>
-  </p:clrMapOvr>
-  <p:transition spd="slow">
-    <p:cut/>
-  </p:transition>
-  <p:timing>
-    <p:tnLst>
-      <p:par>
-        <p:cTn id="1" dur="indefinite" restart="never" nodeType="tmRoot">
-          <p:childTnLst>
-            <p:seq concurrent="1" nextAc="seek">
-              <p:cTn id="2" dur="indefinite" nodeType="mainSeq">
-                <p:childTnLst>
-                  <p:par>
-                    <p:cTn id="3" fill="hold">
-                      <p:stCondLst>
-                        <p:cond delay="indefinite"/>
-                        <p:cond evt="onBegin" delay="0">
-                          <p:tn val="2"/>
-                        </p:cond>
-                      </p:stCondLst>
-                      <p:childTnLst>
-                        <p:par>
-                          <p:cTn id="4" fill="hold">
-                            <p:stCondLst>
-                              <p:cond delay="0"/>
-                            </p:stCondLst>
-                            <p:childTnLst>
-                              <p:par>
-                                <p:cTn id="5" presetID="10" presetClass="entr" presetSubtype="0" fill="hold" grpId="0" nodeType="withEffect">
-                                  <p:stCondLst>
-                                    <p:cond delay="0"/>
-                                  </p:stCondLst>
-                                  <p:childTnLst>
-                                    <p:set>
-                                      <p:cBhvr>
-                                        <p:cTn id="6" dur="1" fill="hold">
-                                          <p:stCondLst>
-                                            <p:cond delay="0"/>
-                                          </p:stCondLst>
-                                        </p:cTn>
-                                        <p:tgtEl>
-                                          <p:spTgt spid="52">
-                                            <p:txEl>
-                                              <p:pRg st="0" end="0"/>
-                                            </p:txEl>
-                                          </p:spTgt>
-                                        </p:tgtEl>
-                                        <p:attrNameLst>
-                                          <p:attrName>style.visibility</p:attrName>
-                                        </p:attrNameLst>
-                                      </p:cBhvr>
-                                      <p:to>
-                                        <p:strVal val="visible"/>
-                                      </p:to>
-                                    </p:set>
-                                    <p:animEffect transition="in" filter="fade">
-                                      <p:cBhvr>
-                                        <p:cTn id="7" dur="500"/>
-                                        <p:tgtEl>
-                                          <p:spTgt spid="52">
-                                            <p:txEl>
-                                              <p:pRg st="0" end="0"/>
-                                            </p:txEl>
-                                          </p:spTgt>
-                                        </p:tgtEl>
-                                      </p:cBhvr>
-                                    </p:animEffect>
-                                  </p:childTnLst>
-                                </p:cTn>
-                              </p:par>
-                            </p:childTnLst>
-                          </p:cTn>
-                        </p:par>
-                      </p:childTnLst>
-                    </p:cTn>
-                  </p:par>
-                </p:childTnLst>
-              </p:cTn>
-              <p:prevCondLst>
-                <p:cond evt="onPrev" delay="0">
-                  <p:tgtEl>
-                    <p:sldTgt/>
-                  </p:tgtEl>
-                </p:cond>
-              </p:prevCondLst>
-              <p:nextCondLst>
-                <p:cond evt="onNext" delay="0">
-                  <p:tgtEl>
-                    <p:sldTgt/>
-                  </p:tgtEl>
-                </p:cond>
-              </p:nextCondLst>
-            </p:seq>
-          </p:childTnLst>
-        </p:cTn>
-      </p:par>
-    </p:tnLst>
-    <p:bldLst>
-      <p:bldP spid="52" grpId="0" build="p"/>
-    </p:bldLst>
-  </p:timing>
-</p:sld>
-</file>
-
 <file path=ppt/slides/slide6.xml><?xml version="1.0" encoding="utf-8"?>
 <p:sld xmlns:a="http://schemas.openxmlformats.org/drawingml/2006/main" xmlns:r="http://schemas.openxmlformats.org/officeDocument/2006/relationships" xmlns:p="http://schemas.openxmlformats.org/presentationml/2006/main">
   <p:cSld>
@@ -15949,17 +17486,7 @@
                   </a:schemeClr>
                 </a:solidFill>
               </a:rPr>
-              <a:t>getSubModulesForEar</a:t>
-            </a:r>
-            <a:r>
-              <a:rPr lang="en-US" sz="2400" i="1" dirty="0" smtClean="0">
-                <a:solidFill>
-                  <a:schemeClr val="accent1">
-                    <a:lumMod val="50000"/>
-                  </a:schemeClr>
-                </a:solidFill>
-              </a:rPr>
-              <a:t>() </a:t>
+              <a:t>getSubModulesForEar() </a:t>
             </a:r>
             <a:r>
               <a:rPr lang="en-US" sz="2400" dirty="0" smtClean="0">
@@ -16304,8 +17831,8 @@
           </a:p>
         </p:txBody>
       </p:sp>
-      <mc:AlternateContent xmlns:mc="http://schemas.openxmlformats.org/markup-compatibility/2006">
-        <mc:Choice xmlns:a14="http://schemas.microsoft.com/office/drawing/2010/main" Requires="a14">
+      <mc:AlternateContent xmlns:mc="http://schemas.openxmlformats.org/markup-compatibility/2006" xmlns:a14="http://schemas.microsoft.com/office/drawing/2010/main">
+        <mc:Choice Requires="a14">
           <p:sp>
             <p:nvSpPr>
               <p:cNvPr id="2" name="Rettangolo 1"/>
@@ -16590,7 +18117,7 @@
             </p:txBody>
           </p:sp>
         </mc:Choice>
-        <mc:Fallback>
+        <mc:Fallback xmlns="">
           <p:sp>
             <p:nvSpPr>
               <p:cNvPr id="2" name="Rettangolo 1"/>
@@ -17486,6 +19013,510 @@
                   <a:srgbClr val="003366"/>
                 </a:solidFill>
               </a:rPr>
+              <a:t>Most Common Problems</a:t>
+            </a:r>
+            <a:endParaRPr lang="en-US" sz="3000" b="0" i="1" dirty="0">
+              <a:solidFill>
+                <a:srgbClr val="003366"/>
+              </a:solidFill>
+            </a:endParaRPr>
+          </a:p>
+        </p:txBody>
+      </p:sp>
+      <p:pic>
+        <p:nvPicPr>
+          <p:cNvPr id="53" name="Shape 53"/>
+          <p:cNvPicPr preferRelativeResize="0"/>
+          <p:nvPr/>
+        </p:nvPicPr>
+        <p:blipFill>
+          <a:blip r:embed="rId3">
+            <a:alphaModFix/>
+          </a:blip>
+          <a:stretch>
+            <a:fillRect/>
+          </a:stretch>
+        </p:blipFill>
+        <p:spPr>
+          <a:xfrm>
+            <a:off x="82450" y="65950"/>
+            <a:ext cx="464900" cy="498650"/>
+          </a:xfrm>
+          <a:prstGeom prst="rect">
+            <a:avLst/>
+          </a:prstGeom>
+          <a:noFill/>
+          <a:ln>
+            <a:noFill/>
+          </a:ln>
+        </p:spPr>
+      </p:pic>
+      <p:pic>
+        <p:nvPicPr>
+          <p:cNvPr id="54" name="Shape 54"/>
+          <p:cNvPicPr preferRelativeResize="0"/>
+          <p:nvPr/>
+        </p:nvPicPr>
+        <p:blipFill>
+          <a:blip r:embed="rId4">
+            <a:alphaModFix/>
+          </a:blip>
+          <a:stretch>
+            <a:fillRect/>
+          </a:stretch>
+        </p:blipFill>
+        <p:spPr>
+          <a:xfrm>
+            <a:off x="0" y="630539"/>
+            <a:ext cx="9143998" cy="97471"/>
+          </a:xfrm>
+          <a:prstGeom prst="rect">
+            <a:avLst/>
+          </a:prstGeom>
+          <a:noFill/>
+          <a:ln>
+            <a:noFill/>
+          </a:ln>
+        </p:spPr>
+      </p:pic>
+      <p:cxnSp>
+        <p:nvCxnSpPr>
+          <p:cNvPr id="55" name="Shape 55"/>
+          <p:cNvCxnSpPr/>
+          <p:nvPr/>
+        </p:nvCxnSpPr>
+        <p:spPr>
+          <a:xfrm rot="10800000">
+            <a:off x="691550" y="125"/>
+            <a:ext cx="0" cy="630299"/>
+          </a:xfrm>
+          <a:prstGeom prst="straightConnector1">
+            <a:avLst/>
+          </a:prstGeom>
+          <a:noFill/>
+          <a:ln w="9525" cap="flat">
+            <a:solidFill>
+              <a:srgbClr val="003366"/>
+            </a:solidFill>
+            <a:prstDash val="solid"/>
+            <a:round/>
+            <a:headEnd type="none" w="lg" len="lg"/>
+            <a:tailEnd type="none" w="lg" len="lg"/>
+          </a:ln>
+        </p:spPr>
+      </p:cxnSp>
+      <p:sp>
+        <p:nvSpPr>
+          <p:cNvPr id="56" name="Shape 56"/>
+          <p:cNvSpPr txBox="1"/>
+          <p:nvPr/>
+        </p:nvSpPr>
+        <p:spPr>
+          <a:xfrm>
+            <a:off x="6783700" y="6531000"/>
+            <a:ext cx="2599200" cy="363899"/>
+          </a:xfrm>
+          <a:prstGeom prst="rect">
+            <a:avLst/>
+          </a:prstGeom>
+          <a:noFill/>
+          <a:ln>
+            <a:noFill/>
+          </a:ln>
+        </p:spPr>
+        <p:txBody>
+          <a:bodyPr lIns="91425" tIns="91425" rIns="91425" bIns="91425" anchor="t" anchorCtr="0">
+            <a:noAutofit/>
+          </a:bodyPr>
+          <a:lstStyle/>
+          <a:p>
+            <a:pPr lvl="0" rtl="0">
+              <a:spcBef>
+                <a:spcPts val="0"/>
+              </a:spcBef>
+              <a:buNone/>
+            </a:pPr>
+            <a:r>
+              <a:rPr lang="it" sz="1200" b="1">
+                <a:solidFill>
+                  <a:srgbClr val="FFFFFF"/>
+                </a:solidFill>
+              </a:rPr>
+              <a:t>POLITECNICO DI MILANO</a:t>
+            </a:r>
+          </a:p>
+        </p:txBody>
+      </p:sp>
+      <p:pic>
+        <p:nvPicPr>
+          <p:cNvPr id="57" name="Shape 57"/>
+          <p:cNvPicPr preferRelativeResize="0"/>
+          <p:nvPr/>
+        </p:nvPicPr>
+        <p:blipFill>
+          <a:blip r:embed="rId5">
+            <a:alphaModFix/>
+          </a:blip>
+          <a:stretch>
+            <a:fillRect/>
+          </a:stretch>
+        </p:blipFill>
+        <p:spPr>
+          <a:xfrm>
+            <a:off x="0" y="6571225"/>
+            <a:ext cx="9144000" cy="286775"/>
+          </a:xfrm>
+          <a:prstGeom prst="rect">
+            <a:avLst/>
+          </a:prstGeom>
+          <a:noFill/>
+          <a:ln>
+            <a:noFill/>
+          </a:ln>
+        </p:spPr>
+      </p:pic>
+      <p:sp>
+        <p:nvSpPr>
+          <p:cNvPr id="58" name="Shape 58"/>
+          <p:cNvSpPr txBox="1">
+            <a:spLocks noGrp="1"/>
+          </p:cNvSpPr>
+          <p:nvPr>
+            <p:ph type="ctrTitle" idx="4294967295"/>
+          </p:nvPr>
+        </p:nvSpPr>
+        <p:spPr>
+          <a:xfrm>
+            <a:off x="457200" y="6712949"/>
+            <a:ext cx="5162269" cy="281444"/>
+          </a:xfrm>
+          <a:prstGeom prst="rect">
+            <a:avLst/>
+          </a:prstGeom>
+        </p:spPr>
+        <p:txBody>
+          <a:bodyPr lIns="91425" tIns="91425" rIns="91425" bIns="91425" anchor="ctr" anchorCtr="0">
+            <a:noAutofit/>
+          </a:bodyPr>
+          <a:lstStyle/>
+          <a:p>
+            <a:pPr indent="457200">
+              <a:lnSpc>
+                <a:spcPct val="115000"/>
+              </a:lnSpc>
+            </a:pPr>
+            <a:r>
+              <a:rPr lang="it-IT" sz="1300" b="1" dirty="0">
+                <a:solidFill>
+                  <a:srgbClr val="003366"/>
+                </a:solidFill>
+              </a:rPr>
+              <a:t>SE2 – Andrea Martino, Francesco Marchesani</a:t>
+            </a:r>
+            <a:br>
+              <a:rPr lang="it-IT" sz="1300" b="1" dirty="0">
+                <a:solidFill>
+                  <a:srgbClr val="003366"/>
+                </a:solidFill>
+              </a:rPr>
+            </a:br>
+            <a:endParaRPr sz="1300" dirty="0">
+              <a:solidFill>
+                <a:srgbClr val="003366"/>
+              </a:solidFill>
+            </a:endParaRPr>
+          </a:p>
+        </p:txBody>
+      </p:sp>
+      <p:sp>
+        <p:nvSpPr>
+          <p:cNvPr id="2" name="Ovale 1"/>
+          <p:cNvSpPr/>
+          <p:nvPr/>
+        </p:nvSpPr>
+        <p:spPr>
+          <a:xfrm rot="20871343">
+            <a:off x="444245" y="1499614"/>
+            <a:ext cx="3248167" cy="1828800"/>
+          </a:xfrm>
+          <a:prstGeom prst="ellipse">
+            <a:avLst/>
+          </a:prstGeom>
+        </p:spPr>
+        <p:style>
+          <a:lnRef idx="1">
+            <a:schemeClr val="accent1"/>
+          </a:lnRef>
+          <a:fillRef idx="2">
+            <a:schemeClr val="accent1"/>
+          </a:fillRef>
+          <a:effectRef idx="1">
+            <a:schemeClr val="accent1"/>
+          </a:effectRef>
+          <a:fontRef idx="minor">
+            <a:schemeClr val="dk1"/>
+          </a:fontRef>
+        </p:style>
+        <p:txBody>
+          <a:bodyPr rtlCol="0" anchor="ctr"/>
+          <a:lstStyle/>
+          <a:p>
+            <a:pPr algn="ctr"/>
+            <a:r>
+              <a:rPr lang="en-US" sz="4000" dirty="0" smtClean="0">
+                <a:ln w="0"/>
+                <a:solidFill>
+                  <a:schemeClr val="tx2">
+                    <a:lumMod val="10000"/>
+                  </a:schemeClr>
+                </a:solidFill>
+                <a:effectLst>
+                  <a:outerShdw blurRad="38100" dist="25400" dir="5400000" algn="ctr" rotWithShape="0">
+                    <a:srgbClr val="6E747A">
+                      <a:alpha val="43000"/>
+                    </a:srgbClr>
+                  </a:outerShdw>
+                </a:effectLst>
+              </a:rPr>
+              <a:t>ISSUE 1</a:t>
+            </a:r>
+            <a:endParaRPr lang="en-US" sz="4000" dirty="0">
+              <a:ln w="0"/>
+              <a:solidFill>
+                <a:schemeClr val="tx2">
+                  <a:lumMod val="10000"/>
+                </a:schemeClr>
+              </a:solidFill>
+              <a:effectLst>
+                <a:outerShdw blurRad="38100" dist="25400" dir="5400000" algn="ctr" rotWithShape="0">
+                  <a:srgbClr val="6E747A">
+                    <a:alpha val="43000"/>
+                  </a:srgbClr>
+                </a:outerShdw>
+              </a:effectLst>
+            </a:endParaRPr>
+          </a:p>
+        </p:txBody>
+      </p:sp>
+      <p:sp>
+        <p:nvSpPr>
+          <p:cNvPr id="12" name="Ovale 11"/>
+          <p:cNvSpPr/>
+          <p:nvPr/>
+        </p:nvSpPr>
+        <p:spPr>
+          <a:xfrm rot="1428015">
+            <a:off x="5427814" y="1706773"/>
+            <a:ext cx="3248167" cy="1828800"/>
+          </a:xfrm>
+          <a:prstGeom prst="ellipse">
+            <a:avLst/>
+          </a:prstGeom>
+        </p:spPr>
+        <p:style>
+          <a:lnRef idx="1">
+            <a:schemeClr val="accent2"/>
+          </a:lnRef>
+          <a:fillRef idx="2">
+            <a:schemeClr val="accent2"/>
+          </a:fillRef>
+          <a:effectRef idx="1">
+            <a:schemeClr val="accent2"/>
+          </a:effectRef>
+          <a:fontRef idx="minor">
+            <a:schemeClr val="dk1"/>
+          </a:fontRef>
+        </p:style>
+        <p:txBody>
+          <a:bodyPr rtlCol="0" anchor="ctr"/>
+          <a:lstStyle/>
+          <a:p>
+            <a:pPr algn="ctr"/>
+            <a:r>
+              <a:rPr lang="en-US" sz="4000" dirty="0" smtClean="0">
+                <a:ln w="0"/>
+                <a:solidFill>
+                  <a:schemeClr val="tx2">
+                    <a:lumMod val="10000"/>
+                  </a:schemeClr>
+                </a:solidFill>
+                <a:effectLst>
+                  <a:outerShdw blurRad="38100" dist="25400" dir="5400000" algn="ctr" rotWithShape="0">
+                    <a:srgbClr val="6E747A">
+                      <a:alpha val="43000"/>
+                    </a:srgbClr>
+                  </a:outerShdw>
+                </a:effectLst>
+              </a:rPr>
+              <a:t>ISSUE 2</a:t>
+            </a:r>
+            <a:endParaRPr lang="en-US" sz="4000" dirty="0">
+              <a:ln w="0"/>
+              <a:solidFill>
+                <a:schemeClr val="tx2">
+                  <a:lumMod val="10000"/>
+                </a:schemeClr>
+              </a:solidFill>
+              <a:effectLst>
+                <a:outerShdw blurRad="38100" dist="25400" dir="5400000" algn="ctr" rotWithShape="0">
+                  <a:srgbClr val="6E747A">
+                    <a:alpha val="43000"/>
+                  </a:srgbClr>
+                </a:outerShdw>
+              </a:effectLst>
+            </a:endParaRPr>
+          </a:p>
+        </p:txBody>
+      </p:sp>
+      <p:sp>
+        <p:nvSpPr>
+          <p:cNvPr id="13" name="Ovale 12"/>
+          <p:cNvSpPr/>
+          <p:nvPr/>
+        </p:nvSpPr>
+        <p:spPr>
+          <a:xfrm>
+            <a:off x="2825910" y="3791340"/>
+            <a:ext cx="3248167" cy="1828800"/>
+          </a:xfrm>
+          <a:prstGeom prst="ellipse">
+            <a:avLst/>
+          </a:prstGeom>
+        </p:spPr>
+        <p:style>
+          <a:lnRef idx="1">
+            <a:schemeClr val="accent6"/>
+          </a:lnRef>
+          <a:fillRef idx="2">
+            <a:schemeClr val="accent6"/>
+          </a:fillRef>
+          <a:effectRef idx="1">
+            <a:schemeClr val="accent6"/>
+          </a:effectRef>
+          <a:fontRef idx="minor">
+            <a:schemeClr val="dk1"/>
+          </a:fontRef>
+        </p:style>
+        <p:txBody>
+          <a:bodyPr rtlCol="0" anchor="ctr"/>
+          <a:lstStyle/>
+          <a:p>
+            <a:pPr algn="ctr"/>
+            <a:r>
+              <a:rPr lang="en-US" sz="4000" dirty="0" smtClean="0">
+                <a:ln w="0"/>
+                <a:solidFill>
+                  <a:schemeClr val="tx1">
+                    <a:lumMod val="95000"/>
+                    <a:lumOff val="5000"/>
+                  </a:schemeClr>
+                </a:solidFill>
+                <a:effectLst>
+                  <a:outerShdw blurRad="38100" dist="25400" dir="5400000" algn="ctr" rotWithShape="0">
+                    <a:srgbClr val="6E747A">
+                      <a:alpha val="43000"/>
+                    </a:srgbClr>
+                  </a:outerShdw>
+                </a:effectLst>
+              </a:rPr>
+              <a:t>ISSUE 3</a:t>
+            </a:r>
+            <a:endParaRPr lang="en-US" sz="4000" dirty="0">
+              <a:ln w="0"/>
+              <a:solidFill>
+                <a:schemeClr val="tx1">
+                  <a:lumMod val="95000"/>
+                  <a:lumOff val="5000"/>
+                </a:schemeClr>
+              </a:solidFill>
+              <a:effectLst>
+                <a:outerShdw blurRad="38100" dist="25400" dir="5400000" algn="ctr" rotWithShape="0">
+                  <a:srgbClr val="6E747A">
+                    <a:alpha val="43000"/>
+                  </a:srgbClr>
+                </a:outerShdw>
+              </a:effectLst>
+            </a:endParaRPr>
+          </a:p>
+        </p:txBody>
+      </p:sp>
+    </p:spTree>
+    <p:extLst>
+      <p:ext uri="{BB962C8B-B14F-4D97-AF65-F5344CB8AC3E}">
+        <p14:creationId xmlns:p14="http://schemas.microsoft.com/office/powerpoint/2010/main" val="587141629"/>
+      </p:ext>
+    </p:extLst>
+  </p:cSld>
+  <p:clrMapOvr>
+    <a:masterClrMapping/>
+  </p:clrMapOvr>
+  <p:transition spd="slow">
+    <p:cut/>
+  </p:transition>
+  <p:timing>
+    <p:tnLst>
+      <p:par>
+        <p:cTn id="1" dur="indefinite" restart="never" nodeType="tmRoot"/>
+      </p:par>
+    </p:tnLst>
+  </p:timing>
+</p:sld>
+</file>
+
+<file path=ppt/slides/slide9.xml><?xml version="1.0" encoding="utf-8"?>
+<p:sld xmlns:a="http://schemas.openxmlformats.org/drawingml/2006/main" xmlns:r="http://schemas.openxmlformats.org/officeDocument/2006/relationships" xmlns:p="http://schemas.openxmlformats.org/presentationml/2006/main">
+  <p:cSld>
+    <p:spTree>
+      <p:nvGrpSpPr>
+        <p:cNvPr id="1" name="Shape 50"/>
+        <p:cNvGrpSpPr/>
+        <p:nvPr/>
+      </p:nvGrpSpPr>
+      <p:grpSpPr>
+        <a:xfrm>
+          <a:off x="0" y="0"/>
+          <a:ext cx="0" cy="0"/>
+          <a:chOff x="0" y="0"/>
+          <a:chExt cx="0" cy="0"/>
+        </a:xfrm>
+      </p:grpSpPr>
+      <p:sp>
+        <p:nvSpPr>
+          <p:cNvPr id="51" name="Shape 51"/>
+          <p:cNvSpPr txBox="1">
+            <a:spLocks noGrp="1"/>
+          </p:cNvSpPr>
+          <p:nvPr>
+            <p:ph type="title"/>
+          </p:nvPr>
+        </p:nvSpPr>
+        <p:spPr>
+          <a:xfrm>
+            <a:off x="837450" y="131950"/>
+            <a:ext cx="8136900" cy="498599"/>
+          </a:xfrm>
+          <a:prstGeom prst="rect">
+            <a:avLst/>
+          </a:prstGeom>
+        </p:spPr>
+        <p:txBody>
+          <a:bodyPr lIns="91425" tIns="91425" rIns="91425" bIns="91425" anchor="b" anchorCtr="0">
+            <a:noAutofit/>
+          </a:bodyPr>
+          <a:lstStyle/>
+          <a:p>
+            <a:pPr lvl="0" rtl="0">
+              <a:spcBef>
+                <a:spcPts val="0"/>
+              </a:spcBef>
+              <a:buNone/>
+            </a:pPr>
+            <a:r>
+              <a:rPr lang="en-US" sz="3000" dirty="0" smtClean="0">
+                <a:solidFill>
+                  <a:srgbClr val="003366"/>
+                </a:solidFill>
+              </a:rPr>
               <a:t>Suggestions…</a:t>
             </a:r>
             <a:endParaRPr lang="en-US" sz="3000" b="0" i="1" dirty="0">
@@ -18249,686 +20280,6 @@
     <p:bldLst>
       <p:bldP spid="52" grpId="0" uiExpand="1" build="p"/>
     </p:bldLst>
-  </p:timing>
-</p:sld>
-</file>
-
-<file path=ppt/slides/slide9.xml><?xml version="1.0" encoding="utf-8"?>
-<p:sld xmlns:a="http://schemas.openxmlformats.org/drawingml/2006/main" xmlns:r="http://schemas.openxmlformats.org/officeDocument/2006/relationships" xmlns:p="http://schemas.openxmlformats.org/presentationml/2006/main">
-  <p:cSld>
-    <p:spTree>
-      <p:nvGrpSpPr>
-        <p:cNvPr id="1" name="Shape 50"/>
-        <p:cNvGrpSpPr/>
-        <p:nvPr/>
-      </p:nvGrpSpPr>
-      <p:grpSpPr>
-        <a:xfrm>
-          <a:off x="0" y="0"/>
-          <a:ext cx="0" cy="0"/>
-          <a:chOff x="0" y="0"/>
-          <a:chExt cx="0" cy="0"/>
-        </a:xfrm>
-      </p:grpSpPr>
-      <p:sp>
-        <p:nvSpPr>
-          <p:cNvPr id="51" name="Shape 51"/>
-          <p:cNvSpPr txBox="1">
-            <a:spLocks noGrp="1"/>
-          </p:cNvSpPr>
-          <p:nvPr>
-            <p:ph type="title"/>
-          </p:nvPr>
-        </p:nvSpPr>
-        <p:spPr>
-          <a:xfrm>
-            <a:off x="837450" y="131950"/>
-            <a:ext cx="8136900" cy="498599"/>
-          </a:xfrm>
-          <a:prstGeom prst="rect">
-            <a:avLst/>
-          </a:prstGeom>
-        </p:spPr>
-        <p:txBody>
-          <a:bodyPr lIns="91425" tIns="91425" rIns="91425" bIns="91425" anchor="b" anchorCtr="0">
-            <a:noAutofit/>
-          </a:bodyPr>
-          <a:lstStyle/>
-          <a:p>
-            <a:pPr lvl="0" rtl="0">
-              <a:spcBef>
-                <a:spcPts val="0"/>
-              </a:spcBef>
-              <a:buNone/>
-            </a:pPr>
-            <a:r>
-              <a:rPr lang="it-IT" sz="3000" dirty="0" smtClean="0">
-                <a:solidFill>
-                  <a:srgbClr val="003366"/>
-                </a:solidFill>
-              </a:rPr>
-              <a:t>Thank you!!!</a:t>
-            </a:r>
-            <a:endParaRPr sz="3000" dirty="0">
-              <a:solidFill>
-                <a:srgbClr val="003366"/>
-              </a:solidFill>
-            </a:endParaRPr>
-          </a:p>
-        </p:txBody>
-      </p:sp>
-      <p:sp>
-        <p:nvSpPr>
-          <p:cNvPr id="52" name="Shape 52"/>
-          <p:cNvSpPr txBox="1">
-            <a:spLocks noGrp="1"/>
-          </p:cNvSpPr>
-          <p:nvPr>
-            <p:ph type="body" idx="1"/>
-          </p:nvPr>
-        </p:nvSpPr>
-        <p:spPr>
-          <a:xfrm>
-            <a:off x="457200" y="766050"/>
-            <a:ext cx="8229600" cy="5325900"/>
-          </a:xfrm>
-          <a:prstGeom prst="rect">
-            <a:avLst/>
-          </a:prstGeom>
-        </p:spPr>
-        <p:txBody>
-          <a:bodyPr lIns="91425" tIns="91425" rIns="91425" bIns="91425" anchor="ctr" anchorCtr="0">
-            <a:noAutofit/>
-          </a:bodyPr>
-          <a:lstStyle/>
-          <a:p>
-            <a:pPr lvl="0" algn="just" rtl="0">
-              <a:spcBef>
-                <a:spcPts val="0"/>
-              </a:spcBef>
-              <a:buNone/>
-            </a:pPr>
-            <a:endParaRPr sz="2200" dirty="0">
-              <a:solidFill>
-                <a:srgbClr val="003366"/>
-              </a:solidFill>
-            </a:endParaRPr>
-          </a:p>
-        </p:txBody>
-      </p:sp>
-      <p:pic>
-        <p:nvPicPr>
-          <p:cNvPr id="53" name="Shape 53"/>
-          <p:cNvPicPr preferRelativeResize="0"/>
-          <p:nvPr/>
-        </p:nvPicPr>
-        <p:blipFill>
-          <a:blip r:embed="rId3">
-            <a:alphaModFix/>
-          </a:blip>
-          <a:stretch>
-            <a:fillRect/>
-          </a:stretch>
-        </p:blipFill>
-        <p:spPr>
-          <a:xfrm>
-            <a:off x="82450" y="65950"/>
-            <a:ext cx="464900" cy="498650"/>
-          </a:xfrm>
-          <a:prstGeom prst="rect">
-            <a:avLst/>
-          </a:prstGeom>
-          <a:noFill/>
-          <a:ln>
-            <a:noFill/>
-          </a:ln>
-        </p:spPr>
-      </p:pic>
-      <p:pic>
-        <p:nvPicPr>
-          <p:cNvPr id="54" name="Shape 54"/>
-          <p:cNvPicPr preferRelativeResize="0"/>
-          <p:nvPr/>
-        </p:nvPicPr>
-        <p:blipFill>
-          <a:blip r:embed="rId4">
-            <a:alphaModFix/>
-          </a:blip>
-          <a:stretch>
-            <a:fillRect/>
-          </a:stretch>
-        </p:blipFill>
-        <p:spPr>
-          <a:xfrm>
-            <a:off x="0" y="630539"/>
-            <a:ext cx="9143998" cy="97471"/>
-          </a:xfrm>
-          <a:prstGeom prst="rect">
-            <a:avLst/>
-          </a:prstGeom>
-          <a:noFill/>
-          <a:ln>
-            <a:noFill/>
-          </a:ln>
-        </p:spPr>
-      </p:pic>
-      <p:cxnSp>
-        <p:nvCxnSpPr>
-          <p:cNvPr id="55" name="Shape 55"/>
-          <p:cNvCxnSpPr/>
-          <p:nvPr/>
-        </p:nvCxnSpPr>
-        <p:spPr>
-          <a:xfrm rot="10800000">
-            <a:off x="691550" y="125"/>
-            <a:ext cx="0" cy="630299"/>
-          </a:xfrm>
-          <a:prstGeom prst="straightConnector1">
-            <a:avLst/>
-          </a:prstGeom>
-          <a:noFill/>
-          <a:ln w="9525" cap="flat">
-            <a:solidFill>
-              <a:srgbClr val="003366"/>
-            </a:solidFill>
-            <a:prstDash val="solid"/>
-            <a:round/>
-            <a:headEnd type="none" w="lg" len="lg"/>
-            <a:tailEnd type="none" w="lg" len="lg"/>
-          </a:ln>
-        </p:spPr>
-      </p:cxnSp>
-      <p:sp>
-        <p:nvSpPr>
-          <p:cNvPr id="56" name="Shape 56"/>
-          <p:cNvSpPr txBox="1"/>
-          <p:nvPr/>
-        </p:nvSpPr>
-        <p:spPr>
-          <a:xfrm>
-            <a:off x="6783700" y="6531000"/>
-            <a:ext cx="2599200" cy="363899"/>
-          </a:xfrm>
-          <a:prstGeom prst="rect">
-            <a:avLst/>
-          </a:prstGeom>
-          <a:noFill/>
-          <a:ln>
-            <a:noFill/>
-          </a:ln>
-        </p:spPr>
-        <p:txBody>
-          <a:bodyPr lIns="91425" tIns="91425" rIns="91425" bIns="91425" anchor="t" anchorCtr="0">
-            <a:noAutofit/>
-          </a:bodyPr>
-          <a:lstStyle/>
-          <a:p>
-            <a:pPr lvl="0" rtl="0">
-              <a:spcBef>
-                <a:spcPts val="0"/>
-              </a:spcBef>
-              <a:buNone/>
-            </a:pPr>
-            <a:r>
-              <a:rPr lang="it" sz="1200" b="1">
-                <a:solidFill>
-                  <a:srgbClr val="FFFFFF"/>
-                </a:solidFill>
-              </a:rPr>
-              <a:t>POLITECNICO DI MILANO</a:t>
-            </a:r>
-          </a:p>
-        </p:txBody>
-      </p:sp>
-      <p:pic>
-        <p:nvPicPr>
-          <p:cNvPr id="57" name="Shape 57"/>
-          <p:cNvPicPr preferRelativeResize="0"/>
-          <p:nvPr/>
-        </p:nvPicPr>
-        <p:blipFill>
-          <a:blip r:embed="rId5">
-            <a:alphaModFix/>
-          </a:blip>
-          <a:stretch>
-            <a:fillRect/>
-          </a:stretch>
-        </p:blipFill>
-        <p:spPr>
-          <a:xfrm>
-            <a:off x="0" y="6571225"/>
-            <a:ext cx="9144000" cy="286775"/>
-          </a:xfrm>
-          <a:prstGeom prst="rect">
-            <a:avLst/>
-          </a:prstGeom>
-          <a:noFill/>
-          <a:ln>
-            <a:noFill/>
-          </a:ln>
-        </p:spPr>
-      </p:pic>
-      <p:sp>
-        <p:nvSpPr>
-          <p:cNvPr id="58" name="Shape 58"/>
-          <p:cNvSpPr txBox="1">
-            <a:spLocks noGrp="1"/>
-          </p:cNvSpPr>
-          <p:nvPr>
-            <p:ph type="ctrTitle" idx="4294967295"/>
-          </p:nvPr>
-        </p:nvSpPr>
-        <p:spPr>
-          <a:xfrm>
-            <a:off x="457200" y="6712949"/>
-            <a:ext cx="5162269" cy="281444"/>
-          </a:xfrm>
-          <a:prstGeom prst="rect">
-            <a:avLst/>
-          </a:prstGeom>
-        </p:spPr>
-        <p:txBody>
-          <a:bodyPr lIns="91425" tIns="91425" rIns="91425" bIns="91425" anchor="ctr" anchorCtr="0">
-            <a:noAutofit/>
-          </a:bodyPr>
-          <a:lstStyle/>
-          <a:p>
-            <a:pPr indent="457200">
-              <a:lnSpc>
-                <a:spcPct val="115000"/>
-              </a:lnSpc>
-            </a:pPr>
-            <a:r>
-              <a:rPr lang="it-IT" sz="1300" b="1" dirty="0">
-                <a:solidFill>
-                  <a:srgbClr val="003366"/>
-                </a:solidFill>
-              </a:rPr>
-              <a:t>SE2 – Andrea Martino, Francesco Marchesani</a:t>
-            </a:r>
-            <a:br>
-              <a:rPr lang="it-IT" sz="1300" b="1" dirty="0">
-                <a:solidFill>
-                  <a:srgbClr val="003366"/>
-                </a:solidFill>
-              </a:rPr>
-            </a:br>
-            <a:endParaRPr sz="1300" dirty="0">
-              <a:solidFill>
-                <a:srgbClr val="003366"/>
-              </a:solidFill>
-            </a:endParaRPr>
-          </a:p>
-        </p:txBody>
-      </p:sp>
-      <p:pic>
-        <p:nvPicPr>
-          <p:cNvPr id="2" name="Immagine 1"/>
-          <p:cNvPicPr>
-            <a:picLocks noChangeAspect="1"/>
-          </p:cNvPicPr>
-          <p:nvPr/>
-        </p:nvPicPr>
-        <p:blipFill>
-          <a:blip r:embed="rId6">
-            <a:extLst>
-              <a:ext uri="{28A0092B-C50C-407E-A947-70E740481C1C}">
-                <a14:useLocalDpi xmlns:a14="http://schemas.microsoft.com/office/drawing/2010/main" val="0"/>
-              </a:ext>
-            </a:extLst>
-          </a:blip>
-          <a:stretch>
-            <a:fillRect/>
-          </a:stretch>
-        </p:blipFill>
-        <p:spPr>
-          <a:xfrm>
-            <a:off x="0" y="1152645"/>
-            <a:ext cx="9144000" cy="4552709"/>
-          </a:xfrm>
-          <a:prstGeom prst="rect">
-            <a:avLst/>
-          </a:prstGeom>
-        </p:spPr>
-      </p:pic>
-    </p:spTree>
-    <p:extLst>
-      <p:ext uri="{BB962C8B-B14F-4D97-AF65-F5344CB8AC3E}">
-        <p14:creationId xmlns:p14="http://schemas.microsoft.com/office/powerpoint/2010/main" val="2023199892"/>
-      </p:ext>
-    </p:extLst>
-  </p:cSld>
-  <p:clrMapOvr>
-    <a:masterClrMapping/>
-  </p:clrMapOvr>
-  <p:transition spd="slow">
-    <p:cut/>
-  </p:transition>
-  <p:timing>
-    <p:tnLst>
-      <p:par>
-        <p:cTn id="1" dur="indefinite" restart="never" nodeType="tmRoot">
-          <p:childTnLst>
-            <p:seq concurrent="1" nextAc="seek">
-              <p:cTn id="2" dur="indefinite" nodeType="mainSeq">
-                <p:childTnLst>
-                  <p:par>
-                    <p:cTn id="3" fill="hold">
-                      <p:stCondLst>
-                        <p:cond delay="indefinite"/>
-                      </p:stCondLst>
-                      <p:childTnLst>
-                        <p:par>
-                          <p:cTn id="4" fill="hold">
-                            <p:stCondLst>
-                              <p:cond delay="0"/>
-                            </p:stCondLst>
-                            <p:childTnLst>
-                              <p:par>
-                                <p:cTn id="5" presetID="26" presetClass="entr" presetSubtype="0" fill="hold" nodeType="clickEffect">
-                                  <p:stCondLst>
-                                    <p:cond delay="0"/>
-                                  </p:stCondLst>
-                                  <p:childTnLst>
-                                    <p:set>
-                                      <p:cBhvr>
-                                        <p:cTn id="6" dur="1" fill="hold">
-                                          <p:stCondLst>
-                                            <p:cond delay="0"/>
-                                          </p:stCondLst>
-                                        </p:cTn>
-                                        <p:tgtEl>
-                                          <p:spTgt spid="2"/>
-                                        </p:tgtEl>
-                                        <p:attrNameLst>
-                                          <p:attrName>style.visibility</p:attrName>
-                                        </p:attrNameLst>
-                                      </p:cBhvr>
-                                      <p:to>
-                                        <p:strVal val="visible"/>
-                                      </p:to>
-                                    </p:set>
-                                    <p:animEffect transition="in" filter="wipe(down)">
-                                      <p:cBhvr>
-                                        <p:cTn id="7" dur="1160">
-                                          <p:stCondLst>
-                                            <p:cond delay="0"/>
-                                          </p:stCondLst>
-                                        </p:cTn>
-                                        <p:tgtEl>
-                                          <p:spTgt spid="2"/>
-                                        </p:tgtEl>
-                                      </p:cBhvr>
-                                    </p:animEffect>
-                                    <p:anim calcmode="lin" valueType="num">
-                                      <p:cBhvr>
-                                        <p:cTn id="8" dur="3644" tmFilter="0,0; 0.14,0.36; 0.43,0.73; 0.71,0.91; 1.0,1.0">
-                                          <p:stCondLst>
-                                            <p:cond delay="0"/>
-                                          </p:stCondLst>
-                                        </p:cTn>
-                                        <p:tgtEl>
-                                          <p:spTgt spid="2"/>
-                                        </p:tgtEl>
-                                        <p:attrNameLst>
-                                          <p:attrName>ppt_x</p:attrName>
-                                        </p:attrNameLst>
-                                      </p:cBhvr>
-                                      <p:tavLst>
-                                        <p:tav tm="0">
-                                          <p:val>
-                                            <p:strVal val="#ppt_x-0.25"/>
-                                          </p:val>
-                                        </p:tav>
-                                        <p:tav tm="100000">
-                                          <p:val>
-                                            <p:strVal val="#ppt_x"/>
-                                          </p:val>
-                                        </p:tav>
-                                      </p:tavLst>
-                                    </p:anim>
-                                    <p:anim calcmode="lin" valueType="num">
-                                      <p:cBhvr>
-                                        <p:cTn id="9" dur="1328" tmFilter="0.0,0.0; 0.25,0.07; 0.50,0.2; 0.75,0.467; 1.0,1.0">
-                                          <p:stCondLst>
-                                            <p:cond delay="0"/>
-                                          </p:stCondLst>
-                                        </p:cTn>
-                                        <p:tgtEl>
-                                          <p:spTgt spid="2"/>
-                                        </p:tgtEl>
-                                        <p:attrNameLst>
-                                          <p:attrName>ppt_y</p:attrName>
-                                        </p:attrNameLst>
-                                      </p:cBhvr>
-                                      <p:tavLst>
-                                        <p:tav tm="0" fmla="#ppt_y-sin(pi*$)/3">
-                                          <p:val>
-                                            <p:fltVal val="0.5"/>
-                                          </p:val>
-                                        </p:tav>
-                                        <p:tav tm="100000">
-                                          <p:val>
-                                            <p:fltVal val="1"/>
-                                          </p:val>
-                                        </p:tav>
-                                      </p:tavLst>
-                                    </p:anim>
-                                    <p:anim calcmode="lin" valueType="num">
-                                      <p:cBhvr>
-                                        <p:cTn id="10" dur="1328" tmFilter="0, 0; 0.125,0.2665; 0.25,0.4; 0.375,0.465; 0.5,0.5;  0.625,0.535; 0.75,0.6; 0.875,0.7335; 1,1">
-                                          <p:stCondLst>
-                                            <p:cond delay="1328"/>
-                                          </p:stCondLst>
-                                        </p:cTn>
-                                        <p:tgtEl>
-                                          <p:spTgt spid="2"/>
-                                        </p:tgtEl>
-                                        <p:attrNameLst>
-                                          <p:attrName>ppt_y</p:attrName>
-                                        </p:attrNameLst>
-                                      </p:cBhvr>
-                                      <p:tavLst>
-                                        <p:tav tm="0" fmla="#ppt_y-sin(pi*$)/9">
-                                          <p:val>
-                                            <p:fltVal val="0"/>
-                                          </p:val>
-                                        </p:tav>
-                                        <p:tav tm="100000">
-                                          <p:val>
-                                            <p:fltVal val="1"/>
-                                          </p:val>
-                                        </p:tav>
-                                      </p:tavLst>
-                                    </p:anim>
-                                    <p:anim calcmode="lin" valueType="num">
-                                      <p:cBhvr>
-                                        <p:cTn id="11" dur="664" tmFilter="0, 0; 0.125,0.2665; 0.25,0.4; 0.375,0.465; 0.5,0.5;  0.625,0.535; 0.75,0.6; 0.875,0.7335; 1,1">
-                                          <p:stCondLst>
-                                            <p:cond delay="2648"/>
-                                          </p:stCondLst>
-                                        </p:cTn>
-                                        <p:tgtEl>
-                                          <p:spTgt spid="2"/>
-                                        </p:tgtEl>
-                                        <p:attrNameLst>
-                                          <p:attrName>ppt_y</p:attrName>
-                                        </p:attrNameLst>
-                                      </p:cBhvr>
-                                      <p:tavLst>
-                                        <p:tav tm="0" fmla="#ppt_y-sin(pi*$)/27">
-                                          <p:val>
-                                            <p:fltVal val="0"/>
-                                          </p:val>
-                                        </p:tav>
-                                        <p:tav tm="100000">
-                                          <p:val>
-                                            <p:fltVal val="1"/>
-                                          </p:val>
-                                        </p:tav>
-                                      </p:tavLst>
-                                    </p:anim>
-                                    <p:anim calcmode="lin" valueType="num">
-                                      <p:cBhvr>
-                                        <p:cTn id="12" dur="328" tmFilter="0, 0; 0.125,0.2665; 0.25,0.4; 0.375,0.465; 0.5,0.5;  0.625,0.535; 0.75,0.6; 0.875,0.7335; 1,1">
-                                          <p:stCondLst>
-                                            <p:cond delay="3312"/>
-                                          </p:stCondLst>
-                                        </p:cTn>
-                                        <p:tgtEl>
-                                          <p:spTgt spid="2"/>
-                                        </p:tgtEl>
-                                        <p:attrNameLst>
-                                          <p:attrName>ppt_y</p:attrName>
-                                        </p:attrNameLst>
-                                      </p:cBhvr>
-                                      <p:tavLst>
-                                        <p:tav tm="0" fmla="#ppt_y-sin(pi*$)/81">
-                                          <p:val>
-                                            <p:fltVal val="0"/>
-                                          </p:val>
-                                        </p:tav>
-                                        <p:tav tm="100000">
-                                          <p:val>
-                                            <p:fltVal val="1"/>
-                                          </p:val>
-                                        </p:tav>
-                                      </p:tavLst>
-                                    </p:anim>
-                                    <p:animScale>
-                                      <p:cBhvr>
-                                        <p:cTn id="13" dur="52">
-                                          <p:stCondLst>
-                                            <p:cond delay="1300"/>
-                                          </p:stCondLst>
-                                        </p:cTn>
-                                        <p:tgtEl>
-                                          <p:spTgt spid="2"/>
-                                        </p:tgtEl>
-                                      </p:cBhvr>
-                                      <p:to x="100000" y="60000"/>
-                                    </p:animScale>
-                                    <p:animScale>
-                                      <p:cBhvr>
-                                        <p:cTn id="14" dur="332" decel="50000">
-                                          <p:stCondLst>
-                                            <p:cond delay="1352"/>
-                                          </p:stCondLst>
-                                        </p:cTn>
-                                        <p:tgtEl>
-                                          <p:spTgt spid="2"/>
-                                        </p:tgtEl>
-                                      </p:cBhvr>
-                                      <p:to x="100000" y="100000"/>
-                                    </p:animScale>
-                                    <p:animScale>
-                                      <p:cBhvr>
-                                        <p:cTn id="15" dur="52">
-                                          <p:stCondLst>
-                                            <p:cond delay="2624"/>
-                                          </p:stCondLst>
-                                        </p:cTn>
-                                        <p:tgtEl>
-                                          <p:spTgt spid="2"/>
-                                        </p:tgtEl>
-                                      </p:cBhvr>
-                                      <p:to x="100000" y="80000"/>
-                                    </p:animScale>
-                                    <p:animScale>
-                                      <p:cBhvr>
-                                        <p:cTn id="16" dur="332" decel="50000">
-                                          <p:stCondLst>
-                                            <p:cond delay="2676"/>
-                                          </p:stCondLst>
-                                        </p:cTn>
-                                        <p:tgtEl>
-                                          <p:spTgt spid="2"/>
-                                        </p:tgtEl>
-                                      </p:cBhvr>
-                                      <p:to x="100000" y="100000"/>
-                                    </p:animScale>
-                                    <p:animScale>
-                                      <p:cBhvr>
-                                        <p:cTn id="17" dur="52">
-                                          <p:stCondLst>
-                                            <p:cond delay="3284"/>
-                                          </p:stCondLst>
-                                        </p:cTn>
-                                        <p:tgtEl>
-                                          <p:spTgt spid="2"/>
-                                        </p:tgtEl>
-                                      </p:cBhvr>
-                                      <p:to x="100000" y="90000"/>
-                                    </p:animScale>
-                                    <p:animScale>
-                                      <p:cBhvr>
-                                        <p:cTn id="18" dur="332" decel="50000">
-                                          <p:stCondLst>
-                                            <p:cond delay="3336"/>
-                                          </p:stCondLst>
-                                        </p:cTn>
-                                        <p:tgtEl>
-                                          <p:spTgt spid="2"/>
-                                        </p:tgtEl>
-                                      </p:cBhvr>
-                                      <p:to x="100000" y="100000"/>
-                                    </p:animScale>
-                                    <p:animScale>
-                                      <p:cBhvr>
-                                        <p:cTn id="19" dur="52">
-                                          <p:stCondLst>
-                                            <p:cond delay="3616"/>
-                                          </p:stCondLst>
-                                        </p:cTn>
-                                        <p:tgtEl>
-                                          <p:spTgt spid="2"/>
-                                        </p:tgtEl>
-                                      </p:cBhvr>
-                                      <p:to x="100000" y="95000"/>
-                                    </p:animScale>
-                                    <p:animScale>
-                                      <p:cBhvr>
-                                        <p:cTn id="20" dur="332" decel="50000">
-                                          <p:stCondLst>
-                                            <p:cond delay="3668"/>
-                                          </p:stCondLst>
-                                        </p:cTn>
-                                        <p:tgtEl>
-                                          <p:spTgt spid="2"/>
-                                        </p:tgtEl>
-                                      </p:cBhvr>
-                                      <p:to x="100000" y="100000"/>
-                                    </p:animScale>
-                                  </p:childTnLst>
-                                </p:cTn>
-                              </p:par>
-                            </p:childTnLst>
-                          </p:cTn>
-                        </p:par>
-                      </p:childTnLst>
-                    </p:cTn>
-                  </p:par>
-                </p:childTnLst>
-              </p:cTn>
-              <p:prevCondLst>
-                <p:cond evt="onPrev" delay="0">
-                  <p:tgtEl>
-                    <p:sldTgt/>
-                  </p:tgtEl>
-                </p:cond>
-              </p:prevCondLst>
-              <p:nextCondLst>
-                <p:cond evt="onNext" delay="0">
-                  <p:tgtEl>
-                    <p:sldTgt/>
-                  </p:tgtEl>
-                </p:cond>
-              </p:nextCondLst>
-            </p:seq>
-          </p:childTnLst>
-        </p:cTn>
-      </p:par>
-    </p:tnLst>
   </p:timing>
 </p:sld>
 </file>

</xml_diff>

<commit_message>
Little modifications in the presentation
</commit_message>
<xml_diff>
--- a/Presentations/3. CID Presentation.pptx
+++ b/Presentations/3. CID Presentation.pptx
@@ -6,7 +6,7 @@
     <p:sldMasterId id="2147483661" r:id="rId2"/>
   </p:sldMasterIdLst>
   <p:notesMasterIdLst>
-    <p:notesMasterId r:id="rId13"/>
+    <p:notesMasterId r:id="rId14"/>
   </p:notesMasterIdLst>
   <p:sldIdLst>
     <p:sldId id="258" r:id="rId3"/>
@@ -16,9 +16,10 @@
     <p:sldId id="283" r:id="rId7"/>
     <p:sldId id="285" r:id="rId8"/>
     <p:sldId id="286" r:id="rId9"/>
-    <p:sldId id="288" r:id="rId10"/>
-    <p:sldId id="287" r:id="rId11"/>
-    <p:sldId id="281" r:id="rId12"/>
+    <p:sldId id="289" r:id="rId10"/>
+    <p:sldId id="288" r:id="rId11"/>
+    <p:sldId id="287" r:id="rId12"/>
+    <p:sldId id="281" r:id="rId13"/>
   </p:sldIdLst>
   <p:sldSz cx="9144000" cy="6858000" type="screen4x3"/>
   <p:notesSz cx="6858000" cy="9144000"/>
@@ -823,11 +824,11 @@
           <c:showBubbleSize val="0"/>
         </c:dLbls>
         <c:gapWidth val="100"/>
-        <c:axId val="296784944"/>
-        <c:axId val="296785336"/>
+        <c:axId val="301023952"/>
+        <c:axId val="301027872"/>
       </c:barChart>
       <c:catAx>
-        <c:axId val="296784944"/>
+        <c:axId val="301023952"/>
         <c:scaling>
           <c:orientation val="minMax"/>
         </c:scaling>
@@ -870,7 +871,7 @@
             <a:endParaRPr lang="en-US"/>
           </a:p>
         </c:txPr>
-        <c:crossAx val="296785336"/>
+        <c:crossAx val="301027872"/>
         <c:crosses val="autoZero"/>
         <c:auto val="1"/>
         <c:lblAlgn val="ctr"/>
@@ -878,7 +879,7 @@
         <c:noMultiLvlLbl val="0"/>
       </c:catAx>
       <c:valAx>
-        <c:axId val="296785336"/>
+        <c:axId val="301027872"/>
         <c:scaling>
           <c:orientation val="minMax"/>
         </c:scaling>
@@ -929,7 +930,7 @@
             <a:endParaRPr lang="en-US"/>
           </a:p>
         </c:txPr>
-        <c:crossAx val="296784944"/>
+        <c:crossAx val="301023952"/>
         <c:crosses val="autoZero"/>
         <c:crossBetween val="between"/>
       </c:valAx>
@@ -5646,6 +5647,122 @@
     </p:spTree>
     <p:extLst>
       <p:ext uri="{BB962C8B-B14F-4D97-AF65-F5344CB8AC3E}">
+        <p14:creationId xmlns:p14="http://schemas.microsoft.com/office/powerpoint/2010/main" val="149496133"/>
+      </p:ext>
+    </p:extLst>
+  </p:cSld>
+  <p:clrMapOvr>
+    <a:masterClrMapping/>
+  </p:clrMapOvr>
+</p:notes>
+</file>
+
+<file path=ppt/notesSlides/notesSlide11.xml><?xml version="1.0" encoding="utf-8"?>
+<p:notes xmlns:a="http://schemas.openxmlformats.org/drawingml/2006/main" xmlns:r="http://schemas.openxmlformats.org/officeDocument/2006/relationships" xmlns:p="http://schemas.openxmlformats.org/presentationml/2006/main" showMasterSp="0" showMasterPhAnim="0">
+  <p:cSld>
+    <p:spTree>
+      <p:nvGrpSpPr>
+        <p:cNvPr id="1" name="Shape 59"/>
+        <p:cNvGrpSpPr/>
+        <p:nvPr/>
+      </p:nvGrpSpPr>
+      <p:grpSpPr>
+        <a:xfrm>
+          <a:off x="0" y="0"/>
+          <a:ext cx="0" cy="0"/>
+          <a:chOff x="0" y="0"/>
+          <a:chExt cx="0" cy="0"/>
+        </a:xfrm>
+      </p:grpSpPr>
+      <p:sp>
+        <p:nvSpPr>
+          <p:cNvPr id="60" name="Shape 60"/>
+          <p:cNvSpPr>
+            <a:spLocks noGrp="1" noRot="1" noChangeAspect="1"/>
+          </p:cNvSpPr>
+          <p:nvPr>
+            <p:ph type="sldImg" idx="2"/>
+          </p:nvPr>
+        </p:nvSpPr>
+        <p:spPr>
+          <a:xfrm>
+            <a:off x="1143000" y="685800"/>
+            <a:ext cx="4572000" cy="3429000"/>
+          </a:xfrm>
+          <a:custGeom>
+            <a:avLst/>
+            <a:gdLst/>
+            <a:ahLst/>
+            <a:cxnLst/>
+            <a:rect l="0" t="0" r="0" b="0"/>
+            <a:pathLst>
+              <a:path w="120000" h="120000" extrusionOk="0">
+                <a:moveTo>
+                  <a:pt x="0" y="0"/>
+                </a:moveTo>
+                <a:lnTo>
+                  <a:pt x="120000" y="0"/>
+                </a:lnTo>
+                <a:lnTo>
+                  <a:pt x="120000" y="120000"/>
+                </a:lnTo>
+                <a:lnTo>
+                  <a:pt x="0" y="120000"/>
+                </a:lnTo>
+                <a:close/>
+              </a:path>
+            </a:pathLst>
+          </a:custGeom>
+          <a:noFill/>
+          <a:ln w="9525" cap="flat">
+            <a:solidFill>
+              <a:srgbClr val="000000"/>
+            </a:solidFill>
+            <a:prstDash val="solid"/>
+            <a:round/>
+            <a:headEnd type="none" w="med" len="med"/>
+            <a:tailEnd type="none" w="med" len="med"/>
+          </a:ln>
+        </p:spPr>
+      </p:sp>
+      <p:sp>
+        <p:nvSpPr>
+          <p:cNvPr id="61" name="Shape 61"/>
+          <p:cNvSpPr txBox="1">
+            <a:spLocks noGrp="1"/>
+          </p:cNvSpPr>
+          <p:nvPr>
+            <p:ph type="body" idx="1"/>
+          </p:nvPr>
+        </p:nvSpPr>
+        <p:spPr>
+          <a:xfrm>
+            <a:off x="685800" y="4343400"/>
+            <a:ext cx="5486399" cy="4114800"/>
+          </a:xfrm>
+          <a:prstGeom prst="rect">
+            <a:avLst/>
+          </a:prstGeom>
+        </p:spPr>
+        <p:txBody>
+          <a:bodyPr lIns="91425" tIns="91425" rIns="91425" bIns="91425" anchor="t" anchorCtr="0">
+            <a:noAutofit/>
+          </a:bodyPr>
+          <a:lstStyle/>
+          <a:p>
+            <a:pPr lvl="0" rtl="0">
+              <a:spcBef>
+                <a:spcPts val="0"/>
+              </a:spcBef>
+              <a:buNone/>
+            </a:pPr>
+            <a:endParaRPr/>
+          </a:p>
+        </p:txBody>
+      </p:sp>
+    </p:spTree>
+    <p:extLst>
+      <p:ext uri="{BB962C8B-B14F-4D97-AF65-F5344CB8AC3E}">
         <p14:creationId xmlns:p14="http://schemas.microsoft.com/office/powerpoint/2010/main" val="2289048339"/>
       </p:ext>
     </p:extLst>
@@ -6458,7 +6575,7 @@
     </p:spTree>
     <p:extLst>
       <p:ext uri="{BB962C8B-B14F-4D97-AF65-F5344CB8AC3E}">
-        <p14:creationId xmlns:p14="http://schemas.microsoft.com/office/powerpoint/2010/main" val="717374714"/>
+        <p14:creationId xmlns:p14="http://schemas.microsoft.com/office/powerpoint/2010/main" val="2713277404"/>
       </p:ext>
     </p:extLst>
   </p:cSld>
@@ -6574,7 +6691,7 @@
     </p:spTree>
     <p:extLst>
       <p:ext uri="{BB962C8B-B14F-4D97-AF65-F5344CB8AC3E}">
-        <p14:creationId xmlns:p14="http://schemas.microsoft.com/office/powerpoint/2010/main" val="149496133"/>
+        <p14:creationId xmlns:p14="http://schemas.microsoft.com/office/powerpoint/2010/main" val="717374714"/>
       </p:ext>
     </p:extLst>
   </p:cSld>
@@ -12901,6 +13018,1009 @@
 </file>
 
 <file path=ppt/slides/slide10.xml><?xml version="1.0" encoding="utf-8"?>
+<p:sld xmlns:a="http://schemas.openxmlformats.org/drawingml/2006/main" xmlns:r="http://schemas.openxmlformats.org/officeDocument/2006/relationships" xmlns:p="http://schemas.openxmlformats.org/presentationml/2006/main">
+  <p:cSld>
+    <p:spTree>
+      <p:nvGrpSpPr>
+        <p:cNvPr id="1" name="Shape 50"/>
+        <p:cNvGrpSpPr/>
+        <p:nvPr/>
+      </p:nvGrpSpPr>
+      <p:grpSpPr>
+        <a:xfrm>
+          <a:off x="0" y="0"/>
+          <a:ext cx="0" cy="0"/>
+          <a:chOff x="0" y="0"/>
+          <a:chExt cx="0" cy="0"/>
+        </a:xfrm>
+      </p:grpSpPr>
+      <p:sp>
+        <p:nvSpPr>
+          <p:cNvPr id="51" name="Shape 51"/>
+          <p:cNvSpPr txBox="1">
+            <a:spLocks noGrp="1"/>
+          </p:cNvSpPr>
+          <p:nvPr>
+            <p:ph type="title"/>
+          </p:nvPr>
+        </p:nvSpPr>
+        <p:spPr>
+          <a:xfrm>
+            <a:off x="837450" y="131950"/>
+            <a:ext cx="8136900" cy="498599"/>
+          </a:xfrm>
+          <a:prstGeom prst="rect">
+            <a:avLst/>
+          </a:prstGeom>
+        </p:spPr>
+        <p:txBody>
+          <a:bodyPr lIns="91425" tIns="91425" rIns="91425" bIns="91425" anchor="b" anchorCtr="0">
+            <a:noAutofit/>
+          </a:bodyPr>
+          <a:lstStyle/>
+          <a:p>
+            <a:pPr lvl="0" rtl="0">
+              <a:spcBef>
+                <a:spcPts val="0"/>
+              </a:spcBef>
+              <a:buNone/>
+            </a:pPr>
+            <a:r>
+              <a:rPr lang="en-US" sz="3000" dirty="0" smtClean="0">
+                <a:solidFill>
+                  <a:srgbClr val="003366"/>
+                </a:solidFill>
+              </a:rPr>
+              <a:t>Suggestions…</a:t>
+            </a:r>
+            <a:endParaRPr lang="en-US" sz="3000" b="0" i="1" dirty="0">
+              <a:solidFill>
+                <a:srgbClr val="003366"/>
+              </a:solidFill>
+            </a:endParaRPr>
+          </a:p>
+        </p:txBody>
+      </p:sp>
+      <p:sp>
+        <p:nvSpPr>
+          <p:cNvPr id="52" name="Shape 52"/>
+          <p:cNvSpPr txBox="1">
+            <a:spLocks noGrp="1"/>
+          </p:cNvSpPr>
+          <p:nvPr>
+            <p:ph type="body" idx="1"/>
+          </p:nvPr>
+        </p:nvSpPr>
+        <p:spPr>
+          <a:xfrm>
+            <a:off x="314900" y="2567214"/>
+            <a:ext cx="8229600" cy="2084357"/>
+          </a:xfrm>
+          <a:prstGeom prst="rect">
+            <a:avLst/>
+          </a:prstGeom>
+        </p:spPr>
+        <p:txBody>
+          <a:bodyPr lIns="91425" tIns="91425" rIns="91425" bIns="91425" anchor="ctr" anchorCtr="0">
+            <a:noAutofit/>
+          </a:bodyPr>
+          <a:lstStyle/>
+          <a:p>
+            <a:pPr marL="342900" indent="-342900" algn="just">
+              <a:buFont typeface="Wingdings" panose="05000000000000000000" pitchFamily="2" charset="2"/>
+              <a:buChar char="v"/>
+            </a:pPr>
+            <a:r>
+              <a:rPr lang="en-US" sz="2800" dirty="0" smtClean="0">
+                <a:solidFill>
+                  <a:schemeClr val="accent1">
+                    <a:lumMod val="50000"/>
+                  </a:schemeClr>
+                </a:solidFill>
+              </a:rPr>
+              <a:t> Improve the Code Documentation with more </a:t>
+            </a:r>
+            <a:r>
+              <a:rPr lang="en-US" sz="2800" b="1" dirty="0" smtClean="0">
+                <a:solidFill>
+                  <a:schemeClr val="accent1">
+                    <a:lumMod val="50000"/>
+                  </a:schemeClr>
+                </a:solidFill>
+              </a:rPr>
+              <a:t>comments</a:t>
+            </a:r>
+            <a:r>
+              <a:rPr lang="en-US" sz="2800" dirty="0" smtClean="0">
+                <a:solidFill>
+                  <a:schemeClr val="accent1">
+                    <a:lumMod val="50000"/>
+                  </a:schemeClr>
+                </a:solidFill>
+              </a:rPr>
+              <a:t>. </a:t>
+            </a:r>
+          </a:p>
+          <a:p>
+            <a:pPr marL="342900" indent="-342900" algn="just">
+              <a:buFont typeface="Wingdings" panose="05000000000000000000" pitchFamily="2" charset="2"/>
+              <a:buChar char="v"/>
+            </a:pPr>
+            <a:endParaRPr lang="en-US" sz="2800" dirty="0" smtClean="0">
+              <a:solidFill>
+                <a:schemeClr val="accent1">
+                  <a:lumMod val="50000"/>
+                </a:schemeClr>
+              </a:solidFill>
+            </a:endParaRPr>
+          </a:p>
+          <a:p>
+            <a:pPr marL="342900" indent="-342900" algn="just">
+              <a:buFont typeface="Wingdings" panose="05000000000000000000" pitchFamily="2" charset="2"/>
+              <a:buChar char="v"/>
+            </a:pPr>
+            <a:r>
+              <a:rPr lang="en-US" sz="2800" dirty="0" smtClean="0">
+                <a:solidFill>
+                  <a:schemeClr val="accent1">
+                    <a:lumMod val="50000"/>
+                  </a:schemeClr>
+                </a:solidFill>
+              </a:rPr>
+              <a:t> Improve the Code Documentation with   better </a:t>
+            </a:r>
+            <a:r>
+              <a:rPr lang="en-US" sz="2800" b="1" dirty="0" smtClean="0">
+                <a:solidFill>
+                  <a:schemeClr val="accent1">
+                    <a:lumMod val="50000"/>
+                  </a:schemeClr>
+                </a:solidFill>
+              </a:rPr>
+              <a:t>JavaDoc</a:t>
+            </a:r>
+            <a:r>
+              <a:rPr lang="en-US" sz="2800" dirty="0" smtClean="0">
+                <a:solidFill>
+                  <a:schemeClr val="accent1">
+                    <a:lumMod val="50000"/>
+                  </a:schemeClr>
+                </a:solidFill>
+              </a:rPr>
+              <a:t> (pre/post conditions and so on, as seen in </a:t>
+            </a:r>
+            <a:r>
+              <a:rPr lang="en-US" sz="2800" i="1" dirty="0" smtClean="0">
+                <a:solidFill>
+                  <a:schemeClr val="accent1">
+                    <a:lumMod val="50000"/>
+                  </a:schemeClr>
+                </a:solidFill>
+              </a:rPr>
+              <a:t>Software Engineering 1</a:t>
+            </a:r>
+            <a:r>
+              <a:rPr lang="en-US" sz="2800" dirty="0" smtClean="0">
+                <a:solidFill>
+                  <a:schemeClr val="accent1">
+                    <a:lumMod val="50000"/>
+                  </a:schemeClr>
+                </a:solidFill>
+              </a:rPr>
+              <a:t>).</a:t>
+            </a:r>
+          </a:p>
+          <a:p>
+            <a:pPr marL="342900" indent="-342900" algn="just">
+              <a:buFont typeface="Wingdings" panose="05000000000000000000" pitchFamily="2" charset="2"/>
+              <a:buChar char="v"/>
+            </a:pPr>
+            <a:endParaRPr lang="en-US" sz="2800" dirty="0">
+              <a:solidFill>
+                <a:schemeClr val="accent1">
+                  <a:lumMod val="50000"/>
+                </a:schemeClr>
+              </a:solidFill>
+            </a:endParaRPr>
+          </a:p>
+          <a:p>
+            <a:pPr marL="342900" indent="-342900" algn="just">
+              <a:buFont typeface="Wingdings" panose="05000000000000000000" pitchFamily="2" charset="2"/>
+              <a:buChar char="v"/>
+            </a:pPr>
+            <a:r>
+              <a:rPr lang="en-US" sz="2800" dirty="0">
+                <a:solidFill>
+                  <a:schemeClr val="accent1">
+                    <a:lumMod val="50000"/>
+                  </a:schemeClr>
+                </a:solidFill>
+              </a:rPr>
+              <a:t> </a:t>
+            </a:r>
+            <a:r>
+              <a:rPr lang="en-US" sz="2800" dirty="0" smtClean="0">
+                <a:solidFill>
+                  <a:schemeClr val="accent1">
+                    <a:lumMod val="50000"/>
+                  </a:schemeClr>
+                </a:solidFill>
+              </a:rPr>
+              <a:t>Use the “</a:t>
+            </a:r>
+            <a:r>
+              <a:rPr lang="en-US" sz="2800" b="1" i="1" dirty="0" smtClean="0">
+                <a:solidFill>
+                  <a:schemeClr val="accent1">
+                    <a:lumMod val="50000"/>
+                  </a:schemeClr>
+                </a:solidFill>
+              </a:rPr>
+              <a:t>Divide et </a:t>
+            </a:r>
+            <a:r>
+              <a:rPr lang="en-US" sz="2800" b="1" i="1" dirty="0" err="1" smtClean="0">
+                <a:solidFill>
+                  <a:schemeClr val="accent1">
+                    <a:lumMod val="50000"/>
+                  </a:schemeClr>
+                </a:solidFill>
+              </a:rPr>
+              <a:t>Impera</a:t>
+            </a:r>
+            <a:r>
+              <a:rPr lang="en-US" sz="2800" dirty="0" smtClean="0">
+                <a:solidFill>
+                  <a:schemeClr val="accent1">
+                    <a:lumMod val="50000"/>
+                  </a:schemeClr>
+                </a:solidFill>
+              </a:rPr>
+              <a:t>” principle with </a:t>
+            </a:r>
+            <a:r>
+              <a:rPr lang="en-US" sz="2800" i="1" dirty="0" smtClean="0">
+                <a:solidFill>
+                  <a:schemeClr val="accent1">
+                    <a:lumMod val="50000"/>
+                  </a:schemeClr>
+                </a:solidFill>
+              </a:rPr>
+              <a:t>execute().</a:t>
+            </a:r>
+          </a:p>
+          <a:p>
+            <a:pPr marL="342900" indent="-342900" algn="just">
+              <a:buFont typeface="Wingdings" panose="05000000000000000000" pitchFamily="2" charset="2"/>
+              <a:buChar char="v"/>
+            </a:pPr>
+            <a:endParaRPr lang="en-US" sz="2800" dirty="0">
+              <a:solidFill>
+                <a:schemeClr val="accent1">
+                  <a:lumMod val="50000"/>
+                </a:schemeClr>
+              </a:solidFill>
+            </a:endParaRPr>
+          </a:p>
+          <a:p>
+            <a:pPr marL="342900" indent="-342900" algn="just">
+              <a:buFont typeface="Wingdings" panose="05000000000000000000" pitchFamily="2" charset="2"/>
+              <a:buChar char="v"/>
+            </a:pPr>
+            <a:r>
+              <a:rPr lang="en-US" sz="2800" dirty="0" smtClean="0">
+                <a:solidFill>
+                  <a:schemeClr val="accent1">
+                    <a:lumMod val="50000"/>
+                  </a:schemeClr>
+                </a:solidFill>
+              </a:rPr>
+              <a:t> … other? </a:t>
+            </a:r>
+            <a:r>
+              <a:rPr lang="en-US" sz="2800" dirty="0" smtClean="0">
+                <a:solidFill>
+                  <a:srgbClr val="92D050"/>
+                </a:solidFill>
+              </a:rPr>
+              <a:t>/</a:t>
+            </a:r>
+            <a:r>
+              <a:rPr lang="en-US" sz="2800" i="1" dirty="0" smtClean="0">
+                <a:solidFill>
+                  <a:srgbClr val="92D050"/>
+                </a:solidFill>
+              </a:rPr>
+              <a:t>* Sometimes it depends just from your tastes… this is the life! </a:t>
+            </a:r>
+            <a:r>
+              <a:rPr lang="en-US" sz="2800" b="1" dirty="0" smtClean="0">
+                <a:solidFill>
+                  <a:srgbClr val="92D050"/>
+                </a:solidFill>
+                <a:sym typeface="Wingdings" panose="05000000000000000000" pitchFamily="2" charset="2"/>
+              </a:rPr>
+              <a:t></a:t>
+            </a:r>
+            <a:r>
+              <a:rPr lang="en-US" sz="2800" i="1" dirty="0" smtClean="0">
+                <a:solidFill>
+                  <a:srgbClr val="92D050"/>
+                </a:solidFill>
+                <a:sym typeface="Wingdings" panose="05000000000000000000" pitchFamily="2" charset="2"/>
+              </a:rPr>
+              <a:t> </a:t>
+            </a:r>
+            <a:r>
+              <a:rPr lang="en-US" sz="2800" i="1" dirty="0" smtClean="0">
+                <a:solidFill>
+                  <a:srgbClr val="92D050"/>
+                </a:solidFill>
+              </a:rPr>
+              <a:t>*/</a:t>
+            </a:r>
+            <a:endParaRPr lang="en-US" sz="2800" i="1" dirty="0">
+              <a:solidFill>
+                <a:schemeClr val="accent1">
+                  <a:lumMod val="50000"/>
+                </a:schemeClr>
+              </a:solidFill>
+            </a:endParaRPr>
+          </a:p>
+        </p:txBody>
+      </p:sp>
+      <p:pic>
+        <p:nvPicPr>
+          <p:cNvPr id="53" name="Shape 53"/>
+          <p:cNvPicPr preferRelativeResize="0"/>
+          <p:nvPr/>
+        </p:nvPicPr>
+        <p:blipFill>
+          <a:blip r:embed="rId3">
+            <a:alphaModFix/>
+          </a:blip>
+          <a:stretch>
+            <a:fillRect/>
+          </a:stretch>
+        </p:blipFill>
+        <p:spPr>
+          <a:xfrm>
+            <a:off x="82450" y="65950"/>
+            <a:ext cx="464900" cy="498650"/>
+          </a:xfrm>
+          <a:prstGeom prst="rect">
+            <a:avLst/>
+          </a:prstGeom>
+          <a:noFill/>
+          <a:ln>
+            <a:noFill/>
+          </a:ln>
+        </p:spPr>
+      </p:pic>
+      <p:pic>
+        <p:nvPicPr>
+          <p:cNvPr id="54" name="Shape 54"/>
+          <p:cNvPicPr preferRelativeResize="0"/>
+          <p:nvPr/>
+        </p:nvPicPr>
+        <p:blipFill>
+          <a:blip r:embed="rId4">
+            <a:alphaModFix/>
+          </a:blip>
+          <a:stretch>
+            <a:fillRect/>
+          </a:stretch>
+        </p:blipFill>
+        <p:spPr>
+          <a:xfrm>
+            <a:off x="0" y="630539"/>
+            <a:ext cx="9143998" cy="97471"/>
+          </a:xfrm>
+          <a:prstGeom prst="rect">
+            <a:avLst/>
+          </a:prstGeom>
+          <a:noFill/>
+          <a:ln>
+            <a:noFill/>
+          </a:ln>
+        </p:spPr>
+      </p:pic>
+      <p:cxnSp>
+        <p:nvCxnSpPr>
+          <p:cNvPr id="55" name="Shape 55"/>
+          <p:cNvCxnSpPr/>
+          <p:nvPr/>
+        </p:nvCxnSpPr>
+        <p:spPr>
+          <a:xfrm rot="10800000">
+            <a:off x="691550" y="125"/>
+            <a:ext cx="0" cy="630299"/>
+          </a:xfrm>
+          <a:prstGeom prst="straightConnector1">
+            <a:avLst/>
+          </a:prstGeom>
+          <a:noFill/>
+          <a:ln w="9525" cap="flat">
+            <a:solidFill>
+              <a:srgbClr val="003366"/>
+            </a:solidFill>
+            <a:prstDash val="solid"/>
+            <a:round/>
+            <a:headEnd type="none" w="lg" len="lg"/>
+            <a:tailEnd type="none" w="lg" len="lg"/>
+          </a:ln>
+        </p:spPr>
+      </p:cxnSp>
+      <p:sp>
+        <p:nvSpPr>
+          <p:cNvPr id="56" name="Shape 56"/>
+          <p:cNvSpPr txBox="1"/>
+          <p:nvPr/>
+        </p:nvSpPr>
+        <p:spPr>
+          <a:xfrm>
+            <a:off x="6783700" y="6531000"/>
+            <a:ext cx="2599200" cy="363899"/>
+          </a:xfrm>
+          <a:prstGeom prst="rect">
+            <a:avLst/>
+          </a:prstGeom>
+          <a:noFill/>
+          <a:ln>
+            <a:noFill/>
+          </a:ln>
+        </p:spPr>
+        <p:txBody>
+          <a:bodyPr lIns="91425" tIns="91425" rIns="91425" bIns="91425" anchor="t" anchorCtr="0">
+            <a:noAutofit/>
+          </a:bodyPr>
+          <a:lstStyle/>
+          <a:p>
+            <a:pPr lvl="0" rtl="0">
+              <a:spcBef>
+                <a:spcPts val="0"/>
+              </a:spcBef>
+              <a:buNone/>
+            </a:pPr>
+            <a:r>
+              <a:rPr lang="it" sz="1200" b="1">
+                <a:solidFill>
+                  <a:srgbClr val="FFFFFF"/>
+                </a:solidFill>
+              </a:rPr>
+              <a:t>POLITECNICO DI MILANO</a:t>
+            </a:r>
+          </a:p>
+        </p:txBody>
+      </p:sp>
+      <p:pic>
+        <p:nvPicPr>
+          <p:cNvPr id="57" name="Shape 57"/>
+          <p:cNvPicPr preferRelativeResize="0"/>
+          <p:nvPr/>
+        </p:nvPicPr>
+        <p:blipFill>
+          <a:blip r:embed="rId5">
+            <a:alphaModFix/>
+          </a:blip>
+          <a:stretch>
+            <a:fillRect/>
+          </a:stretch>
+        </p:blipFill>
+        <p:spPr>
+          <a:xfrm>
+            <a:off x="0" y="6571225"/>
+            <a:ext cx="9144000" cy="286775"/>
+          </a:xfrm>
+          <a:prstGeom prst="rect">
+            <a:avLst/>
+          </a:prstGeom>
+          <a:noFill/>
+          <a:ln>
+            <a:noFill/>
+          </a:ln>
+        </p:spPr>
+      </p:pic>
+      <p:sp>
+        <p:nvSpPr>
+          <p:cNvPr id="58" name="Shape 58"/>
+          <p:cNvSpPr txBox="1">
+            <a:spLocks noGrp="1"/>
+          </p:cNvSpPr>
+          <p:nvPr>
+            <p:ph type="ctrTitle" idx="4294967295"/>
+          </p:nvPr>
+        </p:nvSpPr>
+        <p:spPr>
+          <a:xfrm>
+            <a:off x="457200" y="6712949"/>
+            <a:ext cx="5162269" cy="281444"/>
+          </a:xfrm>
+          <a:prstGeom prst="rect">
+            <a:avLst/>
+          </a:prstGeom>
+        </p:spPr>
+        <p:txBody>
+          <a:bodyPr lIns="91425" tIns="91425" rIns="91425" bIns="91425" anchor="ctr" anchorCtr="0">
+            <a:noAutofit/>
+          </a:bodyPr>
+          <a:lstStyle/>
+          <a:p>
+            <a:pPr indent="457200">
+              <a:lnSpc>
+                <a:spcPct val="115000"/>
+              </a:lnSpc>
+            </a:pPr>
+            <a:r>
+              <a:rPr lang="it-IT" sz="1300" b="1" dirty="0">
+                <a:solidFill>
+                  <a:srgbClr val="003366"/>
+                </a:solidFill>
+              </a:rPr>
+              <a:t>SE2 – Andrea Martino, Francesco Marchesani</a:t>
+            </a:r>
+            <a:br>
+              <a:rPr lang="it-IT" sz="1300" b="1" dirty="0">
+                <a:solidFill>
+                  <a:srgbClr val="003366"/>
+                </a:solidFill>
+              </a:rPr>
+            </a:br>
+            <a:endParaRPr sz="1300" dirty="0">
+              <a:solidFill>
+                <a:srgbClr val="003366"/>
+              </a:solidFill>
+            </a:endParaRPr>
+          </a:p>
+        </p:txBody>
+      </p:sp>
+    </p:spTree>
+    <p:extLst>
+      <p:ext uri="{BB962C8B-B14F-4D97-AF65-F5344CB8AC3E}">
+        <p14:creationId xmlns:p14="http://schemas.microsoft.com/office/powerpoint/2010/main" val="1785322328"/>
+      </p:ext>
+    </p:extLst>
+  </p:cSld>
+  <p:clrMapOvr>
+    <a:masterClrMapping/>
+  </p:clrMapOvr>
+  <p:transition spd="slow">
+    <p:cut/>
+  </p:transition>
+  <p:timing>
+    <p:tnLst>
+      <p:par>
+        <p:cTn id="1" dur="indefinite" restart="never" nodeType="tmRoot">
+          <p:childTnLst>
+            <p:seq concurrent="1" nextAc="seek">
+              <p:cTn id="2" dur="indefinite" nodeType="mainSeq">
+                <p:childTnLst>
+                  <p:par>
+                    <p:cTn id="3" fill="hold">
+                      <p:stCondLst>
+                        <p:cond delay="indefinite"/>
+                        <p:cond evt="onBegin" delay="0">
+                          <p:tn val="2"/>
+                        </p:cond>
+                      </p:stCondLst>
+                      <p:childTnLst>
+                        <p:par>
+                          <p:cTn id="4" fill="hold">
+                            <p:stCondLst>
+                              <p:cond delay="0"/>
+                            </p:stCondLst>
+                            <p:childTnLst>
+                              <p:par>
+                                <p:cTn id="5" presetID="2" presetClass="entr" presetSubtype="4" fill="hold" grpId="0" nodeType="afterEffect">
+                                  <p:stCondLst>
+                                    <p:cond delay="0"/>
+                                  </p:stCondLst>
+                                  <p:childTnLst>
+                                    <p:set>
+                                      <p:cBhvr>
+                                        <p:cTn id="6" dur="1" fill="hold">
+                                          <p:stCondLst>
+                                            <p:cond delay="0"/>
+                                          </p:stCondLst>
+                                        </p:cTn>
+                                        <p:tgtEl>
+                                          <p:spTgt spid="52">
+                                            <p:txEl>
+                                              <p:pRg st="0" end="0"/>
+                                            </p:txEl>
+                                          </p:spTgt>
+                                        </p:tgtEl>
+                                        <p:attrNameLst>
+                                          <p:attrName>style.visibility</p:attrName>
+                                        </p:attrNameLst>
+                                      </p:cBhvr>
+                                      <p:to>
+                                        <p:strVal val="visible"/>
+                                      </p:to>
+                                    </p:set>
+                                    <p:anim calcmode="lin" valueType="num">
+                                      <p:cBhvr additive="base">
+                                        <p:cTn id="7" dur="500" fill="hold"/>
+                                        <p:tgtEl>
+                                          <p:spTgt spid="52">
+                                            <p:txEl>
+                                              <p:pRg st="0" end="0"/>
+                                            </p:txEl>
+                                          </p:spTgt>
+                                        </p:tgtEl>
+                                        <p:attrNameLst>
+                                          <p:attrName>ppt_x</p:attrName>
+                                        </p:attrNameLst>
+                                      </p:cBhvr>
+                                      <p:tavLst>
+                                        <p:tav tm="0">
+                                          <p:val>
+                                            <p:strVal val="#ppt_x"/>
+                                          </p:val>
+                                        </p:tav>
+                                        <p:tav tm="100000">
+                                          <p:val>
+                                            <p:strVal val="#ppt_x"/>
+                                          </p:val>
+                                        </p:tav>
+                                      </p:tavLst>
+                                    </p:anim>
+                                    <p:anim calcmode="lin" valueType="num">
+                                      <p:cBhvr additive="base">
+                                        <p:cTn id="8" dur="500" fill="hold"/>
+                                        <p:tgtEl>
+                                          <p:spTgt spid="52">
+                                            <p:txEl>
+                                              <p:pRg st="0" end="0"/>
+                                            </p:txEl>
+                                          </p:spTgt>
+                                        </p:tgtEl>
+                                        <p:attrNameLst>
+                                          <p:attrName>ppt_y</p:attrName>
+                                        </p:attrNameLst>
+                                      </p:cBhvr>
+                                      <p:tavLst>
+                                        <p:tav tm="0">
+                                          <p:val>
+                                            <p:strVal val="1+#ppt_h/2"/>
+                                          </p:val>
+                                        </p:tav>
+                                        <p:tav tm="100000">
+                                          <p:val>
+                                            <p:strVal val="#ppt_y"/>
+                                          </p:val>
+                                        </p:tav>
+                                      </p:tavLst>
+                                    </p:anim>
+                                  </p:childTnLst>
+                                </p:cTn>
+                              </p:par>
+                            </p:childTnLst>
+                          </p:cTn>
+                        </p:par>
+                        <p:par>
+                          <p:cTn id="9" fill="hold">
+                            <p:stCondLst>
+                              <p:cond delay="500"/>
+                            </p:stCondLst>
+                            <p:childTnLst>
+                              <p:par>
+                                <p:cTn id="10" presetID="2" presetClass="entr" presetSubtype="4" fill="hold" grpId="0" nodeType="afterEffect">
+                                  <p:stCondLst>
+                                    <p:cond delay="0"/>
+                                  </p:stCondLst>
+                                  <p:childTnLst>
+                                    <p:set>
+                                      <p:cBhvr>
+                                        <p:cTn id="11" dur="1" fill="hold">
+                                          <p:stCondLst>
+                                            <p:cond delay="0"/>
+                                          </p:stCondLst>
+                                        </p:cTn>
+                                        <p:tgtEl>
+                                          <p:spTgt spid="52">
+                                            <p:txEl>
+                                              <p:pRg st="2" end="2"/>
+                                            </p:txEl>
+                                          </p:spTgt>
+                                        </p:tgtEl>
+                                        <p:attrNameLst>
+                                          <p:attrName>style.visibility</p:attrName>
+                                        </p:attrNameLst>
+                                      </p:cBhvr>
+                                      <p:to>
+                                        <p:strVal val="visible"/>
+                                      </p:to>
+                                    </p:set>
+                                    <p:anim calcmode="lin" valueType="num">
+                                      <p:cBhvr additive="base">
+                                        <p:cTn id="12" dur="500" fill="hold"/>
+                                        <p:tgtEl>
+                                          <p:spTgt spid="52">
+                                            <p:txEl>
+                                              <p:pRg st="2" end="2"/>
+                                            </p:txEl>
+                                          </p:spTgt>
+                                        </p:tgtEl>
+                                        <p:attrNameLst>
+                                          <p:attrName>ppt_x</p:attrName>
+                                        </p:attrNameLst>
+                                      </p:cBhvr>
+                                      <p:tavLst>
+                                        <p:tav tm="0">
+                                          <p:val>
+                                            <p:strVal val="#ppt_x"/>
+                                          </p:val>
+                                        </p:tav>
+                                        <p:tav tm="100000">
+                                          <p:val>
+                                            <p:strVal val="#ppt_x"/>
+                                          </p:val>
+                                        </p:tav>
+                                      </p:tavLst>
+                                    </p:anim>
+                                    <p:anim calcmode="lin" valueType="num">
+                                      <p:cBhvr additive="base">
+                                        <p:cTn id="13" dur="500" fill="hold"/>
+                                        <p:tgtEl>
+                                          <p:spTgt spid="52">
+                                            <p:txEl>
+                                              <p:pRg st="2" end="2"/>
+                                            </p:txEl>
+                                          </p:spTgt>
+                                        </p:tgtEl>
+                                        <p:attrNameLst>
+                                          <p:attrName>ppt_y</p:attrName>
+                                        </p:attrNameLst>
+                                      </p:cBhvr>
+                                      <p:tavLst>
+                                        <p:tav tm="0">
+                                          <p:val>
+                                            <p:strVal val="1+#ppt_h/2"/>
+                                          </p:val>
+                                        </p:tav>
+                                        <p:tav tm="100000">
+                                          <p:val>
+                                            <p:strVal val="#ppt_y"/>
+                                          </p:val>
+                                        </p:tav>
+                                      </p:tavLst>
+                                    </p:anim>
+                                  </p:childTnLst>
+                                </p:cTn>
+                              </p:par>
+                            </p:childTnLst>
+                          </p:cTn>
+                        </p:par>
+                      </p:childTnLst>
+                    </p:cTn>
+                  </p:par>
+                  <p:par>
+                    <p:cTn id="14" fill="hold">
+                      <p:stCondLst>
+                        <p:cond delay="indefinite"/>
+                      </p:stCondLst>
+                      <p:childTnLst>
+                        <p:par>
+                          <p:cTn id="15" fill="hold">
+                            <p:stCondLst>
+                              <p:cond delay="0"/>
+                            </p:stCondLst>
+                            <p:childTnLst>
+                              <p:par>
+                                <p:cTn id="16" presetID="2" presetClass="entr" presetSubtype="4" fill="hold" grpId="0" nodeType="clickEffect">
+                                  <p:stCondLst>
+                                    <p:cond delay="0"/>
+                                  </p:stCondLst>
+                                  <p:childTnLst>
+                                    <p:set>
+                                      <p:cBhvr>
+                                        <p:cTn id="17" dur="1" fill="hold">
+                                          <p:stCondLst>
+                                            <p:cond delay="0"/>
+                                          </p:stCondLst>
+                                        </p:cTn>
+                                        <p:tgtEl>
+                                          <p:spTgt spid="52">
+                                            <p:txEl>
+                                              <p:pRg st="4" end="4"/>
+                                            </p:txEl>
+                                          </p:spTgt>
+                                        </p:tgtEl>
+                                        <p:attrNameLst>
+                                          <p:attrName>style.visibility</p:attrName>
+                                        </p:attrNameLst>
+                                      </p:cBhvr>
+                                      <p:to>
+                                        <p:strVal val="visible"/>
+                                      </p:to>
+                                    </p:set>
+                                    <p:anim calcmode="lin" valueType="num">
+                                      <p:cBhvr additive="base">
+                                        <p:cTn id="18" dur="500" fill="hold"/>
+                                        <p:tgtEl>
+                                          <p:spTgt spid="52">
+                                            <p:txEl>
+                                              <p:pRg st="4" end="4"/>
+                                            </p:txEl>
+                                          </p:spTgt>
+                                        </p:tgtEl>
+                                        <p:attrNameLst>
+                                          <p:attrName>ppt_x</p:attrName>
+                                        </p:attrNameLst>
+                                      </p:cBhvr>
+                                      <p:tavLst>
+                                        <p:tav tm="0">
+                                          <p:val>
+                                            <p:strVal val="#ppt_x"/>
+                                          </p:val>
+                                        </p:tav>
+                                        <p:tav tm="100000">
+                                          <p:val>
+                                            <p:strVal val="#ppt_x"/>
+                                          </p:val>
+                                        </p:tav>
+                                      </p:tavLst>
+                                    </p:anim>
+                                    <p:anim calcmode="lin" valueType="num">
+                                      <p:cBhvr additive="base">
+                                        <p:cTn id="19" dur="500" fill="hold"/>
+                                        <p:tgtEl>
+                                          <p:spTgt spid="52">
+                                            <p:txEl>
+                                              <p:pRg st="4" end="4"/>
+                                            </p:txEl>
+                                          </p:spTgt>
+                                        </p:tgtEl>
+                                        <p:attrNameLst>
+                                          <p:attrName>ppt_y</p:attrName>
+                                        </p:attrNameLst>
+                                      </p:cBhvr>
+                                      <p:tavLst>
+                                        <p:tav tm="0">
+                                          <p:val>
+                                            <p:strVal val="1+#ppt_h/2"/>
+                                          </p:val>
+                                        </p:tav>
+                                        <p:tav tm="100000">
+                                          <p:val>
+                                            <p:strVal val="#ppt_y"/>
+                                          </p:val>
+                                        </p:tav>
+                                      </p:tavLst>
+                                    </p:anim>
+                                  </p:childTnLst>
+                                </p:cTn>
+                              </p:par>
+                            </p:childTnLst>
+                          </p:cTn>
+                        </p:par>
+                        <p:par>
+                          <p:cTn id="20" fill="hold">
+                            <p:stCondLst>
+                              <p:cond delay="500"/>
+                            </p:stCondLst>
+                            <p:childTnLst>
+                              <p:par>
+                                <p:cTn id="21" presetID="2" presetClass="entr" presetSubtype="4" fill="hold" grpId="0" nodeType="afterEffect">
+                                  <p:stCondLst>
+                                    <p:cond delay="0"/>
+                                  </p:stCondLst>
+                                  <p:childTnLst>
+                                    <p:set>
+                                      <p:cBhvr>
+                                        <p:cTn id="22" dur="1" fill="hold">
+                                          <p:stCondLst>
+                                            <p:cond delay="0"/>
+                                          </p:stCondLst>
+                                        </p:cTn>
+                                        <p:tgtEl>
+                                          <p:spTgt spid="52">
+                                            <p:txEl>
+                                              <p:pRg st="6" end="6"/>
+                                            </p:txEl>
+                                          </p:spTgt>
+                                        </p:tgtEl>
+                                        <p:attrNameLst>
+                                          <p:attrName>style.visibility</p:attrName>
+                                        </p:attrNameLst>
+                                      </p:cBhvr>
+                                      <p:to>
+                                        <p:strVal val="visible"/>
+                                      </p:to>
+                                    </p:set>
+                                    <p:anim calcmode="lin" valueType="num">
+                                      <p:cBhvr additive="base">
+                                        <p:cTn id="23" dur="500" fill="hold"/>
+                                        <p:tgtEl>
+                                          <p:spTgt spid="52">
+                                            <p:txEl>
+                                              <p:pRg st="6" end="6"/>
+                                            </p:txEl>
+                                          </p:spTgt>
+                                        </p:tgtEl>
+                                        <p:attrNameLst>
+                                          <p:attrName>ppt_x</p:attrName>
+                                        </p:attrNameLst>
+                                      </p:cBhvr>
+                                      <p:tavLst>
+                                        <p:tav tm="0">
+                                          <p:val>
+                                            <p:strVal val="#ppt_x"/>
+                                          </p:val>
+                                        </p:tav>
+                                        <p:tav tm="100000">
+                                          <p:val>
+                                            <p:strVal val="#ppt_x"/>
+                                          </p:val>
+                                        </p:tav>
+                                      </p:tavLst>
+                                    </p:anim>
+                                    <p:anim calcmode="lin" valueType="num">
+                                      <p:cBhvr additive="base">
+                                        <p:cTn id="24" dur="500" fill="hold"/>
+                                        <p:tgtEl>
+                                          <p:spTgt spid="52">
+                                            <p:txEl>
+                                              <p:pRg st="6" end="6"/>
+                                            </p:txEl>
+                                          </p:spTgt>
+                                        </p:tgtEl>
+                                        <p:attrNameLst>
+                                          <p:attrName>ppt_y</p:attrName>
+                                        </p:attrNameLst>
+                                      </p:cBhvr>
+                                      <p:tavLst>
+                                        <p:tav tm="0">
+                                          <p:val>
+                                            <p:strVal val="1+#ppt_h/2"/>
+                                          </p:val>
+                                        </p:tav>
+                                        <p:tav tm="100000">
+                                          <p:val>
+                                            <p:strVal val="#ppt_y"/>
+                                          </p:val>
+                                        </p:tav>
+                                      </p:tavLst>
+                                    </p:anim>
+                                  </p:childTnLst>
+                                </p:cTn>
+                              </p:par>
+                            </p:childTnLst>
+                          </p:cTn>
+                        </p:par>
+                      </p:childTnLst>
+                    </p:cTn>
+                  </p:par>
+                </p:childTnLst>
+              </p:cTn>
+              <p:prevCondLst>
+                <p:cond evt="onPrev" delay="0">
+                  <p:tgtEl>
+                    <p:sldTgt/>
+                  </p:tgtEl>
+                </p:cond>
+              </p:prevCondLst>
+              <p:nextCondLst>
+                <p:cond evt="onNext" delay="0">
+                  <p:tgtEl>
+                    <p:sldTgt/>
+                  </p:tgtEl>
+                </p:cond>
+              </p:nextCondLst>
+            </p:seq>
+          </p:childTnLst>
+        </p:cTn>
+      </p:par>
+    </p:tnLst>
+    <p:bldLst>
+      <p:bldP spid="52" grpId="0" uiExpand="1" build="p"/>
+    </p:bldLst>
+  </p:timing>
+</p:sld>
+</file>
+
+<file path=ppt/slides/slide11.xml><?xml version="1.0" encoding="utf-8"?>
 <p:sld xmlns:a="http://schemas.openxmlformats.org/drawingml/2006/main" xmlns:r="http://schemas.openxmlformats.org/officeDocument/2006/relationships" xmlns:p="http://schemas.openxmlformats.org/presentationml/2006/main">
   <p:cSld>
     <p:spTree>
@@ -19013,7 +20133,1090 @@
                   <a:srgbClr val="003366"/>
                 </a:solidFill>
               </a:rPr>
-              <a:t>Most Common Problems</a:t>
+              <a:t>In general…</a:t>
+            </a:r>
+            <a:endParaRPr lang="en-US" sz="3000" b="0" i="1" dirty="0">
+              <a:solidFill>
+                <a:srgbClr val="003366"/>
+              </a:solidFill>
+            </a:endParaRPr>
+          </a:p>
+        </p:txBody>
+      </p:sp>
+      <p:sp>
+        <p:nvSpPr>
+          <p:cNvPr id="52" name="Shape 52"/>
+          <p:cNvSpPr txBox="1">
+            <a:spLocks noGrp="1"/>
+          </p:cNvSpPr>
+          <p:nvPr>
+            <p:ph type="body" idx="1"/>
+          </p:nvPr>
+        </p:nvSpPr>
+        <p:spPr>
+          <a:xfrm>
+            <a:off x="314900" y="1733266"/>
+            <a:ext cx="8229600" cy="2918305"/>
+          </a:xfrm>
+          <a:prstGeom prst="rect">
+            <a:avLst/>
+          </a:prstGeom>
+        </p:spPr>
+        <p:txBody>
+          <a:bodyPr lIns="91425" tIns="91425" rIns="91425" bIns="91425" anchor="ctr" anchorCtr="0">
+            <a:noAutofit/>
+          </a:bodyPr>
+          <a:lstStyle/>
+          <a:p>
+            <a:pPr marL="457200" indent="-457200" algn="just">
+              <a:buFont typeface="Wingdings" panose="05000000000000000000" pitchFamily="2" charset="2"/>
+              <a:buChar char="ü"/>
+            </a:pPr>
+            <a:r>
+              <a:rPr lang="en-US" sz="3200" i="1" dirty="0" smtClean="0">
+                <a:solidFill>
+                  <a:schemeClr val="accent1">
+                    <a:lumMod val="50000"/>
+                  </a:schemeClr>
+                </a:solidFill>
+              </a:rPr>
+              <a:t>The code has a good quality.</a:t>
+            </a:r>
+            <a:endParaRPr lang="en-US" sz="3200" i="1" dirty="0">
+              <a:solidFill>
+                <a:schemeClr val="accent1">
+                  <a:lumMod val="50000"/>
+                </a:schemeClr>
+              </a:solidFill>
+            </a:endParaRPr>
+          </a:p>
+          <a:p>
+            <a:pPr marL="457200" indent="-457200" algn="just">
+              <a:buFont typeface="Wingdings" panose="05000000000000000000" pitchFamily="2" charset="2"/>
+              <a:buChar char="ü"/>
+            </a:pPr>
+            <a:r>
+              <a:rPr lang="en-US" sz="3200" i="1" dirty="0" smtClean="0">
+                <a:solidFill>
+                  <a:schemeClr val="accent1">
+                    <a:lumMod val="50000"/>
+                  </a:schemeClr>
+                </a:solidFill>
+              </a:rPr>
+              <a:t>There are a lot of checklist points without problems.</a:t>
+            </a:r>
+          </a:p>
+          <a:p>
+            <a:pPr algn="just">
+              <a:buNone/>
+            </a:pPr>
+            <a:endParaRPr lang="en-US" sz="3200" i="1" dirty="0" smtClean="0">
+              <a:solidFill>
+                <a:schemeClr val="accent1">
+                  <a:lumMod val="50000"/>
+                </a:schemeClr>
+              </a:solidFill>
+            </a:endParaRPr>
+          </a:p>
+          <a:p>
+            <a:pPr marL="457200" indent="-457200" algn="just">
+              <a:buFont typeface="Courier New" panose="02070309020205020404" pitchFamily="49" charset="0"/>
+              <a:buChar char="o"/>
+            </a:pPr>
+            <a:r>
+              <a:rPr lang="en-US" sz="3200" i="1" dirty="0" smtClean="0">
+                <a:solidFill>
+                  <a:schemeClr val="accent1">
+                    <a:lumMod val="50000"/>
+                  </a:schemeClr>
+                </a:solidFill>
+              </a:rPr>
+              <a:t>But… we need also a </a:t>
+            </a:r>
+            <a:r>
+              <a:rPr lang="en-US" sz="3200" i="1" u="sng" dirty="0" smtClean="0">
+                <a:solidFill>
+                  <a:schemeClr val="accent1">
+                    <a:lumMod val="50000"/>
+                  </a:schemeClr>
+                </a:solidFill>
+              </a:rPr>
+              <a:t>Testing </a:t>
+            </a:r>
+            <a:r>
+              <a:rPr lang="en-US" sz="3200" i="1" u="sng" dirty="0">
+                <a:solidFill>
+                  <a:schemeClr val="accent1">
+                    <a:lumMod val="50000"/>
+                  </a:schemeClr>
+                </a:solidFill>
+              </a:rPr>
+              <a:t>P</a:t>
+            </a:r>
+            <a:r>
+              <a:rPr lang="en-US" sz="3200" i="1" u="sng" dirty="0" smtClean="0">
+                <a:solidFill>
+                  <a:schemeClr val="accent1">
+                    <a:lumMod val="50000"/>
+                  </a:schemeClr>
+                </a:solidFill>
+              </a:rPr>
+              <a:t>hase </a:t>
+            </a:r>
+            <a:r>
+              <a:rPr lang="en-US" sz="3200" i="1" dirty="0" smtClean="0">
+                <a:solidFill>
+                  <a:schemeClr val="accent1">
+                    <a:lumMod val="50000"/>
+                  </a:schemeClr>
+                </a:solidFill>
+              </a:rPr>
+              <a:t>after the Code </a:t>
+            </a:r>
+            <a:r>
+              <a:rPr lang="en-US" sz="3200" i="1" dirty="0" smtClean="0">
+                <a:solidFill>
+                  <a:schemeClr val="accent1">
+                    <a:lumMod val="50000"/>
+                  </a:schemeClr>
+                </a:solidFill>
+              </a:rPr>
+              <a:t>Inspection </a:t>
+            </a:r>
+            <a:r>
+              <a:rPr lang="en-US" sz="3200" i="1" dirty="0" smtClean="0">
+                <a:solidFill>
+                  <a:schemeClr val="accent1">
+                    <a:lumMod val="50000"/>
+                  </a:schemeClr>
+                </a:solidFill>
+              </a:rPr>
+              <a:t>in order to check the class in practice…</a:t>
+            </a:r>
+          </a:p>
+          <a:p>
+            <a:pPr marL="457200" indent="-457200" algn="just">
+              <a:buFont typeface="Wingdings" panose="05000000000000000000" pitchFamily="2" charset="2"/>
+              <a:buChar char="ü"/>
+            </a:pPr>
+            <a:endParaRPr lang="en-US" sz="3200" i="1" dirty="0" smtClean="0">
+              <a:solidFill>
+                <a:schemeClr val="accent1">
+                  <a:lumMod val="50000"/>
+                </a:schemeClr>
+              </a:solidFill>
+            </a:endParaRPr>
+          </a:p>
+        </p:txBody>
+      </p:sp>
+      <p:pic>
+        <p:nvPicPr>
+          <p:cNvPr id="53" name="Shape 53"/>
+          <p:cNvPicPr preferRelativeResize="0"/>
+          <p:nvPr/>
+        </p:nvPicPr>
+        <p:blipFill>
+          <a:blip r:embed="rId3">
+            <a:alphaModFix/>
+          </a:blip>
+          <a:stretch>
+            <a:fillRect/>
+          </a:stretch>
+        </p:blipFill>
+        <p:spPr>
+          <a:xfrm>
+            <a:off x="82450" y="65950"/>
+            <a:ext cx="464900" cy="498650"/>
+          </a:xfrm>
+          <a:prstGeom prst="rect">
+            <a:avLst/>
+          </a:prstGeom>
+          <a:noFill/>
+          <a:ln>
+            <a:noFill/>
+          </a:ln>
+        </p:spPr>
+      </p:pic>
+      <p:pic>
+        <p:nvPicPr>
+          <p:cNvPr id="54" name="Shape 54"/>
+          <p:cNvPicPr preferRelativeResize="0"/>
+          <p:nvPr/>
+        </p:nvPicPr>
+        <p:blipFill>
+          <a:blip r:embed="rId4">
+            <a:alphaModFix/>
+          </a:blip>
+          <a:stretch>
+            <a:fillRect/>
+          </a:stretch>
+        </p:blipFill>
+        <p:spPr>
+          <a:xfrm>
+            <a:off x="0" y="630539"/>
+            <a:ext cx="9143998" cy="97471"/>
+          </a:xfrm>
+          <a:prstGeom prst="rect">
+            <a:avLst/>
+          </a:prstGeom>
+          <a:noFill/>
+          <a:ln>
+            <a:noFill/>
+          </a:ln>
+        </p:spPr>
+      </p:pic>
+      <p:cxnSp>
+        <p:nvCxnSpPr>
+          <p:cNvPr id="55" name="Shape 55"/>
+          <p:cNvCxnSpPr/>
+          <p:nvPr/>
+        </p:nvCxnSpPr>
+        <p:spPr>
+          <a:xfrm rot="10800000">
+            <a:off x="691550" y="125"/>
+            <a:ext cx="0" cy="630299"/>
+          </a:xfrm>
+          <a:prstGeom prst="straightConnector1">
+            <a:avLst/>
+          </a:prstGeom>
+          <a:noFill/>
+          <a:ln w="9525" cap="flat">
+            <a:solidFill>
+              <a:srgbClr val="003366"/>
+            </a:solidFill>
+            <a:prstDash val="solid"/>
+            <a:round/>
+            <a:headEnd type="none" w="lg" len="lg"/>
+            <a:tailEnd type="none" w="lg" len="lg"/>
+          </a:ln>
+        </p:spPr>
+      </p:cxnSp>
+      <p:sp>
+        <p:nvSpPr>
+          <p:cNvPr id="56" name="Shape 56"/>
+          <p:cNvSpPr txBox="1"/>
+          <p:nvPr/>
+        </p:nvSpPr>
+        <p:spPr>
+          <a:xfrm>
+            <a:off x="6783700" y="6531000"/>
+            <a:ext cx="2599200" cy="363899"/>
+          </a:xfrm>
+          <a:prstGeom prst="rect">
+            <a:avLst/>
+          </a:prstGeom>
+          <a:noFill/>
+          <a:ln>
+            <a:noFill/>
+          </a:ln>
+        </p:spPr>
+        <p:txBody>
+          <a:bodyPr lIns="91425" tIns="91425" rIns="91425" bIns="91425" anchor="t" anchorCtr="0">
+            <a:noAutofit/>
+          </a:bodyPr>
+          <a:lstStyle/>
+          <a:p>
+            <a:pPr lvl="0" rtl="0">
+              <a:spcBef>
+                <a:spcPts val="0"/>
+              </a:spcBef>
+              <a:buNone/>
+            </a:pPr>
+            <a:r>
+              <a:rPr lang="it" sz="1200" b="1">
+                <a:solidFill>
+                  <a:srgbClr val="FFFFFF"/>
+                </a:solidFill>
+              </a:rPr>
+              <a:t>POLITECNICO DI MILANO</a:t>
+            </a:r>
+          </a:p>
+        </p:txBody>
+      </p:sp>
+      <p:pic>
+        <p:nvPicPr>
+          <p:cNvPr id="57" name="Shape 57"/>
+          <p:cNvPicPr preferRelativeResize="0"/>
+          <p:nvPr/>
+        </p:nvPicPr>
+        <p:blipFill>
+          <a:blip r:embed="rId5">
+            <a:alphaModFix/>
+          </a:blip>
+          <a:stretch>
+            <a:fillRect/>
+          </a:stretch>
+        </p:blipFill>
+        <p:spPr>
+          <a:xfrm>
+            <a:off x="0" y="6571225"/>
+            <a:ext cx="9144000" cy="286775"/>
+          </a:xfrm>
+          <a:prstGeom prst="rect">
+            <a:avLst/>
+          </a:prstGeom>
+          <a:noFill/>
+          <a:ln>
+            <a:noFill/>
+          </a:ln>
+        </p:spPr>
+      </p:pic>
+      <p:sp>
+        <p:nvSpPr>
+          <p:cNvPr id="58" name="Shape 58"/>
+          <p:cNvSpPr txBox="1">
+            <a:spLocks noGrp="1"/>
+          </p:cNvSpPr>
+          <p:nvPr>
+            <p:ph type="ctrTitle" idx="4294967295"/>
+          </p:nvPr>
+        </p:nvSpPr>
+        <p:spPr>
+          <a:xfrm>
+            <a:off x="457200" y="6712949"/>
+            <a:ext cx="5162269" cy="281444"/>
+          </a:xfrm>
+          <a:prstGeom prst="rect">
+            <a:avLst/>
+          </a:prstGeom>
+        </p:spPr>
+        <p:txBody>
+          <a:bodyPr lIns="91425" tIns="91425" rIns="91425" bIns="91425" anchor="ctr" anchorCtr="0">
+            <a:noAutofit/>
+          </a:bodyPr>
+          <a:lstStyle/>
+          <a:p>
+            <a:pPr indent="457200">
+              <a:lnSpc>
+                <a:spcPct val="115000"/>
+              </a:lnSpc>
+            </a:pPr>
+            <a:r>
+              <a:rPr lang="it-IT" sz="1300" b="1" dirty="0">
+                <a:solidFill>
+                  <a:srgbClr val="003366"/>
+                </a:solidFill>
+              </a:rPr>
+              <a:t>SE2 – Andrea Martino, Francesco Marchesani</a:t>
+            </a:r>
+            <a:br>
+              <a:rPr lang="it-IT" sz="1300" b="1" dirty="0">
+                <a:solidFill>
+                  <a:srgbClr val="003366"/>
+                </a:solidFill>
+              </a:rPr>
+            </a:br>
+            <a:endParaRPr sz="1300" dirty="0">
+              <a:solidFill>
+                <a:srgbClr val="003366"/>
+              </a:solidFill>
+            </a:endParaRPr>
+          </a:p>
+        </p:txBody>
+      </p:sp>
+      <p:sp>
+        <p:nvSpPr>
+          <p:cNvPr id="2" name="CasellaDiTesto 1"/>
+          <p:cNvSpPr txBox="1"/>
+          <p:nvPr/>
+        </p:nvSpPr>
+        <p:spPr>
+          <a:xfrm>
+            <a:off x="691548" y="4826568"/>
+            <a:ext cx="6092151" cy="1569660"/>
+          </a:xfrm>
+          <a:prstGeom prst="rect">
+            <a:avLst/>
+          </a:prstGeom>
+          <a:noFill/>
+        </p:spPr>
+        <p:txBody>
+          <a:bodyPr wrap="square" rtlCol="0">
+            <a:spAutoFit/>
+          </a:bodyPr>
+          <a:lstStyle/>
+          <a:p>
+            <a:r>
+              <a:rPr lang="en-US" sz="2400" dirty="0" smtClean="0">
+                <a:solidFill>
+                  <a:schemeClr val="accent1">
+                    <a:lumMod val="50000"/>
+                  </a:schemeClr>
+                </a:solidFill>
+                <a:latin typeface="Calibri" panose="020F0502020204030204" pitchFamily="34" charset="0"/>
+              </a:rPr>
+              <a:t>Also remember </a:t>
+            </a:r>
+            <a:r>
+              <a:rPr lang="en-US" sz="2400" dirty="0" smtClean="0">
+                <a:solidFill>
+                  <a:schemeClr val="accent1">
+                    <a:lumMod val="50000"/>
+                  </a:schemeClr>
+                </a:solidFill>
+                <a:latin typeface="Calibri" panose="020F0502020204030204" pitchFamily="34" charset="0"/>
+              </a:rPr>
+              <a:t>that (little </a:t>
+            </a:r>
+            <a:r>
+              <a:rPr lang="en-US" sz="2400" i="1" dirty="0" smtClean="0">
+                <a:solidFill>
+                  <a:schemeClr val="accent1">
+                    <a:lumMod val="50000"/>
+                  </a:schemeClr>
+                </a:solidFill>
+                <a:latin typeface="Calibri" panose="020F0502020204030204" pitchFamily="34" charset="0"/>
+              </a:rPr>
+              <a:t>excursus</a:t>
+            </a:r>
+            <a:r>
+              <a:rPr lang="en-US" sz="2400" dirty="0" smtClean="0">
+                <a:solidFill>
+                  <a:schemeClr val="accent1">
+                    <a:lumMod val="50000"/>
+                  </a:schemeClr>
+                </a:solidFill>
+                <a:latin typeface="Calibri" panose="020F0502020204030204" pitchFamily="34" charset="0"/>
+              </a:rPr>
+              <a:t>):</a:t>
+            </a:r>
+            <a:endParaRPr lang="en-US" sz="2400" dirty="0" smtClean="0">
+              <a:solidFill>
+                <a:schemeClr val="accent1">
+                  <a:lumMod val="50000"/>
+                </a:schemeClr>
+              </a:solidFill>
+              <a:latin typeface="Calibri" panose="020F0502020204030204" pitchFamily="34" charset="0"/>
+            </a:endParaRPr>
+          </a:p>
+          <a:p>
+            <a:pPr algn="ctr"/>
+            <a:endParaRPr lang="en-US" sz="2400" dirty="0">
+              <a:solidFill>
+                <a:schemeClr val="accent1">
+                  <a:lumMod val="50000"/>
+                </a:schemeClr>
+              </a:solidFill>
+              <a:latin typeface="Calibri" panose="020F0502020204030204" pitchFamily="34" charset="0"/>
+            </a:endParaRPr>
+          </a:p>
+          <a:p>
+            <a:pPr algn="ctr"/>
+            <a:r>
+              <a:rPr lang="en-US" sz="2400" i="1" dirty="0" smtClean="0">
+                <a:solidFill>
+                  <a:schemeClr val="accent1">
+                    <a:lumMod val="50000"/>
+                  </a:schemeClr>
+                </a:solidFill>
+                <a:latin typeface="Calibri" panose="020F0502020204030204" pitchFamily="34" charset="0"/>
+              </a:rPr>
+              <a:t>“</a:t>
+            </a:r>
+            <a:r>
+              <a:rPr lang="en-US" sz="2400" i="1" dirty="0">
+                <a:solidFill>
+                  <a:schemeClr val="accent1">
+                    <a:lumMod val="50000"/>
+                  </a:schemeClr>
+                </a:solidFill>
+                <a:latin typeface="Calibri" panose="020F0502020204030204" pitchFamily="34" charset="0"/>
+              </a:rPr>
+              <a:t>Testing shows the presence</a:t>
+            </a:r>
+            <a:r>
+              <a:rPr lang="en-US" sz="2400" i="1" dirty="0" smtClean="0">
+                <a:solidFill>
+                  <a:schemeClr val="accent1">
+                    <a:lumMod val="50000"/>
+                  </a:schemeClr>
+                </a:solidFill>
+                <a:latin typeface="Calibri" panose="020F0502020204030204" pitchFamily="34" charset="0"/>
+              </a:rPr>
+              <a:t>,</a:t>
+            </a:r>
+          </a:p>
+          <a:p>
+            <a:pPr algn="ctr"/>
+            <a:r>
+              <a:rPr lang="en-US" sz="2400" i="1" dirty="0" smtClean="0">
+                <a:solidFill>
+                  <a:schemeClr val="accent1">
+                    <a:lumMod val="50000"/>
+                  </a:schemeClr>
+                </a:solidFill>
+                <a:latin typeface="Calibri" panose="020F0502020204030204" pitchFamily="34" charset="0"/>
+              </a:rPr>
+              <a:t> </a:t>
+            </a:r>
+            <a:r>
+              <a:rPr lang="en-US" sz="2400" i="1" dirty="0">
+                <a:solidFill>
+                  <a:schemeClr val="accent1">
+                    <a:lumMod val="50000"/>
+                  </a:schemeClr>
+                </a:solidFill>
+                <a:latin typeface="Calibri" panose="020F0502020204030204" pitchFamily="34" charset="0"/>
+              </a:rPr>
+              <a:t>not the absence of </a:t>
+            </a:r>
+            <a:r>
+              <a:rPr lang="en-US" sz="2400" i="1" dirty="0" smtClean="0">
+                <a:solidFill>
+                  <a:schemeClr val="accent1">
+                    <a:lumMod val="50000"/>
+                  </a:schemeClr>
+                </a:solidFill>
+                <a:latin typeface="Calibri" panose="020F0502020204030204" pitchFamily="34" charset="0"/>
+              </a:rPr>
+              <a:t>bugs </a:t>
+            </a:r>
+            <a:r>
+              <a:rPr lang="en-US" sz="2400" i="1" dirty="0" smtClean="0">
+                <a:solidFill>
+                  <a:schemeClr val="accent1">
+                    <a:lumMod val="50000"/>
+                  </a:schemeClr>
+                </a:solidFill>
+                <a:latin typeface="Calibri" panose="020F0502020204030204" pitchFamily="34" charset="0"/>
+              </a:rPr>
+              <a:t>“ </a:t>
+            </a:r>
+            <a:r>
+              <a:rPr lang="en-US" sz="2400" b="1" i="1" dirty="0" smtClean="0">
+                <a:solidFill>
+                  <a:schemeClr val="accent1">
+                    <a:lumMod val="50000"/>
+                  </a:schemeClr>
+                </a:solidFill>
+                <a:latin typeface="Calibri" panose="020F0502020204030204" pitchFamily="34" charset="0"/>
+              </a:rPr>
+              <a:t>E. Dijkstra</a:t>
+            </a:r>
+            <a:endParaRPr lang="en-US" sz="2400" b="1" i="1" dirty="0">
+              <a:solidFill>
+                <a:schemeClr val="accent1">
+                  <a:lumMod val="50000"/>
+                </a:schemeClr>
+              </a:solidFill>
+              <a:latin typeface="Calibri" panose="020F0502020204030204" pitchFamily="34" charset="0"/>
+            </a:endParaRPr>
+          </a:p>
+        </p:txBody>
+      </p:sp>
+      <p:pic>
+        <p:nvPicPr>
+          <p:cNvPr id="3" name="Immagine 2"/>
+          <p:cNvPicPr>
+            <a:picLocks noChangeAspect="1"/>
+          </p:cNvPicPr>
+          <p:nvPr/>
+        </p:nvPicPr>
+        <p:blipFill>
+          <a:blip r:embed="rId6">
+            <a:extLst>
+              <a:ext uri="{28A0092B-C50C-407E-A947-70E740481C1C}">
+                <a14:useLocalDpi xmlns:a14="http://schemas.microsoft.com/office/drawing/2010/main" val="0"/>
+              </a:ext>
+            </a:extLst>
+          </a:blip>
+          <a:stretch>
+            <a:fillRect/>
+          </a:stretch>
+        </p:blipFill>
+        <p:spPr>
+          <a:xfrm>
+            <a:off x="6783699" y="4375023"/>
+            <a:ext cx="1512797" cy="2019584"/>
+          </a:xfrm>
+          <a:prstGeom prst="rect">
+            <a:avLst/>
+          </a:prstGeom>
+          <a:ln w="19050">
+            <a:solidFill>
+              <a:schemeClr val="tx1"/>
+            </a:solidFill>
+          </a:ln>
+        </p:spPr>
+      </p:pic>
+    </p:spTree>
+    <p:extLst>
+      <p:ext uri="{BB962C8B-B14F-4D97-AF65-F5344CB8AC3E}">
+        <p14:creationId xmlns:p14="http://schemas.microsoft.com/office/powerpoint/2010/main" val="3671107655"/>
+      </p:ext>
+    </p:extLst>
+  </p:cSld>
+  <p:clrMapOvr>
+    <a:masterClrMapping/>
+  </p:clrMapOvr>
+  <p:transition spd="slow">
+    <p:cut/>
+  </p:transition>
+  <p:timing>
+    <p:tnLst>
+      <p:par>
+        <p:cTn id="1" dur="indefinite" restart="never" nodeType="tmRoot">
+          <p:childTnLst>
+            <p:seq concurrent="1" nextAc="seek">
+              <p:cTn id="2" dur="indefinite" nodeType="mainSeq">
+                <p:childTnLst>
+                  <p:par>
+                    <p:cTn id="3" fill="hold">
+                      <p:stCondLst>
+                        <p:cond delay="indefinite"/>
+                        <p:cond evt="onBegin" delay="0">
+                          <p:tn val="2"/>
+                        </p:cond>
+                      </p:stCondLst>
+                      <p:childTnLst>
+                        <p:par>
+                          <p:cTn id="4" fill="hold">
+                            <p:stCondLst>
+                              <p:cond delay="0"/>
+                            </p:stCondLst>
+                            <p:childTnLst>
+                              <p:par>
+                                <p:cTn id="5" presetID="2" presetClass="entr" presetSubtype="4" fill="hold" grpId="0" nodeType="afterEffect">
+                                  <p:stCondLst>
+                                    <p:cond delay="250"/>
+                                  </p:stCondLst>
+                                  <p:childTnLst>
+                                    <p:set>
+                                      <p:cBhvr>
+                                        <p:cTn id="6" dur="1" fill="hold">
+                                          <p:stCondLst>
+                                            <p:cond delay="0"/>
+                                          </p:stCondLst>
+                                        </p:cTn>
+                                        <p:tgtEl>
+                                          <p:spTgt spid="52">
+                                            <p:txEl>
+                                              <p:pRg st="0" end="0"/>
+                                            </p:txEl>
+                                          </p:spTgt>
+                                        </p:tgtEl>
+                                        <p:attrNameLst>
+                                          <p:attrName>style.visibility</p:attrName>
+                                        </p:attrNameLst>
+                                      </p:cBhvr>
+                                      <p:to>
+                                        <p:strVal val="visible"/>
+                                      </p:to>
+                                    </p:set>
+                                    <p:anim calcmode="lin" valueType="num">
+                                      <p:cBhvr additive="base">
+                                        <p:cTn id="7" dur="500" fill="hold"/>
+                                        <p:tgtEl>
+                                          <p:spTgt spid="52">
+                                            <p:txEl>
+                                              <p:pRg st="0" end="0"/>
+                                            </p:txEl>
+                                          </p:spTgt>
+                                        </p:tgtEl>
+                                        <p:attrNameLst>
+                                          <p:attrName>ppt_x</p:attrName>
+                                        </p:attrNameLst>
+                                      </p:cBhvr>
+                                      <p:tavLst>
+                                        <p:tav tm="0">
+                                          <p:val>
+                                            <p:strVal val="#ppt_x"/>
+                                          </p:val>
+                                        </p:tav>
+                                        <p:tav tm="100000">
+                                          <p:val>
+                                            <p:strVal val="#ppt_x"/>
+                                          </p:val>
+                                        </p:tav>
+                                      </p:tavLst>
+                                    </p:anim>
+                                    <p:anim calcmode="lin" valueType="num">
+                                      <p:cBhvr additive="base">
+                                        <p:cTn id="8" dur="500" fill="hold"/>
+                                        <p:tgtEl>
+                                          <p:spTgt spid="52">
+                                            <p:txEl>
+                                              <p:pRg st="0" end="0"/>
+                                            </p:txEl>
+                                          </p:spTgt>
+                                        </p:tgtEl>
+                                        <p:attrNameLst>
+                                          <p:attrName>ppt_y</p:attrName>
+                                        </p:attrNameLst>
+                                      </p:cBhvr>
+                                      <p:tavLst>
+                                        <p:tav tm="0">
+                                          <p:val>
+                                            <p:strVal val="1+#ppt_h/2"/>
+                                          </p:val>
+                                        </p:tav>
+                                        <p:tav tm="100000">
+                                          <p:val>
+                                            <p:strVal val="#ppt_y"/>
+                                          </p:val>
+                                        </p:tav>
+                                      </p:tavLst>
+                                    </p:anim>
+                                  </p:childTnLst>
+                                </p:cTn>
+                              </p:par>
+                            </p:childTnLst>
+                          </p:cTn>
+                        </p:par>
+                        <p:par>
+                          <p:cTn id="9" fill="hold">
+                            <p:stCondLst>
+                              <p:cond delay="750"/>
+                            </p:stCondLst>
+                            <p:childTnLst>
+                              <p:par>
+                                <p:cTn id="10" presetID="2" presetClass="entr" presetSubtype="4" fill="hold" grpId="0" nodeType="afterEffect">
+                                  <p:stCondLst>
+                                    <p:cond delay="250"/>
+                                  </p:stCondLst>
+                                  <p:childTnLst>
+                                    <p:set>
+                                      <p:cBhvr>
+                                        <p:cTn id="11" dur="1" fill="hold">
+                                          <p:stCondLst>
+                                            <p:cond delay="0"/>
+                                          </p:stCondLst>
+                                        </p:cTn>
+                                        <p:tgtEl>
+                                          <p:spTgt spid="52">
+                                            <p:txEl>
+                                              <p:pRg st="1" end="1"/>
+                                            </p:txEl>
+                                          </p:spTgt>
+                                        </p:tgtEl>
+                                        <p:attrNameLst>
+                                          <p:attrName>style.visibility</p:attrName>
+                                        </p:attrNameLst>
+                                      </p:cBhvr>
+                                      <p:to>
+                                        <p:strVal val="visible"/>
+                                      </p:to>
+                                    </p:set>
+                                    <p:anim calcmode="lin" valueType="num">
+                                      <p:cBhvr additive="base">
+                                        <p:cTn id="12" dur="500" fill="hold"/>
+                                        <p:tgtEl>
+                                          <p:spTgt spid="52">
+                                            <p:txEl>
+                                              <p:pRg st="1" end="1"/>
+                                            </p:txEl>
+                                          </p:spTgt>
+                                        </p:tgtEl>
+                                        <p:attrNameLst>
+                                          <p:attrName>ppt_x</p:attrName>
+                                        </p:attrNameLst>
+                                      </p:cBhvr>
+                                      <p:tavLst>
+                                        <p:tav tm="0">
+                                          <p:val>
+                                            <p:strVal val="#ppt_x"/>
+                                          </p:val>
+                                        </p:tav>
+                                        <p:tav tm="100000">
+                                          <p:val>
+                                            <p:strVal val="#ppt_x"/>
+                                          </p:val>
+                                        </p:tav>
+                                      </p:tavLst>
+                                    </p:anim>
+                                    <p:anim calcmode="lin" valueType="num">
+                                      <p:cBhvr additive="base">
+                                        <p:cTn id="13" dur="500" fill="hold"/>
+                                        <p:tgtEl>
+                                          <p:spTgt spid="52">
+                                            <p:txEl>
+                                              <p:pRg st="1" end="1"/>
+                                            </p:txEl>
+                                          </p:spTgt>
+                                        </p:tgtEl>
+                                        <p:attrNameLst>
+                                          <p:attrName>ppt_y</p:attrName>
+                                        </p:attrNameLst>
+                                      </p:cBhvr>
+                                      <p:tavLst>
+                                        <p:tav tm="0">
+                                          <p:val>
+                                            <p:strVal val="1+#ppt_h/2"/>
+                                          </p:val>
+                                        </p:tav>
+                                        <p:tav tm="100000">
+                                          <p:val>
+                                            <p:strVal val="#ppt_y"/>
+                                          </p:val>
+                                        </p:tav>
+                                      </p:tavLst>
+                                    </p:anim>
+                                  </p:childTnLst>
+                                </p:cTn>
+                              </p:par>
+                            </p:childTnLst>
+                          </p:cTn>
+                        </p:par>
+                        <p:par>
+                          <p:cTn id="14" fill="hold">
+                            <p:stCondLst>
+                              <p:cond delay="1500"/>
+                            </p:stCondLst>
+                            <p:childTnLst>
+                              <p:par>
+                                <p:cTn id="15" presetID="2" presetClass="entr" presetSubtype="4" fill="hold" grpId="0" nodeType="afterEffect">
+                                  <p:stCondLst>
+                                    <p:cond delay="250"/>
+                                  </p:stCondLst>
+                                  <p:childTnLst>
+                                    <p:set>
+                                      <p:cBhvr>
+                                        <p:cTn id="16" dur="1" fill="hold">
+                                          <p:stCondLst>
+                                            <p:cond delay="0"/>
+                                          </p:stCondLst>
+                                        </p:cTn>
+                                        <p:tgtEl>
+                                          <p:spTgt spid="52">
+                                            <p:txEl>
+                                              <p:pRg st="3" end="3"/>
+                                            </p:txEl>
+                                          </p:spTgt>
+                                        </p:tgtEl>
+                                        <p:attrNameLst>
+                                          <p:attrName>style.visibility</p:attrName>
+                                        </p:attrNameLst>
+                                      </p:cBhvr>
+                                      <p:to>
+                                        <p:strVal val="visible"/>
+                                      </p:to>
+                                    </p:set>
+                                    <p:anim calcmode="lin" valueType="num">
+                                      <p:cBhvr additive="base">
+                                        <p:cTn id="17" dur="500" fill="hold"/>
+                                        <p:tgtEl>
+                                          <p:spTgt spid="52">
+                                            <p:txEl>
+                                              <p:pRg st="3" end="3"/>
+                                            </p:txEl>
+                                          </p:spTgt>
+                                        </p:tgtEl>
+                                        <p:attrNameLst>
+                                          <p:attrName>ppt_x</p:attrName>
+                                        </p:attrNameLst>
+                                      </p:cBhvr>
+                                      <p:tavLst>
+                                        <p:tav tm="0">
+                                          <p:val>
+                                            <p:strVal val="#ppt_x"/>
+                                          </p:val>
+                                        </p:tav>
+                                        <p:tav tm="100000">
+                                          <p:val>
+                                            <p:strVal val="#ppt_x"/>
+                                          </p:val>
+                                        </p:tav>
+                                      </p:tavLst>
+                                    </p:anim>
+                                    <p:anim calcmode="lin" valueType="num">
+                                      <p:cBhvr additive="base">
+                                        <p:cTn id="18" dur="500" fill="hold"/>
+                                        <p:tgtEl>
+                                          <p:spTgt spid="52">
+                                            <p:txEl>
+                                              <p:pRg st="3" end="3"/>
+                                            </p:txEl>
+                                          </p:spTgt>
+                                        </p:tgtEl>
+                                        <p:attrNameLst>
+                                          <p:attrName>ppt_y</p:attrName>
+                                        </p:attrNameLst>
+                                      </p:cBhvr>
+                                      <p:tavLst>
+                                        <p:tav tm="0">
+                                          <p:val>
+                                            <p:strVal val="1+#ppt_h/2"/>
+                                          </p:val>
+                                        </p:tav>
+                                        <p:tav tm="100000">
+                                          <p:val>
+                                            <p:strVal val="#ppt_y"/>
+                                          </p:val>
+                                        </p:tav>
+                                      </p:tavLst>
+                                    </p:anim>
+                                  </p:childTnLst>
+                                </p:cTn>
+                              </p:par>
+                            </p:childTnLst>
+                          </p:cTn>
+                        </p:par>
+                        <p:par>
+                          <p:cTn id="19" fill="hold">
+                            <p:stCondLst>
+                              <p:cond delay="2250"/>
+                            </p:stCondLst>
+                            <p:childTnLst>
+                              <p:par>
+                                <p:cTn id="20" presetID="22" presetClass="entr" presetSubtype="4" fill="hold" grpId="0" nodeType="afterEffect">
+                                  <p:stCondLst>
+                                    <p:cond delay="250"/>
+                                  </p:stCondLst>
+                                  <p:childTnLst>
+                                    <p:set>
+                                      <p:cBhvr>
+                                        <p:cTn id="21" dur="1" fill="hold">
+                                          <p:stCondLst>
+                                            <p:cond delay="0"/>
+                                          </p:stCondLst>
+                                        </p:cTn>
+                                        <p:tgtEl>
+                                          <p:spTgt spid="2"/>
+                                        </p:tgtEl>
+                                        <p:attrNameLst>
+                                          <p:attrName>style.visibility</p:attrName>
+                                        </p:attrNameLst>
+                                      </p:cBhvr>
+                                      <p:to>
+                                        <p:strVal val="visible"/>
+                                      </p:to>
+                                    </p:set>
+                                    <p:animEffect transition="in" filter="wipe(down)">
+                                      <p:cBhvr>
+                                        <p:cTn id="22" dur="500"/>
+                                        <p:tgtEl>
+                                          <p:spTgt spid="2"/>
+                                        </p:tgtEl>
+                                      </p:cBhvr>
+                                    </p:animEffect>
+                                  </p:childTnLst>
+                                </p:cTn>
+                              </p:par>
+                              <p:par>
+                                <p:cTn id="23" presetID="10" presetClass="entr" presetSubtype="0" fill="hold" nodeType="withEffect">
+                                  <p:stCondLst>
+                                    <p:cond delay="0"/>
+                                  </p:stCondLst>
+                                  <p:childTnLst>
+                                    <p:set>
+                                      <p:cBhvr>
+                                        <p:cTn id="24" dur="1" fill="hold">
+                                          <p:stCondLst>
+                                            <p:cond delay="0"/>
+                                          </p:stCondLst>
+                                        </p:cTn>
+                                        <p:tgtEl>
+                                          <p:spTgt spid="3"/>
+                                        </p:tgtEl>
+                                        <p:attrNameLst>
+                                          <p:attrName>style.visibility</p:attrName>
+                                        </p:attrNameLst>
+                                      </p:cBhvr>
+                                      <p:to>
+                                        <p:strVal val="visible"/>
+                                      </p:to>
+                                    </p:set>
+                                    <p:animEffect transition="in" filter="fade">
+                                      <p:cBhvr>
+                                        <p:cTn id="25" dur="500"/>
+                                        <p:tgtEl>
+                                          <p:spTgt spid="3"/>
+                                        </p:tgtEl>
+                                      </p:cBhvr>
+                                    </p:animEffect>
+                                  </p:childTnLst>
+                                </p:cTn>
+                              </p:par>
+                            </p:childTnLst>
+                          </p:cTn>
+                        </p:par>
+                      </p:childTnLst>
+                    </p:cTn>
+                  </p:par>
+                </p:childTnLst>
+              </p:cTn>
+              <p:prevCondLst>
+                <p:cond evt="onPrev" delay="0">
+                  <p:tgtEl>
+                    <p:sldTgt/>
+                  </p:tgtEl>
+                </p:cond>
+              </p:prevCondLst>
+              <p:nextCondLst>
+                <p:cond evt="onNext" delay="0">
+                  <p:tgtEl>
+                    <p:sldTgt/>
+                  </p:tgtEl>
+                </p:cond>
+              </p:nextCondLst>
+            </p:seq>
+          </p:childTnLst>
+        </p:cTn>
+      </p:par>
+    </p:tnLst>
+    <p:bldLst>
+      <p:bldP spid="52" grpId="0" uiExpand="1" build="p"/>
+      <p:bldP spid="2" grpId="0"/>
+    </p:bldLst>
+  </p:timing>
+</p:sld>
+</file>
+
+<file path=ppt/slides/slide9.xml><?xml version="1.0" encoding="utf-8"?>
+<p:sld xmlns:a="http://schemas.openxmlformats.org/drawingml/2006/main" xmlns:r="http://schemas.openxmlformats.org/officeDocument/2006/relationships" xmlns:p="http://schemas.openxmlformats.org/presentationml/2006/main">
+  <p:cSld>
+    <p:spTree>
+      <p:nvGrpSpPr>
+        <p:cNvPr id="1" name="Shape 50"/>
+        <p:cNvGrpSpPr/>
+        <p:nvPr/>
+      </p:nvGrpSpPr>
+      <p:grpSpPr>
+        <a:xfrm>
+          <a:off x="0" y="0"/>
+          <a:ext cx="0" cy="0"/>
+          <a:chOff x="0" y="0"/>
+          <a:chExt cx="0" cy="0"/>
+        </a:xfrm>
+      </p:grpSpPr>
+      <p:sp>
+        <p:nvSpPr>
+          <p:cNvPr id="51" name="Shape 51"/>
+          <p:cNvSpPr txBox="1">
+            <a:spLocks noGrp="1"/>
+          </p:cNvSpPr>
+          <p:nvPr>
+            <p:ph type="title"/>
+          </p:nvPr>
+        </p:nvSpPr>
+        <p:spPr>
+          <a:xfrm>
+            <a:off x="837450" y="131950"/>
+            <a:ext cx="8136900" cy="498599"/>
+          </a:xfrm>
+          <a:prstGeom prst="rect">
+            <a:avLst/>
+          </a:prstGeom>
+        </p:spPr>
+        <p:txBody>
+          <a:bodyPr lIns="91425" tIns="91425" rIns="91425" bIns="91425" anchor="b" anchorCtr="0">
+            <a:noAutofit/>
+          </a:bodyPr>
+          <a:lstStyle/>
+          <a:p>
+            <a:pPr lvl="0" rtl="0">
+              <a:spcBef>
+                <a:spcPts val="0"/>
+              </a:spcBef>
+              <a:buNone/>
+            </a:pPr>
+            <a:r>
+              <a:rPr lang="en-US" sz="3000" dirty="0" smtClean="0">
+                <a:solidFill>
+                  <a:srgbClr val="003366"/>
+                </a:solidFill>
+              </a:rPr>
+              <a:t>Little problems…</a:t>
             </a:r>
             <a:endParaRPr lang="en-US" sz="3000" b="0" i="1" dirty="0">
               <a:solidFill>
@@ -19236,7 +21439,7 @@
         </p:nvSpPr>
         <p:spPr>
           <a:xfrm rot="20871343">
-            <a:off x="444245" y="1499614"/>
+            <a:off x="703371" y="4027104"/>
             <a:ext cx="3248167" cy="1828800"/>
           </a:xfrm>
           <a:prstGeom prst="ellipse">
@@ -19263,7 +21466,7 @@
           <a:p>
             <a:pPr algn="ctr"/>
             <a:r>
-              <a:rPr lang="en-US" sz="4000" dirty="0" smtClean="0">
+              <a:rPr lang="en-US" sz="3600" dirty="0" smtClean="0">
                 <a:ln w="0"/>
                 <a:solidFill>
                   <a:schemeClr val="tx2">
@@ -19278,9 +21481,9 @@
                   </a:outerShdw>
                 </a:effectLst>
               </a:rPr>
-              <a:t>ISSUE 1</a:t>
+              <a:t>execute() is too long!</a:t>
             </a:r>
-            <a:endParaRPr lang="en-US" sz="4000" dirty="0">
+            <a:endParaRPr lang="en-US" sz="3600" dirty="0">
               <a:ln w="0"/>
               <a:solidFill>
                 <a:schemeClr val="tx2">
@@ -19305,8 +21508,8 @@
           <p:nvPr/>
         </p:nvSpPr>
         <p:spPr>
-          <a:xfrm rot="1428015">
-            <a:off x="5427814" y="1706773"/>
+          <a:xfrm rot="1178035">
+            <a:off x="5349359" y="1375878"/>
             <a:ext cx="3248167" cy="1828800"/>
           </a:xfrm>
           <a:prstGeom prst="ellipse">
@@ -19348,7 +21551,7 @@
                   </a:outerShdw>
                 </a:effectLst>
               </a:rPr>
-              <a:t>ISSUE 2</a:t>
+              <a:t>JavaDoc is poor!</a:t>
             </a:r>
             <a:endParaRPr lang="en-US" sz="4000" dirty="0">
               <a:ln w="0"/>
@@ -19375,8 +21578,8 @@
           <p:nvPr/>
         </p:nvSpPr>
         <p:spPr>
-          <a:xfrm>
-            <a:off x="2825910" y="3791340"/>
+          <a:xfrm rot="20830196">
+            <a:off x="619703" y="1375877"/>
             <a:ext cx="3248167" cy="1828800"/>
           </a:xfrm>
           <a:prstGeom prst="ellipse">
@@ -19403,7 +21606,7 @@
           <a:p>
             <a:pPr algn="ctr"/>
             <a:r>
-              <a:rPr lang="en-US" sz="4000" dirty="0" smtClean="0">
+              <a:rPr lang="en-US" sz="3300" dirty="0" smtClean="0">
                 <a:ln w="0"/>
                 <a:solidFill>
                   <a:schemeClr val="tx1">
@@ -19419,14 +21622,84 @@
                   </a:outerShdw>
                 </a:effectLst>
               </a:rPr>
-              <a:t>ISSUE 3</a:t>
+              <a:t>Few comments!</a:t>
             </a:r>
-            <a:endParaRPr lang="en-US" sz="4000" dirty="0">
+            <a:endParaRPr lang="en-US" sz="3300" dirty="0">
               <a:ln w="0"/>
               <a:solidFill>
                 <a:schemeClr val="tx1">
                   <a:lumMod val="95000"/>
                   <a:lumOff val="5000"/>
+                </a:schemeClr>
+              </a:solidFill>
+              <a:effectLst>
+                <a:outerShdw blurRad="38100" dist="25400" dir="5400000" algn="ctr" rotWithShape="0">
+                  <a:srgbClr val="6E747A">
+                    <a:alpha val="43000"/>
+                  </a:srgbClr>
+                </a:outerShdw>
+              </a:effectLst>
+            </a:endParaRPr>
+          </a:p>
+        </p:txBody>
+      </p:sp>
+      <p:sp>
+        <p:nvSpPr>
+          <p:cNvPr id="14" name="Ovale 13"/>
+          <p:cNvSpPr/>
+          <p:nvPr/>
+        </p:nvSpPr>
+        <p:spPr>
+          <a:xfrm rot="1117788">
+            <a:off x="5281997" y="4067328"/>
+            <a:ext cx="3248167" cy="1828800"/>
+          </a:xfrm>
+          <a:prstGeom prst="ellipse">
+            <a:avLst/>
+          </a:prstGeom>
+        </p:spPr>
+        <p:style>
+          <a:lnRef idx="1">
+            <a:schemeClr val="accent3"/>
+          </a:lnRef>
+          <a:fillRef idx="2">
+            <a:schemeClr val="accent3"/>
+          </a:fillRef>
+          <a:effectRef idx="1">
+            <a:schemeClr val="accent3"/>
+          </a:effectRef>
+          <a:fontRef idx="minor">
+            <a:schemeClr val="dk1"/>
+          </a:fontRef>
+        </p:style>
+        <p:txBody>
+          <a:bodyPr rtlCol="0" anchor="ctr"/>
+          <a:lstStyle/>
+          <a:p>
+            <a:pPr algn="ctr"/>
+            <a:r>
+              <a:rPr lang="en-US" sz="4000" dirty="0" smtClean="0">
+                <a:ln w="0"/>
+                <a:solidFill>
+                  <a:schemeClr val="tx2">
+                    <a:lumMod val="10000"/>
+                  </a:schemeClr>
+                </a:solidFill>
+                <a:effectLst>
+                  <a:outerShdw blurRad="38100" dist="25400" dir="5400000" algn="ctr" rotWithShape="0">
+                    <a:srgbClr val="6E747A">
+                      <a:alpha val="43000"/>
+                    </a:srgbClr>
+                  </a:outerShdw>
+                </a:effectLst>
+              </a:rPr>
+              <a:t>… and so on?</a:t>
+            </a:r>
+            <a:endParaRPr lang="en-US" sz="4000" dirty="0">
+              <a:ln w="0"/>
+              <a:solidFill>
+                <a:schemeClr val="tx2">
+                  <a:lumMod val="10000"/>
                 </a:schemeClr>
               </a:solidFill>
               <a:effectLst>
@@ -19456,507 +21729,6 @@
   <p:timing>
     <p:tnLst>
       <p:par>
-        <p:cTn id="1" dur="indefinite" restart="never" nodeType="tmRoot"/>
-      </p:par>
-    </p:tnLst>
-  </p:timing>
-</p:sld>
-</file>
-
-<file path=ppt/slides/slide9.xml><?xml version="1.0" encoding="utf-8"?>
-<p:sld xmlns:a="http://schemas.openxmlformats.org/drawingml/2006/main" xmlns:r="http://schemas.openxmlformats.org/officeDocument/2006/relationships" xmlns:p="http://schemas.openxmlformats.org/presentationml/2006/main">
-  <p:cSld>
-    <p:spTree>
-      <p:nvGrpSpPr>
-        <p:cNvPr id="1" name="Shape 50"/>
-        <p:cNvGrpSpPr/>
-        <p:nvPr/>
-      </p:nvGrpSpPr>
-      <p:grpSpPr>
-        <a:xfrm>
-          <a:off x="0" y="0"/>
-          <a:ext cx="0" cy="0"/>
-          <a:chOff x="0" y="0"/>
-          <a:chExt cx="0" cy="0"/>
-        </a:xfrm>
-      </p:grpSpPr>
-      <p:sp>
-        <p:nvSpPr>
-          <p:cNvPr id="51" name="Shape 51"/>
-          <p:cNvSpPr txBox="1">
-            <a:spLocks noGrp="1"/>
-          </p:cNvSpPr>
-          <p:nvPr>
-            <p:ph type="title"/>
-          </p:nvPr>
-        </p:nvSpPr>
-        <p:spPr>
-          <a:xfrm>
-            <a:off x="837450" y="131950"/>
-            <a:ext cx="8136900" cy="498599"/>
-          </a:xfrm>
-          <a:prstGeom prst="rect">
-            <a:avLst/>
-          </a:prstGeom>
-        </p:spPr>
-        <p:txBody>
-          <a:bodyPr lIns="91425" tIns="91425" rIns="91425" bIns="91425" anchor="b" anchorCtr="0">
-            <a:noAutofit/>
-          </a:bodyPr>
-          <a:lstStyle/>
-          <a:p>
-            <a:pPr lvl="0" rtl="0">
-              <a:spcBef>
-                <a:spcPts val="0"/>
-              </a:spcBef>
-              <a:buNone/>
-            </a:pPr>
-            <a:r>
-              <a:rPr lang="en-US" sz="3000" dirty="0" smtClean="0">
-                <a:solidFill>
-                  <a:srgbClr val="003366"/>
-                </a:solidFill>
-              </a:rPr>
-              <a:t>Suggestions…</a:t>
-            </a:r>
-            <a:endParaRPr lang="en-US" sz="3000" b="0" i="1" dirty="0">
-              <a:solidFill>
-                <a:srgbClr val="003366"/>
-              </a:solidFill>
-            </a:endParaRPr>
-          </a:p>
-        </p:txBody>
-      </p:sp>
-      <p:sp>
-        <p:nvSpPr>
-          <p:cNvPr id="52" name="Shape 52"/>
-          <p:cNvSpPr txBox="1">
-            <a:spLocks noGrp="1"/>
-          </p:cNvSpPr>
-          <p:nvPr>
-            <p:ph type="body" idx="1"/>
-          </p:nvPr>
-        </p:nvSpPr>
-        <p:spPr>
-          <a:xfrm>
-            <a:off x="314900" y="2210937"/>
-            <a:ext cx="8229600" cy="2084357"/>
-          </a:xfrm>
-          <a:prstGeom prst="rect">
-            <a:avLst/>
-          </a:prstGeom>
-        </p:spPr>
-        <p:txBody>
-          <a:bodyPr lIns="91425" tIns="91425" rIns="91425" bIns="91425" anchor="ctr" anchorCtr="0">
-            <a:noAutofit/>
-          </a:bodyPr>
-          <a:lstStyle/>
-          <a:p>
-            <a:pPr marL="342900" indent="-342900" algn="just">
-              <a:buFont typeface="Wingdings" panose="05000000000000000000" pitchFamily="2" charset="2"/>
-              <a:buChar char="v"/>
-            </a:pPr>
-            <a:r>
-              <a:rPr lang="en-US" sz="3200" dirty="0" smtClean="0">
-                <a:solidFill>
-                  <a:schemeClr val="accent1">
-                    <a:lumMod val="50000"/>
-                  </a:schemeClr>
-                </a:solidFill>
-              </a:rPr>
-              <a:t> Improve the Code Documentation with more </a:t>
-            </a:r>
-            <a:r>
-              <a:rPr lang="en-US" sz="3200" b="1" dirty="0" smtClean="0">
-                <a:solidFill>
-                  <a:schemeClr val="accent1">
-                    <a:lumMod val="50000"/>
-                  </a:schemeClr>
-                </a:solidFill>
-              </a:rPr>
-              <a:t>comments</a:t>
-            </a:r>
-            <a:r>
-              <a:rPr lang="en-US" sz="3200" dirty="0" smtClean="0">
-                <a:solidFill>
-                  <a:schemeClr val="accent1">
-                    <a:lumMod val="50000"/>
-                  </a:schemeClr>
-                </a:solidFill>
-              </a:rPr>
-              <a:t>. </a:t>
-            </a:r>
-          </a:p>
-          <a:p>
-            <a:pPr marL="342900" indent="-342900" algn="just">
-              <a:buFont typeface="Wingdings" panose="05000000000000000000" pitchFamily="2" charset="2"/>
-              <a:buChar char="v"/>
-            </a:pPr>
-            <a:endParaRPr lang="en-US" sz="3200" dirty="0" smtClean="0">
-              <a:solidFill>
-                <a:schemeClr val="accent1">
-                  <a:lumMod val="50000"/>
-                </a:schemeClr>
-              </a:solidFill>
-            </a:endParaRPr>
-          </a:p>
-          <a:p>
-            <a:pPr marL="342900" indent="-342900" algn="just">
-              <a:buFont typeface="Wingdings" panose="05000000000000000000" pitchFamily="2" charset="2"/>
-              <a:buChar char="v"/>
-            </a:pPr>
-            <a:r>
-              <a:rPr lang="en-US" sz="3200" dirty="0" smtClean="0">
-                <a:solidFill>
-                  <a:schemeClr val="accent1">
-                    <a:lumMod val="50000"/>
-                  </a:schemeClr>
-                </a:solidFill>
-              </a:rPr>
-              <a:t> Improve the Code Documentation with   better </a:t>
-            </a:r>
-            <a:r>
-              <a:rPr lang="en-US" sz="3200" b="1" dirty="0" smtClean="0">
-                <a:solidFill>
-                  <a:schemeClr val="accent1">
-                    <a:lumMod val="50000"/>
-                  </a:schemeClr>
-                </a:solidFill>
-              </a:rPr>
-              <a:t>JavaDoc</a:t>
-            </a:r>
-            <a:r>
-              <a:rPr lang="en-US" sz="3200" dirty="0" smtClean="0">
-                <a:solidFill>
-                  <a:schemeClr val="accent1">
-                    <a:lumMod val="50000"/>
-                  </a:schemeClr>
-                </a:solidFill>
-              </a:rPr>
-              <a:t> (pre/post conditions and so on, as seen in </a:t>
-            </a:r>
-            <a:r>
-              <a:rPr lang="en-US" sz="3200" i="1" dirty="0" smtClean="0">
-                <a:solidFill>
-                  <a:schemeClr val="accent1">
-                    <a:lumMod val="50000"/>
-                  </a:schemeClr>
-                </a:solidFill>
-              </a:rPr>
-              <a:t>Software Engineering 1</a:t>
-            </a:r>
-            <a:r>
-              <a:rPr lang="en-US" sz="3200" dirty="0" smtClean="0">
-                <a:solidFill>
-                  <a:schemeClr val="accent1">
-                    <a:lumMod val="50000"/>
-                  </a:schemeClr>
-                </a:solidFill>
-              </a:rPr>
-              <a:t>).</a:t>
-            </a:r>
-          </a:p>
-          <a:p>
-            <a:pPr marL="342900" indent="-342900" algn="just">
-              <a:buFont typeface="Wingdings" panose="05000000000000000000" pitchFamily="2" charset="2"/>
-              <a:buChar char="v"/>
-            </a:pPr>
-            <a:endParaRPr lang="en-US" sz="3200" dirty="0">
-              <a:solidFill>
-                <a:schemeClr val="accent1">
-                  <a:lumMod val="50000"/>
-                </a:schemeClr>
-              </a:solidFill>
-            </a:endParaRPr>
-          </a:p>
-          <a:p>
-            <a:pPr marL="342900" indent="-342900" algn="just">
-              <a:buFont typeface="Wingdings" panose="05000000000000000000" pitchFamily="2" charset="2"/>
-              <a:buChar char="v"/>
-            </a:pPr>
-            <a:r>
-              <a:rPr lang="en-US" sz="3200" dirty="0" smtClean="0">
-                <a:solidFill>
-                  <a:schemeClr val="accent1">
-                    <a:lumMod val="50000"/>
-                  </a:schemeClr>
-                </a:solidFill>
-              </a:rPr>
-              <a:t> … other? </a:t>
-            </a:r>
-            <a:r>
-              <a:rPr lang="en-US" sz="3200" dirty="0" smtClean="0">
-                <a:solidFill>
-                  <a:srgbClr val="92D050"/>
-                </a:solidFill>
-              </a:rPr>
-              <a:t>/</a:t>
-            </a:r>
-            <a:r>
-              <a:rPr lang="en-US" sz="3200" i="1" dirty="0" smtClean="0">
-                <a:solidFill>
-                  <a:srgbClr val="92D050"/>
-                </a:solidFill>
-              </a:rPr>
-              <a:t>* Sometimes it depends just from your tastes… this is the life! </a:t>
-            </a:r>
-            <a:r>
-              <a:rPr lang="en-US" sz="3200" b="1" dirty="0" smtClean="0">
-                <a:solidFill>
-                  <a:srgbClr val="92D050"/>
-                </a:solidFill>
-                <a:sym typeface="Wingdings" panose="05000000000000000000" pitchFamily="2" charset="2"/>
-              </a:rPr>
-              <a:t></a:t>
-            </a:r>
-            <a:r>
-              <a:rPr lang="en-US" sz="3200" i="1" dirty="0" smtClean="0">
-                <a:solidFill>
-                  <a:srgbClr val="92D050"/>
-                </a:solidFill>
-                <a:sym typeface="Wingdings" panose="05000000000000000000" pitchFamily="2" charset="2"/>
-              </a:rPr>
-              <a:t> </a:t>
-            </a:r>
-            <a:r>
-              <a:rPr lang="en-US" sz="3200" i="1" dirty="0" smtClean="0">
-                <a:solidFill>
-                  <a:srgbClr val="92D050"/>
-                </a:solidFill>
-              </a:rPr>
-              <a:t>*/</a:t>
-            </a:r>
-            <a:endParaRPr lang="en-US" sz="3200" i="1" dirty="0">
-              <a:solidFill>
-                <a:schemeClr val="accent1">
-                  <a:lumMod val="50000"/>
-                </a:schemeClr>
-              </a:solidFill>
-            </a:endParaRPr>
-          </a:p>
-        </p:txBody>
-      </p:sp>
-      <p:pic>
-        <p:nvPicPr>
-          <p:cNvPr id="53" name="Shape 53"/>
-          <p:cNvPicPr preferRelativeResize="0"/>
-          <p:nvPr/>
-        </p:nvPicPr>
-        <p:blipFill>
-          <a:blip r:embed="rId3">
-            <a:alphaModFix/>
-          </a:blip>
-          <a:stretch>
-            <a:fillRect/>
-          </a:stretch>
-        </p:blipFill>
-        <p:spPr>
-          <a:xfrm>
-            <a:off x="82450" y="65950"/>
-            <a:ext cx="464900" cy="498650"/>
-          </a:xfrm>
-          <a:prstGeom prst="rect">
-            <a:avLst/>
-          </a:prstGeom>
-          <a:noFill/>
-          <a:ln>
-            <a:noFill/>
-          </a:ln>
-        </p:spPr>
-      </p:pic>
-      <p:pic>
-        <p:nvPicPr>
-          <p:cNvPr id="54" name="Shape 54"/>
-          <p:cNvPicPr preferRelativeResize="0"/>
-          <p:nvPr/>
-        </p:nvPicPr>
-        <p:blipFill>
-          <a:blip r:embed="rId4">
-            <a:alphaModFix/>
-          </a:blip>
-          <a:stretch>
-            <a:fillRect/>
-          </a:stretch>
-        </p:blipFill>
-        <p:spPr>
-          <a:xfrm>
-            <a:off x="0" y="630539"/>
-            <a:ext cx="9143998" cy="97471"/>
-          </a:xfrm>
-          <a:prstGeom prst="rect">
-            <a:avLst/>
-          </a:prstGeom>
-          <a:noFill/>
-          <a:ln>
-            <a:noFill/>
-          </a:ln>
-        </p:spPr>
-      </p:pic>
-      <p:cxnSp>
-        <p:nvCxnSpPr>
-          <p:cNvPr id="55" name="Shape 55"/>
-          <p:cNvCxnSpPr/>
-          <p:nvPr/>
-        </p:nvCxnSpPr>
-        <p:spPr>
-          <a:xfrm rot="10800000">
-            <a:off x="691550" y="125"/>
-            <a:ext cx="0" cy="630299"/>
-          </a:xfrm>
-          <a:prstGeom prst="straightConnector1">
-            <a:avLst/>
-          </a:prstGeom>
-          <a:noFill/>
-          <a:ln w="9525" cap="flat">
-            <a:solidFill>
-              <a:srgbClr val="003366"/>
-            </a:solidFill>
-            <a:prstDash val="solid"/>
-            <a:round/>
-            <a:headEnd type="none" w="lg" len="lg"/>
-            <a:tailEnd type="none" w="lg" len="lg"/>
-          </a:ln>
-        </p:spPr>
-      </p:cxnSp>
-      <p:sp>
-        <p:nvSpPr>
-          <p:cNvPr id="56" name="Shape 56"/>
-          <p:cNvSpPr txBox="1"/>
-          <p:nvPr/>
-        </p:nvSpPr>
-        <p:spPr>
-          <a:xfrm>
-            <a:off x="6783700" y="6531000"/>
-            <a:ext cx="2599200" cy="363899"/>
-          </a:xfrm>
-          <a:prstGeom prst="rect">
-            <a:avLst/>
-          </a:prstGeom>
-          <a:noFill/>
-          <a:ln>
-            <a:noFill/>
-          </a:ln>
-        </p:spPr>
-        <p:txBody>
-          <a:bodyPr lIns="91425" tIns="91425" rIns="91425" bIns="91425" anchor="t" anchorCtr="0">
-            <a:noAutofit/>
-          </a:bodyPr>
-          <a:lstStyle/>
-          <a:p>
-            <a:pPr lvl="0" rtl="0">
-              <a:spcBef>
-                <a:spcPts val="0"/>
-              </a:spcBef>
-              <a:buNone/>
-            </a:pPr>
-            <a:r>
-              <a:rPr lang="it" sz="1200" b="1">
-                <a:solidFill>
-                  <a:srgbClr val="FFFFFF"/>
-                </a:solidFill>
-              </a:rPr>
-              <a:t>POLITECNICO DI MILANO</a:t>
-            </a:r>
-          </a:p>
-        </p:txBody>
-      </p:sp>
-      <p:pic>
-        <p:nvPicPr>
-          <p:cNvPr id="57" name="Shape 57"/>
-          <p:cNvPicPr preferRelativeResize="0"/>
-          <p:nvPr/>
-        </p:nvPicPr>
-        <p:blipFill>
-          <a:blip r:embed="rId5">
-            <a:alphaModFix/>
-          </a:blip>
-          <a:stretch>
-            <a:fillRect/>
-          </a:stretch>
-        </p:blipFill>
-        <p:spPr>
-          <a:xfrm>
-            <a:off x="0" y="6571225"/>
-            <a:ext cx="9144000" cy="286775"/>
-          </a:xfrm>
-          <a:prstGeom prst="rect">
-            <a:avLst/>
-          </a:prstGeom>
-          <a:noFill/>
-          <a:ln>
-            <a:noFill/>
-          </a:ln>
-        </p:spPr>
-      </p:pic>
-      <p:sp>
-        <p:nvSpPr>
-          <p:cNvPr id="58" name="Shape 58"/>
-          <p:cNvSpPr txBox="1">
-            <a:spLocks noGrp="1"/>
-          </p:cNvSpPr>
-          <p:nvPr>
-            <p:ph type="ctrTitle" idx="4294967295"/>
-          </p:nvPr>
-        </p:nvSpPr>
-        <p:spPr>
-          <a:xfrm>
-            <a:off x="457200" y="6712949"/>
-            <a:ext cx="5162269" cy="281444"/>
-          </a:xfrm>
-          <a:prstGeom prst="rect">
-            <a:avLst/>
-          </a:prstGeom>
-        </p:spPr>
-        <p:txBody>
-          <a:bodyPr lIns="91425" tIns="91425" rIns="91425" bIns="91425" anchor="ctr" anchorCtr="0">
-            <a:noAutofit/>
-          </a:bodyPr>
-          <a:lstStyle/>
-          <a:p>
-            <a:pPr indent="457200">
-              <a:lnSpc>
-                <a:spcPct val="115000"/>
-              </a:lnSpc>
-            </a:pPr>
-            <a:r>
-              <a:rPr lang="it-IT" sz="1300" b="1" dirty="0">
-                <a:solidFill>
-                  <a:srgbClr val="003366"/>
-                </a:solidFill>
-              </a:rPr>
-              <a:t>SE2 – Andrea Martino, Francesco Marchesani</a:t>
-            </a:r>
-            <a:br>
-              <a:rPr lang="it-IT" sz="1300" b="1" dirty="0">
-                <a:solidFill>
-                  <a:srgbClr val="003366"/>
-                </a:solidFill>
-              </a:rPr>
-            </a:br>
-            <a:endParaRPr sz="1300" dirty="0">
-              <a:solidFill>
-                <a:srgbClr val="003366"/>
-              </a:solidFill>
-            </a:endParaRPr>
-          </a:p>
-        </p:txBody>
-      </p:sp>
-    </p:spTree>
-    <p:extLst>
-      <p:ext uri="{BB962C8B-B14F-4D97-AF65-F5344CB8AC3E}">
-        <p14:creationId xmlns:p14="http://schemas.microsoft.com/office/powerpoint/2010/main" val="1785322328"/>
-      </p:ext>
-    </p:extLst>
-  </p:cSld>
-  <p:clrMapOvr>
-    <a:masterClrMapping/>
-  </p:clrMapOvr>
-  <p:transition spd="slow">
-    <p:cut/>
-  </p:transition>
-  <p:timing>
-    <p:tnLst>
-      <p:par>
         <p:cTn id="1" dur="indefinite" restart="never" nodeType="tmRoot">
           <p:childTnLst>
             <p:seq concurrent="1" nextAc="seek">
@@ -19966,9 +21738,6 @@
                     <p:cTn id="3" fill="hold">
                       <p:stCondLst>
                         <p:cond delay="indefinite"/>
-                        <p:cond evt="onBegin" delay="0">
-                          <p:tn val="2"/>
-                        </p:cond>
                       </p:stCondLst>
                       <p:childTnLst>
                         <p:par>
@@ -19978,7 +21747,7 @@
                             </p:stCondLst>
                             <p:childTnLst>
                               <p:par>
-                                <p:cTn id="5" presetID="2" presetClass="entr" presetSubtype="4" fill="hold" grpId="0" nodeType="afterEffect">
+                                <p:cTn id="5" presetID="6" presetClass="entr" presetSubtype="16" fill="hold" grpId="0" nodeType="clickEffect">
                                   <p:stCondLst>
                                     <p:cond delay="0"/>
                                   </p:stCondLst>
@@ -19991,11 +21760,7 @@
                                           </p:stCondLst>
                                         </p:cTn>
                                         <p:tgtEl>
-                                          <p:spTgt spid="52">
-                                            <p:txEl>
-                                              <p:pRg st="0" end="0"/>
-                                            </p:txEl>
-                                          </p:spTgt>
+                                          <p:spTgt spid="13"/>
                                         </p:tgtEl>
                                         <p:attrNameLst>
                                           <p:attrName>style.visibility</p:attrName>
@@ -20005,60 +21770,14 @@
                                         <p:strVal val="visible"/>
                                       </p:to>
                                     </p:set>
-                                    <p:anim calcmode="lin" valueType="num">
-                                      <p:cBhvr additive="base">
-                                        <p:cTn id="7" dur="500" fill="hold"/>
+                                    <p:animEffect transition="in" filter="circle(in)">
+                                      <p:cBhvr>
+                                        <p:cTn id="7" dur="2000"/>
                                         <p:tgtEl>
-                                          <p:spTgt spid="52">
-                                            <p:txEl>
-                                              <p:pRg st="0" end="0"/>
-                                            </p:txEl>
-                                          </p:spTgt>
+                                          <p:spTgt spid="13"/>
                                         </p:tgtEl>
-                                        <p:attrNameLst>
-                                          <p:attrName>ppt_x</p:attrName>
-                                        </p:attrNameLst>
                                       </p:cBhvr>
-                                      <p:tavLst>
-                                        <p:tav tm="0">
-                                          <p:val>
-                                            <p:strVal val="#ppt_x"/>
-                                          </p:val>
-                                        </p:tav>
-                                        <p:tav tm="100000">
-                                          <p:val>
-                                            <p:strVal val="#ppt_x"/>
-                                          </p:val>
-                                        </p:tav>
-                                      </p:tavLst>
-                                    </p:anim>
-                                    <p:anim calcmode="lin" valueType="num">
-                                      <p:cBhvr additive="base">
-                                        <p:cTn id="8" dur="500" fill="hold"/>
-                                        <p:tgtEl>
-                                          <p:spTgt spid="52">
-                                            <p:txEl>
-                                              <p:pRg st="0" end="0"/>
-                                            </p:txEl>
-                                          </p:spTgt>
-                                        </p:tgtEl>
-                                        <p:attrNameLst>
-                                          <p:attrName>ppt_y</p:attrName>
-                                        </p:attrNameLst>
-                                      </p:cBhvr>
-                                      <p:tavLst>
-                                        <p:tav tm="0">
-                                          <p:val>
-                                            <p:strVal val="1+#ppt_h/2"/>
-                                          </p:val>
-                                        </p:tav>
-                                        <p:tav tm="100000">
-                                          <p:val>
-                                            <p:strVal val="#ppt_y"/>
-                                          </p:val>
-                                        </p:tav>
-                                      </p:tavLst>
-                                    </p:anim>
+                                    </p:animEffect>
                                   </p:childTnLst>
                                 </p:cTn>
                               </p:par>
@@ -20066,30 +21785,26 @@
                           </p:cTn>
                         </p:par>
                         <p:par>
-                          <p:cTn id="9" fill="hold">
+                          <p:cTn id="8" fill="hold">
                             <p:stCondLst>
-                              <p:cond delay="500"/>
+                              <p:cond delay="2000"/>
                             </p:stCondLst>
                             <p:childTnLst>
                               <p:par>
-                                <p:cTn id="10" presetID="2" presetClass="entr" presetSubtype="4" fill="hold" grpId="0" nodeType="afterEffect">
+                                <p:cTn id="9" presetID="6" presetClass="entr" presetSubtype="16" fill="hold" grpId="0" nodeType="afterEffect">
                                   <p:stCondLst>
                                     <p:cond delay="0"/>
                                   </p:stCondLst>
                                   <p:childTnLst>
                                     <p:set>
                                       <p:cBhvr>
-                                        <p:cTn id="11" dur="1" fill="hold">
+                                        <p:cTn id="10" dur="1" fill="hold">
                                           <p:stCondLst>
                                             <p:cond delay="0"/>
                                           </p:stCondLst>
                                         </p:cTn>
                                         <p:tgtEl>
-                                          <p:spTgt spid="52">
-                                            <p:txEl>
-                                              <p:pRg st="2" end="2"/>
-                                            </p:txEl>
-                                          </p:spTgt>
+                                          <p:spTgt spid="12"/>
                                         </p:tgtEl>
                                         <p:attrNameLst>
                                           <p:attrName>style.visibility</p:attrName>
@@ -20099,60 +21814,14 @@
                                         <p:strVal val="visible"/>
                                       </p:to>
                                     </p:set>
-                                    <p:anim calcmode="lin" valueType="num">
-                                      <p:cBhvr additive="base">
-                                        <p:cTn id="12" dur="500" fill="hold"/>
+                                    <p:animEffect transition="in" filter="circle(in)">
+                                      <p:cBhvr>
+                                        <p:cTn id="11" dur="2000"/>
                                         <p:tgtEl>
-                                          <p:spTgt spid="52">
-                                            <p:txEl>
-                                              <p:pRg st="2" end="2"/>
-                                            </p:txEl>
-                                          </p:spTgt>
+                                          <p:spTgt spid="12"/>
                                         </p:tgtEl>
-                                        <p:attrNameLst>
-                                          <p:attrName>ppt_x</p:attrName>
-                                        </p:attrNameLst>
                                       </p:cBhvr>
-                                      <p:tavLst>
-                                        <p:tav tm="0">
-                                          <p:val>
-                                            <p:strVal val="#ppt_x"/>
-                                          </p:val>
-                                        </p:tav>
-                                        <p:tav tm="100000">
-                                          <p:val>
-                                            <p:strVal val="#ppt_x"/>
-                                          </p:val>
-                                        </p:tav>
-                                      </p:tavLst>
-                                    </p:anim>
-                                    <p:anim calcmode="lin" valueType="num">
-                                      <p:cBhvr additive="base">
-                                        <p:cTn id="13" dur="500" fill="hold"/>
-                                        <p:tgtEl>
-                                          <p:spTgt spid="52">
-                                            <p:txEl>
-                                              <p:pRg st="2" end="2"/>
-                                            </p:txEl>
-                                          </p:spTgt>
-                                        </p:tgtEl>
-                                        <p:attrNameLst>
-                                          <p:attrName>ppt_y</p:attrName>
-                                        </p:attrNameLst>
-                                      </p:cBhvr>
-                                      <p:tavLst>
-                                        <p:tav tm="0">
-                                          <p:val>
-                                            <p:strVal val="1+#ppt_h/2"/>
-                                          </p:val>
-                                        </p:tav>
-                                        <p:tav tm="100000">
-                                          <p:val>
-                                            <p:strVal val="#ppt_y"/>
-                                          </p:val>
-                                        </p:tav>
-                                      </p:tavLst>
-                                    </p:anim>
+                                    </p:animEffect>
                                   </p:childTnLst>
                                 </p:cTn>
                               </p:par>
@@ -20160,30 +21829,26 @@
                           </p:cTn>
                         </p:par>
                         <p:par>
-                          <p:cTn id="14" fill="hold">
+                          <p:cTn id="12" fill="hold">
                             <p:stCondLst>
-                              <p:cond delay="1000"/>
+                              <p:cond delay="4000"/>
                             </p:stCondLst>
                             <p:childTnLst>
                               <p:par>
-                                <p:cTn id="15" presetID="2" presetClass="entr" presetSubtype="4" fill="hold" grpId="0" nodeType="afterEffect">
+                                <p:cTn id="13" presetID="6" presetClass="entr" presetSubtype="16" fill="hold" grpId="0" nodeType="afterEffect">
                                   <p:stCondLst>
                                     <p:cond delay="0"/>
                                   </p:stCondLst>
                                   <p:childTnLst>
                                     <p:set>
                                       <p:cBhvr>
-                                        <p:cTn id="16" dur="1" fill="hold">
+                                        <p:cTn id="14" dur="1" fill="hold">
                                           <p:stCondLst>
                                             <p:cond delay="0"/>
                                           </p:stCondLst>
                                         </p:cTn>
                                         <p:tgtEl>
-                                          <p:spTgt spid="52">
-                                            <p:txEl>
-                                              <p:pRg st="4" end="4"/>
-                                            </p:txEl>
-                                          </p:spTgt>
+                                          <p:spTgt spid="2"/>
                                         </p:tgtEl>
                                         <p:attrNameLst>
                                           <p:attrName>style.visibility</p:attrName>
@@ -20193,60 +21858,58 @@
                                         <p:strVal val="visible"/>
                                       </p:to>
                                     </p:set>
-                                    <p:anim calcmode="lin" valueType="num">
-                                      <p:cBhvr additive="base">
-                                        <p:cTn id="17" dur="500" fill="hold"/>
+                                    <p:animEffect transition="in" filter="circle(in)">
+                                      <p:cBhvr>
+                                        <p:cTn id="15" dur="2000"/>
                                         <p:tgtEl>
-                                          <p:spTgt spid="52">
-                                            <p:txEl>
-                                              <p:pRg st="4" end="4"/>
-                                            </p:txEl>
-                                          </p:spTgt>
+                                          <p:spTgt spid="2"/>
+                                        </p:tgtEl>
+                                      </p:cBhvr>
+                                    </p:animEffect>
+                                  </p:childTnLst>
+                                </p:cTn>
+                              </p:par>
+                            </p:childTnLst>
+                          </p:cTn>
+                        </p:par>
+                        <p:par>
+                          <p:cTn id="16" fill="hold">
+                            <p:stCondLst>
+                              <p:cond delay="6000"/>
+                            </p:stCondLst>
+                            <p:childTnLst>
+                              <p:par>
+                                <p:cTn id="17" presetID="6" presetClass="entr" presetSubtype="16" fill="hold" grpId="0" nodeType="afterEffect">
+                                  <p:stCondLst>
+                                    <p:cond delay="0"/>
+                                  </p:stCondLst>
+                                  <p:childTnLst>
+                                    <p:set>
+                                      <p:cBhvr>
+                                        <p:cTn id="18" dur="1" fill="hold">
+                                          <p:stCondLst>
+                                            <p:cond delay="0"/>
+                                          </p:stCondLst>
+                                        </p:cTn>
+                                        <p:tgtEl>
+                                          <p:spTgt spid="14"/>
                                         </p:tgtEl>
                                         <p:attrNameLst>
-                                          <p:attrName>ppt_x</p:attrName>
+                                          <p:attrName>style.visibility</p:attrName>
                                         </p:attrNameLst>
                                       </p:cBhvr>
-                                      <p:tavLst>
-                                        <p:tav tm="0">
-                                          <p:val>
-                                            <p:strVal val="#ppt_x"/>
-                                          </p:val>
-                                        </p:tav>
-                                        <p:tav tm="100000">
-                                          <p:val>
-                                            <p:strVal val="#ppt_x"/>
-                                          </p:val>
-                                        </p:tav>
-                                      </p:tavLst>
-                                    </p:anim>
-                                    <p:anim calcmode="lin" valueType="num">
-                                      <p:cBhvr additive="base">
-                                        <p:cTn id="18" dur="500" fill="hold"/>
+                                      <p:to>
+                                        <p:strVal val="visible"/>
+                                      </p:to>
+                                    </p:set>
+                                    <p:animEffect transition="in" filter="circle(in)">
+                                      <p:cBhvr>
+                                        <p:cTn id="19" dur="2000"/>
                                         <p:tgtEl>
-                                          <p:spTgt spid="52">
-                                            <p:txEl>
-                                              <p:pRg st="4" end="4"/>
-                                            </p:txEl>
-                                          </p:spTgt>
+                                          <p:spTgt spid="14"/>
                                         </p:tgtEl>
-                                        <p:attrNameLst>
-                                          <p:attrName>ppt_y</p:attrName>
-                                        </p:attrNameLst>
                                       </p:cBhvr>
-                                      <p:tavLst>
-                                        <p:tav tm="0">
-                                          <p:val>
-                                            <p:strVal val="1+#ppt_h/2"/>
-                                          </p:val>
-                                        </p:tav>
-                                        <p:tav tm="100000">
-                                          <p:val>
-                                            <p:strVal val="#ppt_y"/>
-                                          </p:val>
-                                        </p:tav>
-                                      </p:tavLst>
-                                    </p:anim>
+                                    </p:animEffect>
                                   </p:childTnLst>
                                 </p:cTn>
                               </p:par>
@@ -20278,7 +21941,10 @@
       </p:par>
     </p:tnLst>
     <p:bldLst>
-      <p:bldP spid="52" grpId="0" uiExpand="1" build="p"/>
+      <p:bldP spid="2" grpId="0" animBg="1"/>
+      <p:bldP spid="12" grpId="0" animBg="1"/>
+      <p:bldP spid="13" grpId="0" animBg="1"/>
+      <p:bldP spid="14" grpId="0" animBg="1"/>
     </p:bldLst>
   </p:timing>
 </p:sld>

</xml_diff>

<commit_message>
Little modifies in both documents
</commit_message>
<xml_diff>
--- a/Presentations/3. CID Presentation.pptx
+++ b/Presentations/3. CID Presentation.pptx
@@ -328,7 +328,7 @@
               <a:cs typeface="+mn-cs"/>
             </a:defRPr>
           </a:pPr>
-          <a:endParaRPr lang="it-IT"/>
+          <a:endParaRPr lang="en-US"/>
         </a:p>
       </c:txPr>
     </c:title>
@@ -828,11 +828,11 @@
           <c:showBubbleSize val="0"/>
         </c:dLbls>
         <c:gapWidth val="100"/>
-        <c:axId val="-2075192352"/>
-        <c:axId val="-2075189088"/>
+        <c:axId val="384623048"/>
+        <c:axId val="384623440"/>
       </c:barChart>
       <c:catAx>
-        <c:axId val="-2075192352"/>
+        <c:axId val="384623048"/>
         <c:scaling>
           <c:orientation val="minMax"/>
         </c:scaling>
@@ -872,10 +872,10 @@
                 <a:cs typeface="+mn-cs"/>
               </a:defRPr>
             </a:pPr>
-            <a:endParaRPr lang="it-IT"/>
+            <a:endParaRPr lang="en-US"/>
           </a:p>
         </c:txPr>
-        <c:crossAx val="-2075189088"/>
+        <c:crossAx val="384623440"/>
         <c:crosses val="autoZero"/>
         <c:auto val="1"/>
         <c:lblAlgn val="ctr"/>
@@ -883,7 +883,7 @@
         <c:noMultiLvlLbl val="0"/>
       </c:catAx>
       <c:valAx>
-        <c:axId val="-2075189088"/>
+        <c:axId val="384623440"/>
         <c:scaling>
           <c:orientation val="minMax"/>
         </c:scaling>
@@ -931,10 +931,10 @@
                 <a:cs typeface="+mn-cs"/>
               </a:defRPr>
             </a:pPr>
-            <a:endParaRPr lang="it-IT"/>
+            <a:endParaRPr lang="en-US"/>
           </a:p>
         </c:txPr>
-        <c:crossAx val="-2075192352"/>
+        <c:crossAx val="384623048"/>
         <c:crosses val="autoZero"/>
         <c:crossBetween val="between"/>
       </c:valAx>
@@ -974,7 +974,7 @@
               <a:cs typeface="+mn-cs"/>
             </a:defRPr>
           </a:pPr>
-          <a:endParaRPr lang="it-IT"/>
+          <a:endParaRPr lang="en-US"/>
         </a:p>
       </c:txPr>
     </c:legend>
@@ -996,7 +996,7 @@
       <a:pPr>
         <a:defRPr/>
       </a:pPr>
-      <a:endParaRPr lang="it-IT"/>
+      <a:endParaRPr lang="en-US"/>
     </a:p>
   </c:txPr>
   <c:externalData r:id="rId3">
@@ -21455,7 +21455,7 @@
               <a:t>brief description of this command is given by </a:t>
             </a:r>
             <a:r>
-              <a:rPr lang="en-US" sz="2400" dirty="0" err="1">
+              <a:rPr lang="en-US" sz="2400" b="1" dirty="0" err="1">
                 <a:solidFill>
                   <a:schemeClr val="accent1">
                     <a:lumMod val="50000"/>
@@ -21465,14 +21465,24 @@
               <a:t>GlassFish</a:t>
             </a:r>
             <a:r>
-              <a:rPr lang="en-US" sz="2400" dirty="0">
+              <a:rPr lang="en-US" sz="2400" b="1" dirty="0">
                 <a:solidFill>
                   <a:schemeClr val="accent1">
                     <a:lumMod val="50000"/>
                   </a:schemeClr>
                 </a:solidFill>
               </a:rPr>
-              <a:t> documentation:</a:t>
+              <a:t> documentation</a:t>
+            </a:r>
+            <a:r>
+              <a:rPr lang="en-US" sz="2400" dirty="0">
+                <a:solidFill>
+                  <a:schemeClr val="accent1">
+                    <a:lumMod val="50000"/>
+                  </a:schemeClr>
+                </a:solidFill>
+              </a:rPr>
+              <a:t>:</a:t>
             </a:r>
           </a:p>
           <a:p>
@@ -21517,7 +21527,31 @@
                 </a:solidFill>
                 <a:latin typeface="Calibri" panose="020F0502020204030204" pitchFamily="34" charset="0"/>
               </a:rPr>
-              <a:t> list-sub-commands subcommand lists EJBs or servlets in a deployed module or in a module of a deployed application. If a module is not specified, all modules are listed. The </a:t>
+              <a:t> list-sub-commands </a:t>
+            </a:r>
+            <a:r>
+              <a:rPr lang="en-US" sz="2000" i="1" dirty="0" smtClean="0">
+                <a:solidFill>
+                  <a:schemeClr val="tx1">
+                    <a:lumMod val="95000"/>
+                    <a:lumOff val="5000"/>
+                  </a:schemeClr>
+                </a:solidFill>
+                <a:latin typeface="Calibri" panose="020F0502020204030204" pitchFamily="34" charset="0"/>
+              </a:rPr>
+              <a:t> are subcommand </a:t>
+            </a:r>
+            <a:r>
+              <a:rPr lang="en-US" sz="2000" i="1" dirty="0">
+                <a:solidFill>
+                  <a:schemeClr val="tx1">
+                    <a:lumMod val="95000"/>
+                    <a:lumOff val="5000"/>
+                  </a:schemeClr>
+                </a:solidFill>
+                <a:latin typeface="Calibri" panose="020F0502020204030204" pitchFamily="34" charset="0"/>
+              </a:rPr>
+              <a:t>lists EJBs or servlets in a deployed module or in a module of a deployed application. If a module is not specified, all modules are listed. The </a:t>
             </a:r>
             <a:r>
               <a:rPr lang="en-US" sz="2000" b="1" i="1" dirty="0">
@@ -22485,7 +22519,39 @@
                   <a:srgbClr val="002060"/>
                 </a:solidFill>
               </a:rPr>
-              <a:t>Java applications are packaged as specialized versions of JAR </a:t>
+              <a:t>Java applications are packaged as </a:t>
+            </a:r>
+            <a:r>
+              <a:rPr lang="en-US" sz="2400" i="1" dirty="0">
+                <a:solidFill>
+                  <a:srgbClr val="002060"/>
+                </a:solidFill>
+              </a:rPr>
+              <a:t>specialized versions </a:t>
+            </a:r>
+            <a:r>
+              <a:rPr lang="en-US" sz="2400" dirty="0">
+                <a:solidFill>
+                  <a:srgbClr val="002060"/>
+                </a:solidFill>
+              </a:rPr>
+              <a:t>of </a:t>
+            </a:r>
+            <a:r>
+              <a:rPr lang="en-US" sz="2400" b="1" dirty="0">
+                <a:solidFill>
+                  <a:srgbClr val="002060"/>
+                </a:solidFill>
+              </a:rPr>
+              <a:t>JAR </a:t>
+            </a:r>
+            <a:r>
+              <a:rPr lang="en-US" sz="2400" b="1" dirty="0" smtClean="0">
+                <a:solidFill>
+                  <a:srgbClr val="002060"/>
+                </a:solidFill>
+              </a:rPr>
+              <a:t>files </a:t>
             </a:r>
             <a:r>
               <a:rPr lang="en-US" sz="2400" dirty="0" smtClean="0">
@@ -22493,7 +22559,7 @@
                   <a:srgbClr val="002060"/>
                 </a:solidFill>
               </a:rPr>
-              <a:t>files before </a:t>
+              <a:t>before </a:t>
             </a:r>
             <a:r>
               <a:rPr lang="en-US" sz="2400" dirty="0">
@@ -22534,7 +22600,7 @@
               </a:lnSpc>
             </a:pPr>
             <a:r>
-              <a:rPr lang="en-US" sz="2400" b="1" dirty="0" smtClean="0">
+              <a:rPr lang="en-US" sz="3200" b="1" dirty="0" smtClean="0">
                 <a:solidFill>
                   <a:srgbClr val="002060"/>
                 </a:solidFill>
@@ -22542,7 +22608,7 @@
               <a:t>EAR: </a:t>
             </a:r>
             <a:r>
-              <a:rPr lang="en-US" sz="2400" dirty="0">
+              <a:rPr lang="en-US" sz="3200" dirty="0">
                 <a:solidFill>
                   <a:srgbClr val="002060"/>
                 </a:solidFill>
@@ -22550,14 +22616,14 @@
               <a:t>Enterprise </a:t>
             </a:r>
             <a:r>
-              <a:rPr lang="en-US" sz="2400" dirty="0" smtClean="0">
+              <a:rPr lang="en-US" sz="3200" dirty="0" smtClean="0">
                 <a:solidFill>
                   <a:srgbClr val="002060"/>
                 </a:solidFill>
               </a:rPr>
               <a:t>application archive.</a:t>
             </a:r>
-            <a:endParaRPr lang="en-US" sz="2400" b="1" dirty="0" smtClean="0">
+            <a:endParaRPr lang="en-US" sz="3200" b="1" dirty="0" smtClean="0">
               <a:solidFill>
                 <a:srgbClr val="002060"/>
               </a:solidFill>
@@ -22570,7 +22636,7 @@
               </a:lnSpc>
             </a:pPr>
             <a:r>
-              <a:rPr lang="en-US" sz="2400" b="1" dirty="0" smtClean="0">
+              <a:rPr lang="en-US" sz="3200" b="1" dirty="0" smtClean="0">
                 <a:solidFill>
                   <a:srgbClr val="002060"/>
                 </a:solidFill>
@@ -22578,14 +22644,14 @@
               <a:t>EJB-JAR: </a:t>
             </a:r>
             <a:r>
-              <a:rPr lang="en-US" sz="2400" dirty="0" smtClean="0">
+              <a:rPr lang="en-US" sz="3200" dirty="0" smtClean="0">
                 <a:solidFill>
                   <a:srgbClr val="002060"/>
                 </a:solidFill>
               </a:rPr>
               <a:t>EJB Java archive.</a:t>
             </a:r>
-            <a:endParaRPr lang="en-US" sz="2400" b="1" dirty="0" smtClean="0">
+            <a:endParaRPr lang="en-US" sz="3200" b="1" dirty="0" smtClean="0">
               <a:solidFill>
                 <a:srgbClr val="002060"/>
               </a:solidFill>
@@ -22598,7 +22664,7 @@
               </a:lnSpc>
             </a:pPr>
             <a:r>
-              <a:rPr lang="en-US" sz="2400" b="1" dirty="0" smtClean="0">
+              <a:rPr lang="en-US" sz="3200" b="1" dirty="0" smtClean="0">
                 <a:solidFill>
                   <a:srgbClr val="002060"/>
                 </a:solidFill>
@@ -22606,14 +22672,14 @@
               <a:t>WAR: </a:t>
             </a:r>
             <a:r>
-              <a:rPr lang="en-US" sz="2400" dirty="0" smtClean="0">
+              <a:rPr lang="en-US" sz="3200" dirty="0" smtClean="0">
                 <a:solidFill>
                   <a:srgbClr val="002060"/>
                 </a:solidFill>
               </a:rPr>
               <a:t>Web application archives.</a:t>
             </a:r>
-            <a:endParaRPr lang="en-US" sz="2400" b="1" dirty="0">
+            <a:endParaRPr lang="en-US" sz="3200" b="1" dirty="0">
               <a:solidFill>
                 <a:srgbClr val="002060"/>
               </a:solidFill>
@@ -24146,14 +24212,6 @@
               </a:rPr>
               <a:t>187</a:t>
             </a:r>
-            <a:endParaRPr lang="en-US" sz="2400" b="1" dirty="0" smtClean="0">
-              <a:solidFill>
-                <a:schemeClr val="accent1">
-                  <a:lumMod val="50000"/>
-                </a:schemeClr>
-              </a:solidFill>
-              <a:latin typeface="+mj-lt"/>
-            </a:endParaRPr>
           </a:p>
           <a:p>
             <a:pPr algn="just">
@@ -25139,13 +25197,6 @@
               </a:rPr>
               <a:t>Lines 208 -&gt; 267</a:t>
             </a:r>
-            <a:endParaRPr lang="en-US" sz="2400" dirty="0" smtClean="0">
-              <a:solidFill>
-                <a:schemeClr val="accent1">
-                  <a:lumMod val="50000"/>
-                </a:schemeClr>
-              </a:solidFill>
-            </a:endParaRPr>
           </a:p>
           <a:p>
             <a:pPr algn="just">
@@ -25502,15 +25553,7 @@
                   <a:srgbClr val="1D405D"/>
                 </a:solidFill>
               </a:rPr>
-              <a:t>()</a:t>
-            </a:r>
-            <a:r>
-              <a:rPr lang="en-US" sz="2400" dirty="0" smtClean="0">
-                <a:solidFill>
-                  <a:srgbClr val="1D405D"/>
-                </a:solidFill>
-              </a:rPr>
-              <a:t>}</a:t>
+              <a:t>()}</a:t>
             </a:r>
           </a:p>
           <a:p>

</xml_diff>